<commit_message>
got back to Rmarkdown as tar_quarto didn't work properly and I didn't like that quarto_render doesn't have a lot of options (like specifying the output path)
</commit_message>
<xml_diff>
--- a/markdown/template.pptx
+++ b/markdown/template.pptx
@@ -5,12 +5,15 @@
     <p:sldMasterId id="2147483648" r:id="rId1"/>
   </p:sldMasterIdLst>
   <p:notesMasterIdLst>
-    <p:notesMasterId r:id="rId3"/>
+    <p:notesMasterId r:id="rId6"/>
   </p:notesMasterIdLst>
   <p:sldIdLst>
     <p:sldId id="256" r:id="rId2"/>
+    <p:sldId id="257" r:id="rId3"/>
+    <p:sldId id="258" r:id="rId4"/>
+    <p:sldId id="259" r:id="rId5"/>
   </p:sldIdLst>
-  <p:sldSz cx="9144000" cy="5715000" type="screen16x10"/>
+  <p:sldSz cx="9144000" cy="5143500" type="screen16x9"/>
   <p:notesSz cx="6858000" cy="9144000"/>
   <p:defaultTextStyle>
     <a:defPPr>
@@ -110,7 +113,7 @@
   <p:extLst>
     <p:ext uri="{EFAFB233-063F-42B5-8137-9DF3F51BA10A}">
       <p15:sldGuideLst xmlns:p15="http://schemas.microsoft.com/office/powerpoint/2012/main">
-        <p15:guide id="1" orient="horz" pos="1800" userDrawn="1">
+        <p15:guide id="1" orient="horz" pos="1620" userDrawn="1">
           <p15:clr>
             <a:srgbClr val="A4A3A4"/>
           </p15:clr>
@@ -121,9 +124,6 @@
           </p15:clr>
         </p15:guide>
       </p15:sldGuideLst>
-    </p:ext>
-    <p:ext uri="{2D200454-40CA-4A62-9FC3-DE9A4176ACB9}">
-      <p15:notesGuideLst xmlns:p15="http://schemas.microsoft.com/office/powerpoint/2012/main"/>
     </p:ext>
   </p:extLst>
 </p:presentation>
@@ -153,7 +153,7 @@
       </p:grpSpPr>
       <p:sp>
         <p:nvSpPr>
-          <p:cNvPr id="2" name="Kopfzeilenplatzhalter 1"/>
+          <p:cNvPr id="2" name="Header Placeholder 1"/>
           <p:cNvSpPr>
             <a:spLocks noGrp="1"/>
           </p:cNvSpPr>
@@ -178,13 +178,13 @@
             </a:lvl1pPr>
           </a:lstStyle>
           <a:p>
-            <a:endParaRPr lang="en-GB"/>
-          </a:p>
-        </p:txBody>
-      </p:sp>
-      <p:sp>
-        <p:nvSpPr>
-          <p:cNvPr id="3" name="Datumsplatzhalter 2"/>
+            <a:endParaRPr lang="en-US"/>
+          </a:p>
+        </p:txBody>
+      </p:sp>
+      <p:sp>
+        <p:nvSpPr>
+          <p:cNvPr id="3" name="Date Placeholder 2"/>
           <p:cNvSpPr>
             <a:spLocks noGrp="1"/>
           </p:cNvSpPr>
@@ -209,17 +209,17 @@
             </a:lvl1pPr>
           </a:lstStyle>
           <a:p>
-            <a:fld id="{B8042BC7-A105-1C44-B3A6-AF0E814B5493}" type="datetimeFigureOut">
-              <a:rPr lang="en-GB" smtClean="0"/>
-              <a:t>02/06/2021</a:t>
+            <a:fld id="{0F9C1CCF-B725-44A7-AA57-5E433BD85C9F}" type="datetimeFigureOut">
+              <a:rPr lang="en-US" smtClean="0"/>
+              <a:t>1/2/22</a:t>
             </a:fld>
-            <a:endParaRPr lang="en-GB"/>
-          </a:p>
-        </p:txBody>
-      </p:sp>
-      <p:sp>
-        <p:nvSpPr>
-          <p:cNvPr id="4" name="Folienbildplatzhalter 3"/>
+            <a:endParaRPr lang="en-US"/>
+          </a:p>
+        </p:txBody>
+      </p:sp>
+      <p:sp>
+        <p:nvSpPr>
+          <p:cNvPr id="4" name="Slide Image Placeholder 3"/>
           <p:cNvSpPr>
             <a:spLocks noGrp="1" noRot="1" noChangeAspect="1"/>
           </p:cNvSpPr>
@@ -229,8 +229,8 @@
         </p:nvSpPr>
         <p:spPr>
           <a:xfrm>
-            <a:off x="960438" y="1143000"/>
-            <a:ext cx="4937125" cy="3086100"/>
+            <a:off x="685800" y="1143000"/>
+            <a:ext cx="5486400" cy="3086100"/>
           </a:xfrm>
           <a:prstGeom prst="rect">
             <a:avLst/>
@@ -246,13 +246,13 @@
           <a:bodyPr vert="horz" lIns="91440" tIns="45720" rIns="91440" bIns="45720" rtlCol="0" anchor="ctr"/>
           <a:lstStyle/>
           <a:p>
-            <a:endParaRPr lang="en-GB"/>
-          </a:p>
-        </p:txBody>
-      </p:sp>
-      <p:sp>
-        <p:nvSpPr>
-          <p:cNvPr id="5" name="Notizenplatzhalter 4"/>
+            <a:endParaRPr lang="en-US"/>
+          </a:p>
+        </p:txBody>
+      </p:sp>
+      <p:sp>
+        <p:nvSpPr>
+          <p:cNvPr id="5" name="Notes Placeholder 4"/>
           <p:cNvSpPr>
             <a:spLocks noGrp="1"/>
           </p:cNvSpPr>
@@ -275,44 +275,43 @@
           <a:p>
             <a:pPr lvl="0"/>
             <a:r>
-              <a:rPr lang="de-DE"/>
-              <a:t>Mastertextformat bearbeiten</a:t>
+              <a:rPr lang="en-US"/>
+              <a:t>Click to edit Master text styles</a:t>
             </a:r>
           </a:p>
           <a:p>
             <a:pPr lvl="1"/>
             <a:r>
-              <a:rPr lang="de-DE"/>
-              <a:t>Zweite Ebene</a:t>
+              <a:rPr lang="en-US"/>
+              <a:t>Second level</a:t>
             </a:r>
           </a:p>
           <a:p>
             <a:pPr lvl="2"/>
             <a:r>
-              <a:rPr lang="de-DE"/>
-              <a:t>Dritte Ebene</a:t>
+              <a:rPr lang="en-US"/>
+              <a:t>Third level</a:t>
             </a:r>
           </a:p>
           <a:p>
             <a:pPr lvl="3"/>
             <a:r>
-              <a:rPr lang="de-DE"/>
-              <a:t>Vierte Ebene</a:t>
+              <a:rPr lang="en-US"/>
+              <a:t>Fourth level</a:t>
             </a:r>
           </a:p>
           <a:p>
             <a:pPr lvl="4"/>
             <a:r>
-              <a:rPr lang="de-DE"/>
-              <a:t>Fünfte Ebene</a:t>
-            </a:r>
-            <a:endParaRPr lang="en-GB"/>
-          </a:p>
-        </p:txBody>
-      </p:sp>
-      <p:sp>
-        <p:nvSpPr>
-          <p:cNvPr id="6" name="Fußzeilenplatzhalter 5"/>
+              <a:rPr lang="en-US"/>
+              <a:t>Fifth level</a:t>
+            </a:r>
+          </a:p>
+        </p:txBody>
+      </p:sp>
+      <p:sp>
+        <p:nvSpPr>
+          <p:cNvPr id="6" name="Footer Placeholder 5"/>
           <p:cNvSpPr>
             <a:spLocks noGrp="1"/>
           </p:cNvSpPr>
@@ -337,13 +336,13 @@
             </a:lvl1pPr>
           </a:lstStyle>
           <a:p>
-            <a:endParaRPr lang="en-GB"/>
-          </a:p>
-        </p:txBody>
-      </p:sp>
-      <p:sp>
-        <p:nvSpPr>
-          <p:cNvPr id="7" name="Foliennummernplatzhalter 6"/>
+            <a:endParaRPr lang="en-US"/>
+          </a:p>
+        </p:txBody>
+      </p:sp>
+      <p:sp>
+        <p:nvSpPr>
+          <p:cNvPr id="7" name="Slide Number Placeholder 6"/>
           <p:cNvSpPr>
             <a:spLocks noGrp="1"/>
           </p:cNvSpPr>
@@ -368,18 +367,18 @@
             </a:lvl1pPr>
           </a:lstStyle>
           <a:p>
-            <a:fld id="{40606010-5EA0-E241-94FD-2EB0B5F7CCF8}" type="slidenum">
-              <a:rPr lang="en-GB" smtClean="0"/>
-              <a:t>‹Nr.›</a:t>
+            <a:fld id="{18BDFEC3-8487-43E8-A154-7C12CBC1FFF2}" type="slidenum">
+              <a:rPr lang="en-US" smtClean="0"/>
+              <a:t>‹#›</a:t>
             </a:fld>
-            <a:endParaRPr lang="en-GB"/>
+            <a:endParaRPr lang="en-US"/>
           </a:p>
         </p:txBody>
       </p:sp>
     </p:spTree>
     <p:extLst>
       <p:ext uri="{BB962C8B-B14F-4D97-AF65-F5344CB8AC3E}">
-        <p14:creationId xmlns:p14="http://schemas.microsoft.com/office/powerpoint/2010/main" val="322315495"/>
+        <p14:creationId xmlns:p14="http://schemas.microsoft.com/office/powerpoint/2010/main" val="3782709779"/>
       </p:ext>
     </p:extLst>
   </p:cSld>
@@ -479,9 +478,9 @@
 </p:notesMaster>
 </file>
 
-<file path=ppt/slideLayouts/slideLayout1.xml><?xml version="1.0" encoding="utf-8"?>
-<p:sldLayout xmlns:a="http://schemas.openxmlformats.org/drawingml/2006/main" xmlns:r="http://schemas.openxmlformats.org/officeDocument/2006/relationships" xmlns:p="http://schemas.openxmlformats.org/presentationml/2006/main" type="title" preserve="1">
-  <p:cSld name="1_Title Slide">
+<file path=ppt/notesSlides/notesSlide1.xml><?xml version="1.0" encoding="utf-8"?>
+<p:notes xmlns:a="http://schemas.openxmlformats.org/drawingml/2006/main" xmlns:r="http://schemas.openxmlformats.org/officeDocument/2006/relationships" xmlns:p="http://schemas.openxmlformats.org/presentationml/2006/main">
+  <p:cSld>
     <p:spTree>
       <p:nvGrpSpPr>
         <p:cNvPr id="1" name=""/>
@@ -498,31 +497,52 @@
       </p:grpSpPr>
       <p:sp>
         <p:nvSpPr>
-          <p:cNvPr id="2" name="Title 1"/>
-          <p:cNvSpPr>
-            <a:spLocks noGrp="1"/>
-          </p:cNvSpPr>
-          <p:nvPr>
-            <p:ph type="ctrTitle"/>
+          <p:cNvPr id="2" name="Slide Image Placeholder 1"/>
+          <p:cNvSpPr>
+            <a:spLocks noGrp="1" noRot="1" noChangeAspect="1"/>
+          </p:cNvSpPr>
+          <p:nvPr>
+            <p:ph type="sldImg"/>
           </p:nvPr>
         </p:nvSpPr>
         <p:spPr>
           <a:xfrm>
-            <a:off x="726621" y="935302"/>
-            <a:ext cx="7274379" cy="1989667"/>
+            <a:off x="685800" y="1143000"/>
+            <a:ext cx="5486400" cy="3086100"/>
           </a:xfrm>
         </p:spPr>
-        <p:txBody>
-          <a:bodyPr anchor="b"/>
-          <a:lstStyle>
-            <a:lvl1pPr algn="l">
-              <a:defRPr sz="4000"/>
-            </a:lvl1pPr>
-          </a:lstStyle>
-          <a:p>
-            <a:r>
-              <a:rPr lang="en-US"/>
-              <a:t>Click to edit Master title style</a:t>
+      </p:sp>
+      <p:sp>
+        <p:nvSpPr>
+          <p:cNvPr id="3" name="Notes Placeholder 2"/>
+          <p:cNvSpPr>
+            <a:spLocks noGrp="1"/>
+          </p:cNvSpPr>
+          <p:nvPr>
+            <p:ph type="body" idx="1"/>
+          </p:nvPr>
+        </p:nvSpPr>
+        <p:spPr/>
+        <p:txBody>
+          <a:bodyPr/>
+          <a:lstStyle/>
+          <a:p>
+            <a:r>
+              <a:rPr lang="en-US" dirty="0"/>
+              <a:t>Here</a:t>
+            </a:r>
+            <a:r>
+              <a:rPr lang="en-US" baseline="0" dirty="0"/>
+              <a:t> is a note</a:t>
+            </a:r>
+          </a:p>
+          <a:p>
+            <a:endParaRPr lang="en-US" baseline="0" dirty="0"/>
+          </a:p>
+          <a:p>
+            <a:r>
+              <a:rPr lang="en-US" baseline="0" dirty="0"/>
+              <a:t>With another paragraph.</a:t>
             </a:r>
             <a:endParaRPr lang="en-US" dirty="0"/>
           </a:p>
@@ -530,165 +550,718 @@
       </p:sp>
       <p:sp>
         <p:nvSpPr>
-          <p:cNvPr id="3" name="Subtitle 2"/>
-          <p:cNvSpPr>
-            <a:spLocks noGrp="1"/>
-          </p:cNvSpPr>
-          <p:nvPr>
-            <p:ph type="subTitle" idx="1"/>
-          </p:nvPr>
-        </p:nvSpPr>
-        <p:spPr>
-          <a:xfrm>
-            <a:off x="726621" y="3001698"/>
-            <a:ext cx="7274379" cy="1379802"/>
-          </a:xfrm>
-        </p:spPr>
-        <p:txBody>
-          <a:bodyPr/>
-          <a:lstStyle>
-            <a:lvl1pPr marL="0" indent="0" algn="l">
-              <a:buNone/>
-              <a:defRPr sz="1800"/>
-            </a:lvl1pPr>
-            <a:lvl2pPr marL="342900" indent="0" algn="ctr">
-              <a:buNone/>
-              <a:defRPr sz="1500"/>
-            </a:lvl2pPr>
-            <a:lvl3pPr marL="685800" indent="0" algn="ctr">
-              <a:buNone/>
-              <a:defRPr sz="1350"/>
-            </a:lvl3pPr>
-            <a:lvl4pPr marL="1028700" indent="0" algn="ctr">
-              <a:buNone/>
-              <a:defRPr sz="1200"/>
-            </a:lvl4pPr>
-            <a:lvl5pPr marL="1371600" indent="0" algn="ctr">
-              <a:buNone/>
-              <a:defRPr sz="1200"/>
-            </a:lvl5pPr>
-            <a:lvl6pPr marL="1714500" indent="0" algn="ctr">
-              <a:buNone/>
-              <a:defRPr sz="1200"/>
-            </a:lvl6pPr>
-            <a:lvl7pPr marL="2057400" indent="0" algn="ctr">
-              <a:buNone/>
-              <a:defRPr sz="1200"/>
-            </a:lvl7pPr>
-            <a:lvl8pPr marL="2400300" indent="0" algn="ctr">
-              <a:buNone/>
-              <a:defRPr sz="1200"/>
-            </a:lvl8pPr>
-            <a:lvl9pPr marL="2743200" indent="0" algn="ctr">
-              <a:buNone/>
-              <a:defRPr sz="1200"/>
-            </a:lvl9pPr>
-          </a:lstStyle>
-          <a:p>
-            <a:r>
-              <a:rPr lang="en-US"/>
-              <a:t>Click to edit Master subtitle style</a:t>
-            </a:r>
-            <a:endParaRPr lang="en-US" dirty="0"/>
-          </a:p>
-        </p:txBody>
-      </p:sp>
-      <p:sp>
-        <p:nvSpPr>
-          <p:cNvPr id="4" name="Datumsplatzhalter 3">
-            <a:extLst>
-              <a:ext uri="{FF2B5EF4-FFF2-40B4-BE49-F238E27FC236}">
-                <a16:creationId xmlns:a16="http://schemas.microsoft.com/office/drawing/2014/main" id="{EFA66E54-C5DF-2A42-823E-BB2E1565128A}"/>
-              </a:ext>
-            </a:extLst>
-          </p:cNvPr>
-          <p:cNvSpPr>
-            <a:spLocks noGrp="1"/>
-          </p:cNvSpPr>
-          <p:nvPr>
-            <p:ph type="dt" sz="half" idx="10"/>
-          </p:nvPr>
-        </p:nvSpPr>
-        <p:spPr/>
-        <p:txBody>
-          <a:bodyPr/>
-          <a:lstStyle/>
-          <a:p>
-            <a:fld id="{43455C3B-440F-3444-BF75-9806704B7A54}" type="datetime1">
-              <a:rPr lang="de-DE" smtClean="0"/>
-              <a:t>02.06.21</a:t>
+          <p:cNvPr id="4" name="Slide Number Placeholder 3"/>
+          <p:cNvSpPr>
+            <a:spLocks noGrp="1"/>
+          </p:cNvSpPr>
+          <p:nvPr>
+            <p:ph type="sldNum" sz="quarter" idx="10"/>
+          </p:nvPr>
+        </p:nvSpPr>
+        <p:spPr/>
+        <p:txBody>
+          <a:bodyPr/>
+          <a:lstStyle/>
+          <a:p>
+            <a:fld id="{18BDFEC3-8487-43E8-A154-7C12CBC1FFF2}" type="slidenum">
+              <a:rPr lang="en-US" smtClean="0"/>
+              <a:t>1</a:t>
             </a:fld>
-            <a:endParaRPr lang="en-US" dirty="0"/>
-          </a:p>
-        </p:txBody>
-      </p:sp>
-      <p:sp>
-        <p:nvSpPr>
-          <p:cNvPr id="7" name="Foliennummernplatzhalter 6">
-            <a:extLst>
-              <a:ext uri="{FF2B5EF4-FFF2-40B4-BE49-F238E27FC236}">
-                <a16:creationId xmlns:a16="http://schemas.microsoft.com/office/drawing/2014/main" id="{6E5995EC-E956-1242-830B-680F8C6F66A4}"/>
-              </a:ext>
-            </a:extLst>
-          </p:cNvPr>
-          <p:cNvSpPr>
-            <a:spLocks noGrp="1"/>
-          </p:cNvSpPr>
-          <p:nvPr>
-            <p:ph type="sldNum" sz="quarter" idx="12"/>
-          </p:nvPr>
-        </p:nvSpPr>
-        <p:spPr/>
-        <p:txBody>
-          <a:bodyPr/>
-          <a:lstStyle>
-            <a:lvl1pPr algn="ctr">
-              <a:defRPr/>
-            </a:lvl1pPr>
-          </a:lstStyle>
-          <a:p>
-            <a:fld id="{F9EA80F1-969D-7843-BBE2-853A1F17A34A}" type="slidenum">
-              <a:rPr lang="en-GB" smtClean="0"/>
-              <a:pPr/>
-              <a:t>‹Nr.›</a:t>
-            </a:fld>
-            <a:endParaRPr lang="en-GB" dirty="0"/>
-          </a:p>
-        </p:txBody>
-      </p:sp>
-      <p:pic>
-        <p:nvPicPr>
-          <p:cNvPr id="9" name="Grafik 8">
-            <a:extLst>
-              <a:ext uri="{FF2B5EF4-FFF2-40B4-BE49-F238E27FC236}">
-                <a16:creationId xmlns:a16="http://schemas.microsoft.com/office/drawing/2014/main" id="{8B63EA74-7915-BA48-86D8-AE35814BEB54}"/>
-              </a:ext>
-            </a:extLst>
-          </p:cNvPr>
-          <p:cNvPicPr>
-            <a:picLocks noChangeAspect="1"/>
-          </p:cNvPicPr>
-          <p:nvPr userDrawn="1"/>
-        </p:nvPicPr>
-        <p:blipFill rotWithShape="1">
-          <a:blip r:embed="rId2"/>
-          <a:srcRect r="40898" b="4729"/>
-          <a:stretch/>
-        </p:blipFill>
-        <p:spPr>
-          <a:xfrm>
-            <a:off x="215502" y="47760"/>
-            <a:ext cx="2859741" cy="447678"/>
-          </a:xfrm>
-          <a:prstGeom prst="rect">
-            <a:avLst/>
-          </a:prstGeom>
-        </p:spPr>
-      </p:pic>
+            <a:endParaRPr lang="en-US"/>
+          </a:p>
+        </p:txBody>
+      </p:sp>
     </p:spTree>
     <p:extLst>
       <p:ext uri="{BB962C8B-B14F-4D97-AF65-F5344CB8AC3E}">
-        <p14:creationId xmlns:p14="http://schemas.microsoft.com/office/powerpoint/2010/main" val="3304490913"/>
+        <p14:creationId xmlns:p14="http://schemas.microsoft.com/office/powerpoint/2010/main" val="3171319170"/>
+      </p:ext>
+    </p:extLst>
+  </p:cSld>
+  <p:clrMapOvr>
+    <a:masterClrMapping/>
+  </p:clrMapOvr>
+</p:notes>
+</file>
+
+<file path=ppt/notesSlides/notesSlide2.xml><?xml version="1.0" encoding="utf-8"?>
+<p:notes xmlns:a="http://schemas.openxmlformats.org/drawingml/2006/main" xmlns:r="http://schemas.openxmlformats.org/officeDocument/2006/relationships" xmlns:p="http://schemas.openxmlformats.org/presentationml/2006/main">
+  <p:cSld>
+    <p:spTree>
+      <p:nvGrpSpPr>
+        <p:cNvPr id="1" name=""/>
+        <p:cNvGrpSpPr/>
+        <p:nvPr/>
+      </p:nvGrpSpPr>
+      <p:grpSpPr>
+        <a:xfrm>
+          <a:off x="0" y="0"/>
+          <a:ext cx="0" cy="0"/>
+          <a:chOff x="0" y="0"/>
+          <a:chExt cx="0" cy="0"/>
+        </a:xfrm>
+      </p:grpSpPr>
+      <p:sp>
+        <p:nvSpPr>
+          <p:cNvPr id="2" name="Slide Image Placeholder 1"/>
+          <p:cNvSpPr>
+            <a:spLocks noGrp="1" noRot="1" noChangeAspect="1"/>
+          </p:cNvSpPr>
+          <p:nvPr>
+            <p:ph type="sldImg"/>
+          </p:nvPr>
+        </p:nvSpPr>
+        <p:spPr>
+          <a:xfrm>
+            <a:off x="685800" y="1143000"/>
+            <a:ext cx="5486400" cy="3086100"/>
+          </a:xfrm>
+        </p:spPr>
+      </p:sp>
+      <p:sp>
+        <p:nvSpPr>
+          <p:cNvPr id="3" name="Notes Placeholder 2"/>
+          <p:cNvSpPr>
+            <a:spLocks noGrp="1"/>
+          </p:cNvSpPr>
+          <p:nvPr>
+            <p:ph type="body" idx="1"/>
+          </p:nvPr>
+        </p:nvSpPr>
+        <p:spPr/>
+        <p:txBody>
+          <a:bodyPr/>
+          <a:lstStyle/>
+          <a:p>
+            <a:r>
+              <a:rPr lang="en-US" dirty="0"/>
+              <a:t>A</a:t>
+            </a:r>
+            <a:r>
+              <a:rPr lang="en-US" baseline="0" dirty="0"/>
+              <a:t> speaker note on </a:t>
+            </a:r>
+            <a:r>
+              <a:rPr lang="en-US" baseline="0"/>
+              <a:t>this slide too.</a:t>
+            </a:r>
+            <a:endParaRPr lang="en-US"/>
+          </a:p>
+        </p:txBody>
+      </p:sp>
+      <p:sp>
+        <p:nvSpPr>
+          <p:cNvPr id="4" name="Slide Number Placeholder 3"/>
+          <p:cNvSpPr>
+            <a:spLocks noGrp="1"/>
+          </p:cNvSpPr>
+          <p:nvPr>
+            <p:ph type="sldNum" sz="quarter" idx="10"/>
+          </p:nvPr>
+        </p:nvSpPr>
+        <p:spPr/>
+        <p:txBody>
+          <a:bodyPr/>
+          <a:lstStyle/>
+          <a:p>
+            <a:fld id="{18BDFEC3-8487-43E8-A154-7C12CBC1FFF2}" type="slidenum">
+              <a:rPr lang="en-US" smtClean="0"/>
+              <a:t>2</a:t>
+            </a:fld>
+            <a:endParaRPr lang="en-US"/>
+          </a:p>
+        </p:txBody>
+      </p:sp>
+    </p:spTree>
+    <p:extLst>
+      <p:ext uri="{BB962C8B-B14F-4D97-AF65-F5344CB8AC3E}">
+        <p14:creationId xmlns:p14="http://schemas.microsoft.com/office/powerpoint/2010/main" val="3016900036"/>
+      </p:ext>
+    </p:extLst>
+  </p:cSld>
+  <p:clrMapOvr>
+    <a:masterClrMapping/>
+  </p:clrMapOvr>
+</p:notes>
+</file>
+
+<file path=ppt/slideLayouts/slideLayout1.xml><?xml version="1.0" encoding="utf-8"?>
+<p:sldLayout xmlns:a="http://schemas.openxmlformats.org/drawingml/2006/main" xmlns:r="http://schemas.openxmlformats.org/officeDocument/2006/relationships" xmlns:p="http://schemas.openxmlformats.org/presentationml/2006/main" type="title" preserve="1">
+  <p:cSld name="Title Slide">
+    <p:spTree>
+      <p:nvGrpSpPr>
+        <p:cNvPr id="1" name=""/>
+        <p:cNvGrpSpPr/>
+        <p:nvPr/>
+      </p:nvGrpSpPr>
+      <p:grpSpPr>
+        <a:xfrm>
+          <a:off x="0" y="0"/>
+          <a:ext cx="0" cy="0"/>
+          <a:chOff x="0" y="0"/>
+          <a:chExt cx="0" cy="0"/>
+        </a:xfrm>
+      </p:grpSpPr>
+      <p:sp>
+        <p:nvSpPr>
+          <p:cNvPr id="2" name="Title 1"/>
+          <p:cNvSpPr>
+            <a:spLocks noGrp="1"/>
+          </p:cNvSpPr>
+          <p:nvPr>
+            <p:ph type="ctrTitle"/>
+          </p:nvPr>
+        </p:nvSpPr>
+        <p:spPr>
+          <a:xfrm>
+            <a:off x="685800" y="1597819"/>
+            <a:ext cx="7772400" cy="1102519"/>
+          </a:xfrm>
+        </p:spPr>
+        <p:txBody>
+          <a:bodyPr/>
+          <a:lstStyle/>
+          <a:p>
+            <a:r>
+              <a:rPr lang="en-US"/>
+              <a:t>Click to edit Master title style</a:t>
+            </a:r>
+          </a:p>
+        </p:txBody>
+      </p:sp>
+      <p:sp>
+        <p:nvSpPr>
+          <p:cNvPr id="3" name="Subtitle 2"/>
+          <p:cNvSpPr>
+            <a:spLocks noGrp="1"/>
+          </p:cNvSpPr>
+          <p:nvPr>
+            <p:ph type="subTitle" idx="1"/>
+          </p:nvPr>
+        </p:nvSpPr>
+        <p:spPr>
+          <a:xfrm>
+            <a:off x="1371600" y="2914650"/>
+            <a:ext cx="6400800" cy="1314450"/>
+          </a:xfrm>
+        </p:spPr>
+        <p:txBody>
+          <a:bodyPr/>
+          <a:lstStyle>
+            <a:lvl1pPr marL="0" indent="0" algn="ctr">
+              <a:buNone/>
+              <a:defRPr>
+                <a:solidFill>
+                  <a:schemeClr val="tx1">
+                    <a:tint val="75000"/>
+                  </a:schemeClr>
+                </a:solidFill>
+              </a:defRPr>
+            </a:lvl1pPr>
+            <a:lvl2pPr marL="342900" indent="0" algn="ctr">
+              <a:buNone/>
+              <a:defRPr>
+                <a:solidFill>
+                  <a:schemeClr val="tx1">
+                    <a:tint val="75000"/>
+                  </a:schemeClr>
+                </a:solidFill>
+              </a:defRPr>
+            </a:lvl2pPr>
+            <a:lvl3pPr marL="685800" indent="0" algn="ctr">
+              <a:buNone/>
+              <a:defRPr>
+                <a:solidFill>
+                  <a:schemeClr val="tx1">
+                    <a:tint val="75000"/>
+                  </a:schemeClr>
+                </a:solidFill>
+              </a:defRPr>
+            </a:lvl3pPr>
+            <a:lvl4pPr marL="1028700" indent="0" algn="ctr">
+              <a:buNone/>
+              <a:defRPr>
+                <a:solidFill>
+                  <a:schemeClr val="tx1">
+                    <a:tint val="75000"/>
+                  </a:schemeClr>
+                </a:solidFill>
+              </a:defRPr>
+            </a:lvl4pPr>
+            <a:lvl5pPr marL="1371600" indent="0" algn="ctr">
+              <a:buNone/>
+              <a:defRPr>
+                <a:solidFill>
+                  <a:schemeClr val="tx1">
+                    <a:tint val="75000"/>
+                  </a:schemeClr>
+                </a:solidFill>
+              </a:defRPr>
+            </a:lvl5pPr>
+            <a:lvl6pPr marL="1714500" indent="0" algn="ctr">
+              <a:buNone/>
+              <a:defRPr>
+                <a:solidFill>
+                  <a:schemeClr val="tx1">
+                    <a:tint val="75000"/>
+                  </a:schemeClr>
+                </a:solidFill>
+              </a:defRPr>
+            </a:lvl6pPr>
+            <a:lvl7pPr marL="2057400" indent="0" algn="ctr">
+              <a:buNone/>
+              <a:defRPr>
+                <a:solidFill>
+                  <a:schemeClr val="tx1">
+                    <a:tint val="75000"/>
+                  </a:schemeClr>
+                </a:solidFill>
+              </a:defRPr>
+            </a:lvl7pPr>
+            <a:lvl8pPr marL="2400300" indent="0" algn="ctr">
+              <a:buNone/>
+              <a:defRPr>
+                <a:solidFill>
+                  <a:schemeClr val="tx1">
+                    <a:tint val="75000"/>
+                  </a:schemeClr>
+                </a:solidFill>
+              </a:defRPr>
+            </a:lvl8pPr>
+            <a:lvl9pPr marL="2743200" indent="0" algn="ctr">
+              <a:buNone/>
+              <a:defRPr>
+                <a:solidFill>
+                  <a:schemeClr val="tx1">
+                    <a:tint val="75000"/>
+                  </a:schemeClr>
+                </a:solidFill>
+              </a:defRPr>
+            </a:lvl9pPr>
+          </a:lstStyle>
+          <a:p>
+            <a:r>
+              <a:rPr lang="en-US"/>
+              <a:t>Click to edit Master subtitle style</a:t>
+            </a:r>
+          </a:p>
+        </p:txBody>
+      </p:sp>
+      <p:sp>
+        <p:nvSpPr>
+          <p:cNvPr id="4" name="Date Placeholder 3"/>
+          <p:cNvSpPr>
+            <a:spLocks noGrp="1"/>
+          </p:cNvSpPr>
+          <p:nvPr>
+            <p:ph type="dt" sz="half" idx="10"/>
+          </p:nvPr>
+        </p:nvSpPr>
+        <p:spPr/>
+        <p:txBody>
+          <a:bodyPr/>
+          <a:lstStyle/>
+          <a:p>
+            <a:fld id="{241EB5C9-1307-BA42-ABA2-0BC069CD8E7F}" type="datetimeFigureOut">
+              <a:rPr lang="en-US" smtClean="0"/>
+              <a:t>1/2/22</a:t>
+            </a:fld>
+            <a:endParaRPr lang="en-US"/>
+          </a:p>
+        </p:txBody>
+      </p:sp>
+      <p:sp>
+        <p:nvSpPr>
+          <p:cNvPr id="5" name="Footer Placeholder 4"/>
+          <p:cNvSpPr>
+            <a:spLocks noGrp="1"/>
+          </p:cNvSpPr>
+          <p:nvPr>
+            <p:ph type="ftr" sz="quarter" idx="11"/>
+          </p:nvPr>
+        </p:nvSpPr>
+        <p:spPr/>
+        <p:txBody>
+          <a:bodyPr/>
+          <a:lstStyle/>
+          <a:p>
+            <a:endParaRPr lang="en-US"/>
+          </a:p>
+        </p:txBody>
+      </p:sp>
+      <p:sp>
+        <p:nvSpPr>
+          <p:cNvPr id="6" name="Slide Number Placeholder 5"/>
+          <p:cNvSpPr>
+            <a:spLocks noGrp="1"/>
+          </p:cNvSpPr>
+          <p:nvPr>
+            <p:ph type="sldNum" sz="quarter" idx="12"/>
+          </p:nvPr>
+        </p:nvSpPr>
+        <p:spPr/>
+        <p:txBody>
+          <a:bodyPr/>
+          <a:lstStyle/>
+          <a:p>
+            <a:fld id="{C5EF2332-01BF-834F-8236-50238282D533}" type="slidenum">
+              <a:rPr lang="en-US" smtClean="0"/>
+              <a:t>‹#›</a:t>
+            </a:fld>
+            <a:endParaRPr lang="en-US"/>
+          </a:p>
+        </p:txBody>
+      </p:sp>
+    </p:spTree>
+    <p:extLst>
+      <p:ext uri="{BB962C8B-B14F-4D97-AF65-F5344CB8AC3E}">
+        <p14:creationId xmlns:p14="http://schemas.microsoft.com/office/powerpoint/2010/main" val="1444357513"/>
+      </p:ext>
+    </p:extLst>
+  </p:cSld>
+  <p:clrMapOvr>
+    <a:masterClrMapping/>
+  </p:clrMapOvr>
+</p:sldLayout>
+</file>
+
+<file path=ppt/slideLayouts/slideLayout10.xml><?xml version="1.0" encoding="utf-8"?>
+<p:sldLayout xmlns:a="http://schemas.openxmlformats.org/drawingml/2006/main" xmlns:r="http://schemas.openxmlformats.org/officeDocument/2006/relationships" xmlns:p="http://schemas.openxmlformats.org/presentationml/2006/main" type="vertTx" preserve="1">
+  <p:cSld name="Title and Vertical Text">
+    <p:spTree>
+      <p:nvGrpSpPr>
+        <p:cNvPr id="1" name=""/>
+        <p:cNvGrpSpPr/>
+        <p:nvPr/>
+      </p:nvGrpSpPr>
+      <p:grpSpPr>
+        <a:xfrm>
+          <a:off x="0" y="0"/>
+          <a:ext cx="0" cy="0"/>
+          <a:chOff x="0" y="0"/>
+          <a:chExt cx="0" cy="0"/>
+        </a:xfrm>
+      </p:grpSpPr>
+      <p:sp>
+        <p:nvSpPr>
+          <p:cNvPr id="2" name="Title 1"/>
+          <p:cNvSpPr>
+            <a:spLocks noGrp="1"/>
+          </p:cNvSpPr>
+          <p:nvPr>
+            <p:ph type="title"/>
+          </p:nvPr>
+        </p:nvSpPr>
+        <p:spPr/>
+        <p:txBody>
+          <a:bodyPr/>
+          <a:lstStyle/>
+          <a:p>
+            <a:r>
+              <a:rPr lang="en-US"/>
+              <a:t>Click to edit Master title style</a:t>
+            </a:r>
+          </a:p>
+        </p:txBody>
+      </p:sp>
+      <p:sp>
+        <p:nvSpPr>
+          <p:cNvPr id="3" name="Vertical Text Placeholder 2"/>
+          <p:cNvSpPr>
+            <a:spLocks noGrp="1"/>
+          </p:cNvSpPr>
+          <p:nvPr>
+            <p:ph type="body" orient="vert" idx="1"/>
+          </p:nvPr>
+        </p:nvSpPr>
+        <p:spPr/>
+        <p:txBody>
+          <a:bodyPr vert="eaVert"/>
+          <a:lstStyle/>
+          <a:p>
+            <a:pPr lvl="0"/>
+            <a:r>
+              <a:rPr lang="en-US"/>
+              <a:t>Click to edit Master text styles</a:t>
+            </a:r>
+          </a:p>
+          <a:p>
+            <a:pPr lvl="1"/>
+            <a:r>
+              <a:rPr lang="en-US"/>
+              <a:t>Second level</a:t>
+            </a:r>
+          </a:p>
+          <a:p>
+            <a:pPr lvl="2"/>
+            <a:r>
+              <a:rPr lang="en-US"/>
+              <a:t>Third level</a:t>
+            </a:r>
+          </a:p>
+          <a:p>
+            <a:pPr lvl="3"/>
+            <a:r>
+              <a:rPr lang="en-US"/>
+              <a:t>Fourth level</a:t>
+            </a:r>
+          </a:p>
+          <a:p>
+            <a:pPr lvl="4"/>
+            <a:r>
+              <a:rPr lang="en-US"/>
+              <a:t>Fifth level</a:t>
+            </a:r>
+          </a:p>
+        </p:txBody>
+      </p:sp>
+      <p:sp>
+        <p:nvSpPr>
+          <p:cNvPr id="4" name="Date Placeholder 3"/>
+          <p:cNvSpPr>
+            <a:spLocks noGrp="1"/>
+          </p:cNvSpPr>
+          <p:nvPr>
+            <p:ph type="dt" sz="half" idx="10"/>
+          </p:nvPr>
+        </p:nvSpPr>
+        <p:spPr/>
+        <p:txBody>
+          <a:bodyPr/>
+          <a:lstStyle/>
+          <a:p>
+            <a:fld id="{241EB5C9-1307-BA42-ABA2-0BC069CD8E7F}" type="datetimeFigureOut">
+              <a:rPr lang="en-US" smtClean="0"/>
+              <a:t>1/2/22</a:t>
+            </a:fld>
+            <a:endParaRPr lang="en-US"/>
+          </a:p>
+        </p:txBody>
+      </p:sp>
+      <p:sp>
+        <p:nvSpPr>
+          <p:cNvPr id="5" name="Footer Placeholder 4"/>
+          <p:cNvSpPr>
+            <a:spLocks noGrp="1"/>
+          </p:cNvSpPr>
+          <p:nvPr>
+            <p:ph type="ftr" sz="quarter" idx="11"/>
+          </p:nvPr>
+        </p:nvSpPr>
+        <p:spPr/>
+        <p:txBody>
+          <a:bodyPr/>
+          <a:lstStyle/>
+          <a:p>
+            <a:endParaRPr lang="en-US"/>
+          </a:p>
+        </p:txBody>
+      </p:sp>
+      <p:sp>
+        <p:nvSpPr>
+          <p:cNvPr id="6" name="Slide Number Placeholder 5"/>
+          <p:cNvSpPr>
+            <a:spLocks noGrp="1"/>
+          </p:cNvSpPr>
+          <p:nvPr>
+            <p:ph type="sldNum" sz="quarter" idx="12"/>
+          </p:nvPr>
+        </p:nvSpPr>
+        <p:spPr/>
+        <p:txBody>
+          <a:bodyPr/>
+          <a:lstStyle/>
+          <a:p>
+            <a:fld id="{C5EF2332-01BF-834F-8236-50238282D533}" type="slidenum">
+              <a:rPr lang="en-US" smtClean="0"/>
+              <a:t>‹#›</a:t>
+            </a:fld>
+            <a:endParaRPr lang="en-US"/>
+          </a:p>
+        </p:txBody>
+      </p:sp>
+    </p:spTree>
+    <p:extLst>
+      <p:ext uri="{BB962C8B-B14F-4D97-AF65-F5344CB8AC3E}">
+        <p14:creationId xmlns:p14="http://schemas.microsoft.com/office/powerpoint/2010/main" val="313914798"/>
+      </p:ext>
+    </p:extLst>
+  </p:cSld>
+  <p:clrMapOvr>
+    <a:masterClrMapping/>
+  </p:clrMapOvr>
+</p:sldLayout>
+</file>
+
+<file path=ppt/slideLayouts/slideLayout11.xml><?xml version="1.0" encoding="utf-8"?>
+<p:sldLayout xmlns:a="http://schemas.openxmlformats.org/drawingml/2006/main" xmlns:r="http://schemas.openxmlformats.org/officeDocument/2006/relationships" xmlns:p="http://schemas.openxmlformats.org/presentationml/2006/main" type="vertTitleAndTx" preserve="1">
+  <p:cSld name="Vertical Title and Text">
+    <p:spTree>
+      <p:nvGrpSpPr>
+        <p:cNvPr id="1" name=""/>
+        <p:cNvGrpSpPr/>
+        <p:nvPr/>
+      </p:nvGrpSpPr>
+      <p:grpSpPr>
+        <a:xfrm>
+          <a:off x="0" y="0"/>
+          <a:ext cx="0" cy="0"/>
+          <a:chOff x="0" y="0"/>
+          <a:chExt cx="0" cy="0"/>
+        </a:xfrm>
+      </p:grpSpPr>
+      <p:sp>
+        <p:nvSpPr>
+          <p:cNvPr id="2" name="Vertical Title 1"/>
+          <p:cNvSpPr>
+            <a:spLocks noGrp="1"/>
+          </p:cNvSpPr>
+          <p:nvPr>
+            <p:ph type="title" orient="vert"/>
+          </p:nvPr>
+        </p:nvSpPr>
+        <p:spPr>
+          <a:xfrm>
+            <a:off x="6629400" y="205979"/>
+            <a:ext cx="2057400" cy="4388644"/>
+          </a:xfrm>
+        </p:spPr>
+        <p:txBody>
+          <a:bodyPr vert="eaVert"/>
+          <a:lstStyle/>
+          <a:p>
+            <a:r>
+              <a:rPr lang="en-US"/>
+              <a:t>Click to edit Master title style</a:t>
+            </a:r>
+          </a:p>
+        </p:txBody>
+      </p:sp>
+      <p:sp>
+        <p:nvSpPr>
+          <p:cNvPr id="3" name="Vertical Text Placeholder 2"/>
+          <p:cNvSpPr>
+            <a:spLocks noGrp="1"/>
+          </p:cNvSpPr>
+          <p:nvPr>
+            <p:ph type="body" orient="vert" idx="1"/>
+          </p:nvPr>
+        </p:nvSpPr>
+        <p:spPr>
+          <a:xfrm>
+            <a:off x="457200" y="205979"/>
+            <a:ext cx="6019800" cy="4388644"/>
+          </a:xfrm>
+        </p:spPr>
+        <p:txBody>
+          <a:bodyPr vert="eaVert"/>
+          <a:lstStyle/>
+          <a:p>
+            <a:pPr lvl="0"/>
+            <a:r>
+              <a:rPr lang="en-US"/>
+              <a:t>Click to edit Master text styles</a:t>
+            </a:r>
+          </a:p>
+          <a:p>
+            <a:pPr lvl="1"/>
+            <a:r>
+              <a:rPr lang="en-US"/>
+              <a:t>Second level</a:t>
+            </a:r>
+          </a:p>
+          <a:p>
+            <a:pPr lvl="2"/>
+            <a:r>
+              <a:rPr lang="en-US"/>
+              <a:t>Third level</a:t>
+            </a:r>
+          </a:p>
+          <a:p>
+            <a:pPr lvl="3"/>
+            <a:r>
+              <a:rPr lang="en-US"/>
+              <a:t>Fourth level</a:t>
+            </a:r>
+          </a:p>
+          <a:p>
+            <a:pPr lvl="4"/>
+            <a:r>
+              <a:rPr lang="en-US"/>
+              <a:t>Fifth level</a:t>
+            </a:r>
+          </a:p>
+        </p:txBody>
+      </p:sp>
+      <p:sp>
+        <p:nvSpPr>
+          <p:cNvPr id="4" name="Date Placeholder 3"/>
+          <p:cNvSpPr>
+            <a:spLocks noGrp="1"/>
+          </p:cNvSpPr>
+          <p:nvPr>
+            <p:ph type="dt" sz="half" idx="10"/>
+          </p:nvPr>
+        </p:nvSpPr>
+        <p:spPr/>
+        <p:txBody>
+          <a:bodyPr/>
+          <a:lstStyle/>
+          <a:p>
+            <a:fld id="{241EB5C9-1307-BA42-ABA2-0BC069CD8E7F}" type="datetimeFigureOut">
+              <a:rPr lang="en-US" smtClean="0"/>
+              <a:t>1/2/22</a:t>
+            </a:fld>
+            <a:endParaRPr lang="en-US"/>
+          </a:p>
+        </p:txBody>
+      </p:sp>
+      <p:sp>
+        <p:nvSpPr>
+          <p:cNvPr id="5" name="Footer Placeholder 4"/>
+          <p:cNvSpPr>
+            <a:spLocks noGrp="1"/>
+          </p:cNvSpPr>
+          <p:nvPr>
+            <p:ph type="ftr" sz="quarter" idx="11"/>
+          </p:nvPr>
+        </p:nvSpPr>
+        <p:spPr/>
+        <p:txBody>
+          <a:bodyPr/>
+          <a:lstStyle/>
+          <a:p>
+            <a:endParaRPr lang="en-US"/>
+          </a:p>
+        </p:txBody>
+      </p:sp>
+      <p:sp>
+        <p:nvSpPr>
+          <p:cNvPr id="6" name="Slide Number Placeholder 5"/>
+          <p:cNvSpPr>
+            <a:spLocks noGrp="1"/>
+          </p:cNvSpPr>
+          <p:nvPr>
+            <p:ph type="sldNum" sz="quarter" idx="12"/>
+          </p:nvPr>
+        </p:nvSpPr>
+        <p:spPr/>
+        <p:txBody>
+          <a:bodyPr/>
+          <a:lstStyle/>
+          <a:p>
+            <a:fld id="{C5EF2332-01BF-834F-8236-50238282D533}" type="slidenum">
+              <a:rPr lang="en-US" smtClean="0"/>
+              <a:t>‹#›</a:t>
+            </a:fld>
+            <a:endParaRPr lang="en-US"/>
+          </a:p>
+        </p:txBody>
+      </p:sp>
+    </p:spTree>
+    <p:extLst>
+      <p:ext uri="{BB962C8B-B14F-4D97-AF65-F5344CB8AC3E}">
+        <p14:creationId xmlns:p14="http://schemas.microsoft.com/office/powerpoint/2010/main" val="2581529045"/>
       </p:ext>
     </p:extLst>
   </p:cSld>
@@ -747,12 +1320,7 @@
             <p:ph idx="1"/>
           </p:nvPr>
         </p:nvSpPr>
-        <p:spPr>
-          <a:xfrm>
-            <a:off x="215502" y="606056"/>
-            <a:ext cx="8715847" cy="4668804"/>
-          </a:xfrm>
-        </p:spPr>
+        <p:spPr/>
         <p:txBody>
           <a:bodyPr/>
           <a:lstStyle/>
@@ -795,13 +1363,7 @@
       </p:sp>
       <p:sp>
         <p:nvSpPr>
-          <p:cNvPr id="7" name="Datumsplatzhalter 6">
-            <a:extLst>
-              <a:ext uri="{FF2B5EF4-FFF2-40B4-BE49-F238E27FC236}">
-                <a16:creationId xmlns:a16="http://schemas.microsoft.com/office/drawing/2014/main" id="{F11C80C7-74DE-4443-BAC3-F53DC65E7ED2}"/>
-              </a:ext>
-            </a:extLst>
-          </p:cNvPr>
+          <p:cNvPr id="4" name="Date Placeholder 3"/>
           <p:cNvSpPr>
             <a:spLocks noGrp="1"/>
           </p:cNvSpPr>
@@ -814,23 +1376,36 @@
           <a:bodyPr/>
           <a:lstStyle/>
           <a:p>
-            <a:fld id="{3D0BEC64-E679-014C-AEF6-E91C7200F0A0}" type="datetime1">
-              <a:rPr lang="de-DE" smtClean="0"/>
-              <a:t>02.06.21</a:t>
+            <a:fld id="{241EB5C9-1307-BA42-ABA2-0BC069CD8E7F}" type="datetimeFigureOut">
+              <a:rPr lang="en-US" smtClean="0"/>
+              <a:t>1/2/22</a:t>
             </a:fld>
-            <a:endParaRPr lang="en-US" dirty="0"/>
-          </a:p>
-        </p:txBody>
-      </p:sp>
-      <p:sp>
-        <p:nvSpPr>
-          <p:cNvPr id="4" name="Foliennummernplatzhalter 3">
-            <a:extLst>
-              <a:ext uri="{FF2B5EF4-FFF2-40B4-BE49-F238E27FC236}">
-                <a16:creationId xmlns:a16="http://schemas.microsoft.com/office/drawing/2014/main" id="{BA9EE7F5-CEBD-3D43-8B32-58FEF54A7161}"/>
-              </a:ext>
-            </a:extLst>
-          </p:cNvPr>
+            <a:endParaRPr lang="en-US"/>
+          </a:p>
+        </p:txBody>
+      </p:sp>
+      <p:sp>
+        <p:nvSpPr>
+          <p:cNvPr id="5" name="Footer Placeholder 4"/>
+          <p:cNvSpPr>
+            <a:spLocks noGrp="1"/>
+          </p:cNvSpPr>
+          <p:nvPr>
+            <p:ph type="ftr" sz="quarter" idx="11"/>
+          </p:nvPr>
+        </p:nvSpPr>
+        <p:spPr/>
+        <p:txBody>
+          <a:bodyPr/>
+          <a:lstStyle/>
+          <a:p>
+            <a:endParaRPr lang="en-US"/>
+          </a:p>
+        </p:txBody>
+      </p:sp>
+      <p:sp>
+        <p:nvSpPr>
+          <p:cNvPr id="6" name="Slide Number Placeholder 5"/>
           <p:cNvSpPr>
             <a:spLocks noGrp="1"/>
           </p:cNvSpPr>
@@ -843,12 +1418,11 @@
           <a:bodyPr/>
           <a:lstStyle/>
           <a:p>
-            <a:fld id="{F9EA80F1-969D-7843-BBE2-853A1F17A34A}" type="slidenum">
-              <a:rPr lang="en-GB" smtClean="0"/>
-              <a:pPr/>
-              <a:t>‹Nr.›</a:t>
+            <a:fld id="{C5EF2332-01BF-834F-8236-50238282D533}" type="slidenum">
+              <a:rPr lang="en-US" smtClean="0"/>
+              <a:t>‹#›</a:t>
             </a:fld>
-            <a:endParaRPr lang="en-GB" dirty="0"/>
+            <a:endParaRPr lang="en-US"/>
           </a:p>
         </p:txBody>
       </p:sp>
@@ -889,26 +1463,26 @@
             <a:spLocks noGrp="1"/>
           </p:cNvSpPr>
           <p:nvPr>
-            <p:ph type="title" hasCustomPrompt="1"/>
+            <p:ph type="title"/>
           </p:nvPr>
         </p:nvSpPr>
         <p:spPr>
           <a:xfrm>
-            <a:off x="685800" y="2364612"/>
-            <a:ext cx="7772400" cy="1135063"/>
+            <a:off x="722313" y="3305176"/>
+            <a:ext cx="7772400" cy="1021556"/>
           </a:xfrm>
         </p:spPr>
         <p:txBody>
           <a:bodyPr anchor="t"/>
           <a:lstStyle>
             <a:lvl1pPr algn="l">
-              <a:defRPr sz="3333" b="0" cap="none"/>
+              <a:defRPr sz="3000" b="1" cap="all"/>
             </a:lvl1pPr>
           </a:lstStyle>
           <a:p>
             <a:r>
-              <a:rPr lang="en-US" dirty="0"/>
-              <a:t>Click to edit master title style</a:t>
+              <a:rPr lang="en-US"/>
+              <a:t>Click to edit Master title style</a:t>
             </a:r>
           </a:p>
         </p:txBody>
@@ -925,8 +1499,8 @@
         </p:nvSpPr>
         <p:spPr>
           <a:xfrm>
-            <a:off x="685800" y="1114456"/>
-            <a:ext cx="7772400" cy="1250156"/>
+            <a:off x="722313" y="2180035"/>
+            <a:ext cx="7772400" cy="1125140"/>
           </a:xfrm>
         </p:spPr>
         <p:txBody>
@@ -934,7 +1508,7 @@
           <a:lstStyle>
             <a:lvl1pPr marL="0" indent="0">
               <a:buNone/>
-              <a:defRPr sz="1667">
+              <a:defRPr sz="1500">
                 <a:solidFill>
                   <a:schemeClr val="tx1">
                     <a:tint val="75000"/>
@@ -942,9 +1516,9 @@
                 </a:solidFill>
               </a:defRPr>
             </a:lvl1pPr>
-            <a:lvl2pPr marL="380985" indent="0">
-              <a:buNone/>
-              <a:defRPr sz="1500">
+            <a:lvl2pPr marL="342900" indent="0">
+              <a:buNone/>
+              <a:defRPr sz="1350">
                 <a:solidFill>
                   <a:schemeClr val="tx1">
                     <a:tint val="75000"/>
@@ -952,9 +1526,9 @@
                 </a:solidFill>
               </a:defRPr>
             </a:lvl2pPr>
-            <a:lvl3pPr marL="761970" indent="0">
-              <a:buNone/>
-              <a:defRPr sz="1333">
+            <a:lvl3pPr marL="685800" indent="0">
+              <a:buNone/>
+              <a:defRPr sz="1200">
                 <a:solidFill>
                   <a:schemeClr val="tx1">
                     <a:tint val="75000"/>
@@ -962,9 +1536,9 @@
                 </a:solidFill>
               </a:defRPr>
             </a:lvl3pPr>
-            <a:lvl4pPr marL="1142954" indent="0">
-              <a:buNone/>
-              <a:defRPr sz="1167">
+            <a:lvl4pPr marL="1028700" indent="0">
+              <a:buNone/>
+              <a:defRPr sz="1050">
                 <a:solidFill>
                   <a:schemeClr val="tx1">
                     <a:tint val="75000"/>
@@ -972,9 +1546,9 @@
                 </a:solidFill>
               </a:defRPr>
             </a:lvl4pPr>
-            <a:lvl5pPr marL="1523939" indent="0">
-              <a:buNone/>
-              <a:defRPr sz="1167">
+            <a:lvl5pPr marL="1371600" indent="0">
+              <a:buNone/>
+              <a:defRPr sz="1050">
                 <a:solidFill>
                   <a:schemeClr val="tx1">
                     <a:tint val="75000"/>
@@ -982,9 +1556,9 @@
                 </a:solidFill>
               </a:defRPr>
             </a:lvl5pPr>
-            <a:lvl6pPr marL="1904924" indent="0">
-              <a:buNone/>
-              <a:defRPr sz="1167">
+            <a:lvl6pPr marL="1714500" indent="0">
+              <a:buNone/>
+              <a:defRPr sz="1050">
                 <a:solidFill>
                   <a:schemeClr val="tx1">
                     <a:tint val="75000"/>
@@ -992,9 +1566,9 @@
                 </a:solidFill>
               </a:defRPr>
             </a:lvl6pPr>
-            <a:lvl7pPr marL="2285909" indent="0">
-              <a:buNone/>
-              <a:defRPr sz="1167">
+            <a:lvl7pPr marL="2057400" indent="0">
+              <a:buNone/>
+              <a:defRPr sz="1050">
                 <a:solidFill>
                   <a:schemeClr val="tx1">
                     <a:tint val="75000"/>
@@ -1002,9 +1576,9 @@
                 </a:solidFill>
               </a:defRPr>
             </a:lvl7pPr>
-            <a:lvl8pPr marL="2666893" indent="0">
-              <a:buNone/>
-              <a:defRPr sz="1167">
+            <a:lvl8pPr marL="2400300" indent="0">
+              <a:buNone/>
+              <a:defRPr sz="1050">
                 <a:solidFill>
                   <a:schemeClr val="tx1">
                     <a:tint val="75000"/>
@@ -1012,9 +1586,9 @@
                 </a:solidFill>
               </a:defRPr>
             </a:lvl8pPr>
-            <a:lvl9pPr marL="3047878" indent="0">
-              <a:buNone/>
-              <a:defRPr sz="1167">
+            <a:lvl9pPr marL="2743200" indent="0">
+              <a:buNone/>
+              <a:defRPr sz="1050">
                 <a:solidFill>
                   <a:schemeClr val="tx1">
                     <a:tint val="75000"/>
@@ -1034,13 +1608,7 @@
       </p:sp>
       <p:sp>
         <p:nvSpPr>
-          <p:cNvPr id="7" name="Datumsplatzhalter 6">
-            <a:extLst>
-              <a:ext uri="{FF2B5EF4-FFF2-40B4-BE49-F238E27FC236}">
-                <a16:creationId xmlns:a16="http://schemas.microsoft.com/office/drawing/2014/main" id="{28BC512F-F983-3643-97D9-57DCD1F3A712}"/>
-              </a:ext>
-            </a:extLst>
-          </p:cNvPr>
+          <p:cNvPr id="4" name="Date Placeholder 3"/>
           <p:cNvSpPr>
             <a:spLocks noGrp="1"/>
           </p:cNvSpPr>
@@ -1053,23 +1621,36 @@
           <a:bodyPr/>
           <a:lstStyle/>
           <a:p>
-            <a:fld id="{ADC17414-75DC-3F4B-882E-C0F2E1328E60}" type="datetime1">
-              <a:rPr lang="de-DE" smtClean="0"/>
-              <a:t>02.06.21</a:t>
+            <a:fld id="{241EB5C9-1307-BA42-ABA2-0BC069CD8E7F}" type="datetimeFigureOut">
+              <a:rPr lang="en-US" smtClean="0"/>
+              <a:t>1/2/22</a:t>
             </a:fld>
-            <a:endParaRPr lang="en-US" dirty="0"/>
-          </a:p>
-        </p:txBody>
-      </p:sp>
-      <p:sp>
-        <p:nvSpPr>
-          <p:cNvPr id="4" name="Foliennummernplatzhalter 3">
-            <a:extLst>
-              <a:ext uri="{FF2B5EF4-FFF2-40B4-BE49-F238E27FC236}">
-                <a16:creationId xmlns:a16="http://schemas.microsoft.com/office/drawing/2014/main" id="{F8A90C43-D22B-234A-A36D-780CCA08584B}"/>
-              </a:ext>
-            </a:extLst>
-          </p:cNvPr>
+            <a:endParaRPr lang="en-US"/>
+          </a:p>
+        </p:txBody>
+      </p:sp>
+      <p:sp>
+        <p:nvSpPr>
+          <p:cNvPr id="5" name="Footer Placeholder 4"/>
+          <p:cNvSpPr>
+            <a:spLocks noGrp="1"/>
+          </p:cNvSpPr>
+          <p:nvPr>
+            <p:ph type="ftr" sz="quarter" idx="11"/>
+          </p:nvPr>
+        </p:nvSpPr>
+        <p:spPr/>
+        <p:txBody>
+          <a:bodyPr/>
+          <a:lstStyle/>
+          <a:p>
+            <a:endParaRPr lang="en-US"/>
+          </a:p>
+        </p:txBody>
+      </p:sp>
+      <p:sp>
+        <p:nvSpPr>
+          <p:cNvPr id="6" name="Slide Number Placeholder 5"/>
           <p:cNvSpPr>
             <a:spLocks noGrp="1"/>
           </p:cNvSpPr>
@@ -1082,44 +1663,14 @@
           <a:bodyPr/>
           <a:lstStyle/>
           <a:p>
-            <a:fld id="{F9EA80F1-969D-7843-BBE2-853A1F17A34A}" type="slidenum">
-              <a:rPr lang="en-GB" smtClean="0"/>
-              <a:pPr/>
-              <a:t>‹Nr.›</a:t>
+            <a:fld id="{C5EF2332-01BF-834F-8236-50238282D533}" type="slidenum">
+              <a:rPr lang="en-US" smtClean="0"/>
+              <a:t>‹#›</a:t>
             </a:fld>
-            <a:endParaRPr lang="en-GB" dirty="0"/>
-          </a:p>
-        </p:txBody>
-      </p:sp>
-      <p:pic>
-        <p:nvPicPr>
-          <p:cNvPr id="10" name="Grafik 9">
-            <a:extLst>
-              <a:ext uri="{FF2B5EF4-FFF2-40B4-BE49-F238E27FC236}">
-                <a16:creationId xmlns:a16="http://schemas.microsoft.com/office/drawing/2014/main" id="{A17ACB65-4367-0242-AE00-A2DEF34F4426}"/>
-              </a:ext>
-            </a:extLst>
-          </p:cNvPr>
-          <p:cNvPicPr>
-            <a:picLocks noChangeAspect="1"/>
-          </p:cNvPicPr>
-          <p:nvPr userDrawn="1"/>
-        </p:nvPicPr>
-        <p:blipFill rotWithShape="1">
-          <a:blip r:embed="rId2"/>
-          <a:srcRect r="40898" b="4729"/>
-          <a:stretch/>
-        </p:blipFill>
-        <p:spPr>
-          <a:xfrm>
-            <a:off x="215502" y="70689"/>
-            <a:ext cx="2859741" cy="447678"/>
-          </a:xfrm>
-          <a:prstGeom prst="rect">
-            <a:avLst/>
-          </a:prstGeom>
-        </p:spPr>
-      </p:pic>
+            <a:endParaRPr lang="en-US"/>
+          </a:p>
+        </p:txBody>
+      </p:sp>
     </p:spTree>
     <p:extLst>
       <p:ext uri="{BB962C8B-B14F-4D97-AF65-F5344CB8AC3E}">
@@ -1184,75 +1735,73 @@
         </p:nvSpPr>
         <p:spPr>
           <a:xfrm>
-            <a:off x="215502" y="593124"/>
-            <a:ext cx="4280298" cy="4668088"/>
+            <a:off x="457200" y="1200151"/>
+            <a:ext cx="4038600" cy="3394472"/>
           </a:xfrm>
         </p:spPr>
         <p:txBody>
-          <a:bodyPr>
-            <a:normAutofit/>
-          </a:bodyPr>
+          <a:bodyPr/>
           <a:lstStyle>
             <a:lvl1pPr>
-              <a:defRPr sz="1600"/>
+              <a:defRPr sz="2100"/>
             </a:lvl1pPr>
             <a:lvl2pPr>
-              <a:defRPr sz="1400"/>
+              <a:defRPr sz="1800"/>
             </a:lvl2pPr>
             <a:lvl3pPr>
-              <a:defRPr sz="1200"/>
+              <a:defRPr sz="1500"/>
             </a:lvl3pPr>
             <a:lvl4pPr>
-              <a:defRPr sz="1100"/>
+              <a:defRPr sz="1350"/>
             </a:lvl4pPr>
             <a:lvl5pPr>
-              <a:defRPr sz="1100"/>
+              <a:defRPr sz="1350"/>
             </a:lvl5pPr>
             <a:lvl6pPr>
-              <a:defRPr sz="1500"/>
+              <a:defRPr sz="1350"/>
             </a:lvl6pPr>
             <a:lvl7pPr>
-              <a:defRPr sz="1500"/>
+              <a:defRPr sz="1350"/>
             </a:lvl7pPr>
             <a:lvl8pPr>
-              <a:defRPr sz="1500"/>
+              <a:defRPr sz="1350"/>
             </a:lvl8pPr>
             <a:lvl9pPr>
-              <a:defRPr sz="1500"/>
+              <a:defRPr sz="1350"/>
             </a:lvl9pPr>
           </a:lstStyle>
           <a:p>
             <a:pPr lvl="0"/>
             <a:r>
-              <a:rPr lang="en-US" dirty="0"/>
+              <a:rPr lang="en-US"/>
               <a:t>Click to edit Master text styles</a:t>
             </a:r>
           </a:p>
           <a:p>
             <a:pPr lvl="1"/>
             <a:r>
-              <a:rPr lang="en-US" dirty="0"/>
+              <a:rPr lang="en-US"/>
               <a:t>Second level</a:t>
             </a:r>
           </a:p>
           <a:p>
             <a:pPr lvl="2"/>
             <a:r>
-              <a:rPr lang="en-US" dirty="0"/>
+              <a:rPr lang="en-US"/>
               <a:t>Third level</a:t>
             </a:r>
           </a:p>
           <a:p>
             <a:pPr lvl="3"/>
             <a:r>
-              <a:rPr lang="en-US" dirty="0"/>
+              <a:rPr lang="en-US"/>
               <a:t>Fourth level</a:t>
             </a:r>
           </a:p>
           <a:p>
             <a:pPr lvl="4"/>
             <a:r>
-              <a:rPr lang="en-US" dirty="0"/>
+              <a:rPr lang="en-US"/>
               <a:t>Fifth level</a:t>
             </a:r>
           </a:p>
@@ -1270,75 +1819,73 @@
         </p:nvSpPr>
         <p:spPr>
           <a:xfrm>
-            <a:off x="4648200" y="593124"/>
-            <a:ext cx="4287040" cy="4668088"/>
+            <a:off x="4648200" y="1200151"/>
+            <a:ext cx="4038600" cy="3394472"/>
           </a:xfrm>
         </p:spPr>
         <p:txBody>
-          <a:bodyPr>
-            <a:normAutofit/>
-          </a:bodyPr>
+          <a:bodyPr/>
           <a:lstStyle>
             <a:lvl1pPr>
-              <a:defRPr sz="1100"/>
+              <a:defRPr sz="2100"/>
             </a:lvl1pPr>
             <a:lvl2pPr>
-              <a:defRPr sz="1050"/>
+              <a:defRPr sz="1800"/>
             </a:lvl2pPr>
             <a:lvl3pPr>
-              <a:defRPr sz="1000"/>
+              <a:defRPr sz="1500"/>
             </a:lvl3pPr>
             <a:lvl4pPr>
-              <a:defRPr sz="900"/>
+              <a:defRPr sz="1350"/>
             </a:lvl4pPr>
             <a:lvl5pPr>
-              <a:defRPr sz="900"/>
+              <a:defRPr sz="1350"/>
             </a:lvl5pPr>
             <a:lvl6pPr>
-              <a:defRPr sz="1500"/>
+              <a:defRPr sz="1350"/>
             </a:lvl6pPr>
             <a:lvl7pPr>
-              <a:defRPr sz="1500"/>
+              <a:defRPr sz="1350"/>
             </a:lvl7pPr>
             <a:lvl8pPr>
-              <a:defRPr sz="1500"/>
+              <a:defRPr sz="1350"/>
             </a:lvl8pPr>
             <a:lvl9pPr>
-              <a:defRPr sz="1500"/>
+              <a:defRPr sz="1350"/>
             </a:lvl9pPr>
           </a:lstStyle>
           <a:p>
             <a:pPr lvl="0"/>
             <a:r>
-              <a:rPr lang="en-US" dirty="0"/>
+              <a:rPr lang="en-US"/>
               <a:t>Click to edit Master text styles</a:t>
             </a:r>
           </a:p>
           <a:p>
             <a:pPr lvl="1"/>
             <a:r>
-              <a:rPr lang="en-US" dirty="0"/>
+              <a:rPr lang="en-US"/>
               <a:t>Second level</a:t>
             </a:r>
           </a:p>
           <a:p>
             <a:pPr lvl="2"/>
             <a:r>
-              <a:rPr lang="en-US" dirty="0"/>
+              <a:rPr lang="en-US"/>
               <a:t>Third level</a:t>
             </a:r>
           </a:p>
           <a:p>
             <a:pPr lvl="3"/>
             <a:r>
-              <a:rPr lang="en-US" dirty="0"/>
+              <a:rPr lang="en-US"/>
               <a:t>Fourth level</a:t>
             </a:r>
           </a:p>
           <a:p>
             <a:pPr lvl="4"/>
             <a:r>
-              <a:rPr lang="en-US" dirty="0"/>
+              <a:rPr lang="en-US"/>
               <a:t>Fifth level</a:t>
             </a:r>
           </a:p>
@@ -1359,9 +1906,9 @@
           <a:bodyPr/>
           <a:lstStyle/>
           <a:p>
-            <a:fld id="{7852884E-CE68-544C-B1BB-49E54F88C9E4}" type="datetime1">
-              <a:rPr lang="de-DE" smtClean="0"/>
-              <a:t>02.06.21</a:t>
+            <a:fld id="{241EB5C9-1307-BA42-ABA2-0BC069CD8E7F}" type="datetimeFigureOut">
+              <a:rPr lang="en-US" smtClean="0"/>
+              <a:t>1/2/22</a:t>
             </a:fld>
             <a:endParaRPr lang="en-US"/>
           </a:p>
@@ -1369,13 +1916,26 @@
       </p:sp>
       <p:sp>
         <p:nvSpPr>
-          <p:cNvPr id="8" name="Foliennummernplatzhalter 7">
-            <a:extLst>
-              <a:ext uri="{FF2B5EF4-FFF2-40B4-BE49-F238E27FC236}">
-                <a16:creationId xmlns:a16="http://schemas.microsoft.com/office/drawing/2014/main" id="{51DFD1E0-BA3B-0143-A836-D1597E41AAA2}"/>
-              </a:ext>
-            </a:extLst>
-          </p:cNvPr>
+          <p:cNvPr id="6" name="Footer Placeholder 5"/>
+          <p:cNvSpPr>
+            <a:spLocks noGrp="1"/>
+          </p:cNvSpPr>
+          <p:nvPr>
+            <p:ph type="ftr" sz="quarter" idx="11"/>
+          </p:nvPr>
+        </p:nvSpPr>
+        <p:spPr/>
+        <p:txBody>
+          <a:bodyPr/>
+          <a:lstStyle/>
+          <a:p>
+            <a:endParaRPr lang="en-US"/>
+          </a:p>
+        </p:txBody>
+      </p:sp>
+      <p:sp>
+        <p:nvSpPr>
+          <p:cNvPr id="7" name="Slide Number Placeholder 6"/>
           <p:cNvSpPr>
             <a:spLocks noGrp="1"/>
           </p:cNvSpPr>
@@ -1388,12 +1948,11 @@
           <a:bodyPr/>
           <a:lstStyle/>
           <a:p>
-            <a:fld id="{F9EA80F1-969D-7843-BBE2-853A1F17A34A}" type="slidenum">
-              <a:rPr lang="en-GB" smtClean="0"/>
-              <a:pPr/>
-              <a:t>‹Nr.›</a:t>
+            <a:fld id="{C5EF2332-01BF-834F-8236-50238282D533}" type="slidenum">
+              <a:rPr lang="en-US" smtClean="0"/>
+              <a:t>‹#›</a:t>
             </a:fld>
-            <a:endParaRPr lang="en-GB" dirty="0"/>
+            <a:endParaRPr lang="en-US"/>
           </a:p>
         </p:txBody>
       </p:sp>
@@ -1465,8 +2024,8 @@
         </p:nvSpPr>
         <p:spPr>
           <a:xfrm>
-            <a:off x="215502" y="599843"/>
-            <a:ext cx="4281886" cy="533135"/>
+            <a:off x="457200" y="1151335"/>
+            <a:ext cx="4040188" cy="479822"/>
           </a:xfrm>
         </p:spPr>
         <p:txBody>
@@ -1474,39 +2033,39 @@
           <a:lstStyle>
             <a:lvl1pPr marL="0" indent="0">
               <a:buNone/>
-              <a:defRPr sz="2000" b="1"/>
+              <a:defRPr sz="1800" b="1"/>
             </a:lvl1pPr>
-            <a:lvl2pPr marL="380985" indent="0">
-              <a:buNone/>
-              <a:defRPr sz="1667" b="1"/>
+            <a:lvl2pPr marL="342900" indent="0">
+              <a:buNone/>
+              <a:defRPr sz="1500" b="1"/>
             </a:lvl2pPr>
-            <a:lvl3pPr marL="761970" indent="0">
-              <a:buNone/>
-              <a:defRPr sz="1500" b="1"/>
+            <a:lvl3pPr marL="685800" indent="0">
+              <a:buNone/>
+              <a:defRPr sz="1350" b="1"/>
             </a:lvl3pPr>
-            <a:lvl4pPr marL="1142954" indent="0">
-              <a:buNone/>
-              <a:defRPr sz="1333" b="1"/>
+            <a:lvl4pPr marL="1028700" indent="0">
+              <a:buNone/>
+              <a:defRPr sz="1200" b="1"/>
             </a:lvl4pPr>
-            <a:lvl5pPr marL="1523939" indent="0">
-              <a:buNone/>
-              <a:defRPr sz="1333" b="1"/>
+            <a:lvl5pPr marL="1371600" indent="0">
+              <a:buNone/>
+              <a:defRPr sz="1200" b="1"/>
             </a:lvl5pPr>
-            <a:lvl6pPr marL="1904924" indent="0">
-              <a:buNone/>
-              <a:defRPr sz="1333" b="1"/>
+            <a:lvl6pPr marL="1714500" indent="0">
+              <a:buNone/>
+              <a:defRPr sz="1200" b="1"/>
             </a:lvl6pPr>
-            <a:lvl7pPr marL="2285909" indent="0">
-              <a:buNone/>
-              <a:defRPr sz="1333" b="1"/>
+            <a:lvl7pPr marL="2057400" indent="0">
+              <a:buNone/>
+              <a:defRPr sz="1200" b="1"/>
             </a:lvl7pPr>
-            <a:lvl8pPr marL="2666893" indent="0">
-              <a:buNone/>
-              <a:defRPr sz="1333" b="1"/>
+            <a:lvl8pPr marL="2400300" indent="0">
+              <a:buNone/>
+              <a:defRPr sz="1200" b="1"/>
             </a:lvl8pPr>
-            <a:lvl9pPr marL="3047878" indent="0">
-              <a:buNone/>
-              <a:defRPr sz="1333" b="1"/>
+            <a:lvl9pPr marL="2743200" indent="0">
+              <a:buNone/>
+              <a:defRPr sz="1200" b="1"/>
             </a:lvl9pPr>
           </a:lstStyle>
           <a:p>
@@ -1530,39 +2089,39 @@
         </p:nvSpPr>
         <p:spPr>
           <a:xfrm>
-            <a:off x="215502" y="1132978"/>
-            <a:ext cx="4281886" cy="4121410"/>
+            <a:off x="457200" y="1631156"/>
+            <a:ext cx="4040188" cy="2963466"/>
           </a:xfrm>
         </p:spPr>
         <p:txBody>
           <a:bodyPr/>
           <a:lstStyle>
             <a:lvl1pPr>
-              <a:defRPr sz="2000"/>
+              <a:defRPr sz="1800"/>
             </a:lvl1pPr>
             <a:lvl2pPr>
-              <a:defRPr sz="1667"/>
+              <a:defRPr sz="1500"/>
             </a:lvl2pPr>
             <a:lvl3pPr>
-              <a:defRPr sz="1500"/>
+              <a:defRPr sz="1350"/>
             </a:lvl3pPr>
             <a:lvl4pPr>
-              <a:defRPr sz="1333"/>
+              <a:defRPr sz="1200"/>
             </a:lvl4pPr>
             <a:lvl5pPr>
-              <a:defRPr sz="1333"/>
+              <a:defRPr sz="1200"/>
             </a:lvl5pPr>
             <a:lvl6pPr>
-              <a:defRPr sz="1333"/>
+              <a:defRPr sz="1200"/>
             </a:lvl6pPr>
             <a:lvl7pPr>
-              <a:defRPr sz="1333"/>
+              <a:defRPr sz="1200"/>
             </a:lvl7pPr>
             <a:lvl8pPr>
-              <a:defRPr sz="1333"/>
+              <a:defRPr sz="1200"/>
             </a:lvl8pPr>
             <a:lvl9pPr>
-              <a:defRPr sz="1333"/>
+              <a:defRPr sz="1200"/>
             </a:lvl9pPr>
           </a:lstStyle>
           <a:p>
@@ -1614,8 +2173,8 @@
         </p:nvSpPr>
         <p:spPr>
           <a:xfrm>
-            <a:off x="4645026" y="599843"/>
-            <a:ext cx="4290214" cy="533135"/>
+            <a:off x="4645026" y="1151335"/>
+            <a:ext cx="4041775" cy="479822"/>
           </a:xfrm>
         </p:spPr>
         <p:txBody>
@@ -1623,39 +2182,39 @@
           <a:lstStyle>
             <a:lvl1pPr marL="0" indent="0">
               <a:buNone/>
-              <a:defRPr sz="2000" b="1"/>
+              <a:defRPr sz="1800" b="1"/>
             </a:lvl1pPr>
-            <a:lvl2pPr marL="380985" indent="0">
-              <a:buNone/>
-              <a:defRPr sz="1667" b="1"/>
+            <a:lvl2pPr marL="342900" indent="0">
+              <a:buNone/>
+              <a:defRPr sz="1500" b="1"/>
             </a:lvl2pPr>
-            <a:lvl3pPr marL="761970" indent="0">
-              <a:buNone/>
-              <a:defRPr sz="1500" b="1"/>
+            <a:lvl3pPr marL="685800" indent="0">
+              <a:buNone/>
+              <a:defRPr sz="1350" b="1"/>
             </a:lvl3pPr>
-            <a:lvl4pPr marL="1142954" indent="0">
-              <a:buNone/>
-              <a:defRPr sz="1333" b="1"/>
+            <a:lvl4pPr marL="1028700" indent="0">
+              <a:buNone/>
+              <a:defRPr sz="1200" b="1"/>
             </a:lvl4pPr>
-            <a:lvl5pPr marL="1523939" indent="0">
-              <a:buNone/>
-              <a:defRPr sz="1333" b="1"/>
+            <a:lvl5pPr marL="1371600" indent="0">
+              <a:buNone/>
+              <a:defRPr sz="1200" b="1"/>
             </a:lvl5pPr>
-            <a:lvl6pPr marL="1904924" indent="0">
-              <a:buNone/>
-              <a:defRPr sz="1333" b="1"/>
+            <a:lvl6pPr marL="1714500" indent="0">
+              <a:buNone/>
+              <a:defRPr sz="1200" b="1"/>
             </a:lvl6pPr>
-            <a:lvl7pPr marL="2285909" indent="0">
-              <a:buNone/>
-              <a:defRPr sz="1333" b="1"/>
+            <a:lvl7pPr marL="2057400" indent="0">
+              <a:buNone/>
+              <a:defRPr sz="1200" b="1"/>
             </a:lvl7pPr>
-            <a:lvl8pPr marL="2666893" indent="0">
-              <a:buNone/>
-              <a:defRPr sz="1333" b="1"/>
+            <a:lvl8pPr marL="2400300" indent="0">
+              <a:buNone/>
+              <a:defRPr sz="1200" b="1"/>
             </a:lvl8pPr>
-            <a:lvl9pPr marL="3047878" indent="0">
-              <a:buNone/>
-              <a:defRPr sz="1333" b="1"/>
+            <a:lvl9pPr marL="2743200" indent="0">
+              <a:buNone/>
+              <a:defRPr sz="1200" b="1"/>
             </a:lvl9pPr>
           </a:lstStyle>
           <a:p>
@@ -1679,39 +2238,39 @@
         </p:nvSpPr>
         <p:spPr>
           <a:xfrm>
-            <a:off x="4645026" y="1132978"/>
-            <a:ext cx="4290214" cy="4121410"/>
+            <a:off x="4645026" y="1631156"/>
+            <a:ext cx="4041775" cy="2963466"/>
           </a:xfrm>
         </p:spPr>
         <p:txBody>
           <a:bodyPr/>
           <a:lstStyle>
             <a:lvl1pPr>
-              <a:defRPr sz="2000"/>
+              <a:defRPr sz="1800"/>
             </a:lvl1pPr>
             <a:lvl2pPr>
-              <a:defRPr sz="1667"/>
+              <a:defRPr sz="1500"/>
             </a:lvl2pPr>
             <a:lvl3pPr>
-              <a:defRPr sz="1500"/>
+              <a:defRPr sz="1350"/>
             </a:lvl3pPr>
             <a:lvl4pPr>
-              <a:defRPr sz="1333"/>
+              <a:defRPr sz="1200"/>
             </a:lvl4pPr>
             <a:lvl5pPr>
-              <a:defRPr sz="1333"/>
+              <a:defRPr sz="1200"/>
             </a:lvl5pPr>
             <a:lvl6pPr>
-              <a:defRPr sz="1333"/>
+              <a:defRPr sz="1200"/>
             </a:lvl6pPr>
             <a:lvl7pPr>
-              <a:defRPr sz="1333"/>
+              <a:defRPr sz="1200"/>
             </a:lvl7pPr>
             <a:lvl8pPr>
-              <a:defRPr sz="1333"/>
+              <a:defRPr sz="1200"/>
             </a:lvl8pPr>
             <a:lvl9pPr>
-              <a:defRPr sz="1333"/>
+              <a:defRPr sz="1200"/>
             </a:lvl9pPr>
           </a:lstStyle>
           <a:p>
@@ -1766,9 +2325,9 @@
           <a:bodyPr/>
           <a:lstStyle/>
           <a:p>
-            <a:fld id="{626AC9F9-D111-D443-B98B-E683038B2C95}" type="datetime1">
-              <a:rPr lang="de-DE" smtClean="0"/>
-              <a:t>02.06.21</a:t>
+            <a:fld id="{241EB5C9-1307-BA42-ABA2-0BC069CD8E7F}" type="datetimeFigureOut">
+              <a:rPr lang="en-US" smtClean="0"/>
+              <a:t>1/2/22</a:t>
             </a:fld>
             <a:endParaRPr lang="en-US"/>
           </a:p>
@@ -1776,13 +2335,26 @@
       </p:sp>
       <p:sp>
         <p:nvSpPr>
-          <p:cNvPr id="10" name="Foliennummernplatzhalter 9">
-            <a:extLst>
-              <a:ext uri="{FF2B5EF4-FFF2-40B4-BE49-F238E27FC236}">
-                <a16:creationId xmlns:a16="http://schemas.microsoft.com/office/drawing/2014/main" id="{38BBB330-D323-0141-B289-0633512A9498}"/>
-              </a:ext>
-            </a:extLst>
-          </p:cNvPr>
+          <p:cNvPr id="8" name="Footer Placeholder 7"/>
+          <p:cNvSpPr>
+            <a:spLocks noGrp="1"/>
+          </p:cNvSpPr>
+          <p:nvPr>
+            <p:ph type="ftr" sz="quarter" idx="11"/>
+          </p:nvPr>
+        </p:nvSpPr>
+        <p:spPr/>
+        <p:txBody>
+          <a:bodyPr/>
+          <a:lstStyle/>
+          <a:p>
+            <a:endParaRPr lang="en-US"/>
+          </a:p>
+        </p:txBody>
+      </p:sp>
+      <p:sp>
+        <p:nvSpPr>
+          <p:cNvPr id="9" name="Slide Number Placeholder 8"/>
           <p:cNvSpPr>
             <a:spLocks noGrp="1"/>
           </p:cNvSpPr>
@@ -1795,12 +2367,11 @@
           <a:bodyPr/>
           <a:lstStyle/>
           <a:p>
-            <a:fld id="{F9EA80F1-969D-7843-BBE2-853A1F17A34A}" type="slidenum">
-              <a:rPr lang="en-GB" smtClean="0"/>
-              <a:pPr/>
-              <a:t>‹Nr.›</a:t>
+            <a:fld id="{C5EF2332-01BF-834F-8236-50238282D533}" type="slidenum">
+              <a:rPr lang="en-US" smtClean="0"/>
+              <a:t>‹#›</a:t>
             </a:fld>
-            <a:endParaRPr lang="en-GB" dirty="0"/>
+            <a:endParaRPr lang="en-US"/>
           </a:p>
         </p:txBody>
       </p:sp>
@@ -1871,550 +2442,56 @@
           <a:bodyPr/>
           <a:lstStyle/>
           <a:p>
-            <a:fld id="{5E69D18E-539F-034A-B24C-86245693B065}" type="datetime1">
-              <a:rPr lang="de-DE" smtClean="0"/>
-              <a:t>02.06.21</a:t>
+            <a:fld id="{241EB5C9-1307-BA42-ABA2-0BC069CD8E7F}" type="datetimeFigureOut">
+              <a:rPr lang="en-US" smtClean="0"/>
+              <a:t>1/2/22</a:t>
             </a:fld>
             <a:endParaRPr lang="en-US"/>
           </a:p>
         </p:txBody>
       </p:sp>
-      <p:graphicFrame>
-        <p:nvGraphicFramePr>
-          <p:cNvPr id="5" name="Tabelle 5">
-            <a:extLst>
-              <a:ext uri="{FF2B5EF4-FFF2-40B4-BE49-F238E27FC236}">
-                <a16:creationId xmlns:a16="http://schemas.microsoft.com/office/drawing/2014/main" id="{596AA12C-0CD8-1546-8DB5-9ED6EBEBDBE8}"/>
-              </a:ext>
-            </a:extLst>
-          </p:cNvPr>
-          <p:cNvGraphicFramePr>
-            <a:graphicFrameLocks noGrp="1"/>
-          </p:cNvGraphicFramePr>
-          <p:nvPr userDrawn="1">
-            <p:extLst>
-              <p:ext uri="{D42A27DB-BD31-4B8C-83A1-F6EECF244321}">
-                <p14:modId xmlns:p14="http://schemas.microsoft.com/office/powerpoint/2010/main" val="3437094589"/>
-              </p:ext>
-            </p:extLst>
-          </p:nvPr>
-        </p:nvGraphicFramePr>
-        <p:xfrm>
-          <a:off x="1524000" y="825500"/>
-          <a:ext cx="6096000" cy="2966720"/>
-        </p:xfrm>
-        <a:graphic>
-          <a:graphicData uri="http://schemas.openxmlformats.org/drawingml/2006/table">
-            <a:tbl>
-              <a:tblPr firstRow="1" bandRow="1">
-                <a:tableStyleId>{9D7B26C5-4107-4FEC-AEDC-1716B250A1EF}</a:tableStyleId>
-              </a:tblPr>
-              <a:tblGrid>
-                <a:gridCol w="1524000">
-                  <a:extLst>
-                    <a:ext uri="{9D8B030D-6E8A-4147-A177-3AD203B41FA5}">
-                      <a16:colId xmlns:a16="http://schemas.microsoft.com/office/drawing/2014/main" val="1725963442"/>
-                    </a:ext>
-                  </a:extLst>
-                </a:gridCol>
-                <a:gridCol w="1524000">
-                  <a:extLst>
-                    <a:ext uri="{9D8B030D-6E8A-4147-A177-3AD203B41FA5}">
-                      <a16:colId xmlns:a16="http://schemas.microsoft.com/office/drawing/2014/main" val="3112989483"/>
-                    </a:ext>
-                  </a:extLst>
-                </a:gridCol>
-                <a:gridCol w="1524000">
-                  <a:extLst>
-                    <a:ext uri="{9D8B030D-6E8A-4147-A177-3AD203B41FA5}">
-                      <a16:colId xmlns:a16="http://schemas.microsoft.com/office/drawing/2014/main" val="1411892367"/>
-                    </a:ext>
-                  </a:extLst>
-                </a:gridCol>
-                <a:gridCol w="1524000">
-                  <a:extLst>
-                    <a:ext uri="{9D8B030D-6E8A-4147-A177-3AD203B41FA5}">
-                      <a16:colId xmlns:a16="http://schemas.microsoft.com/office/drawing/2014/main" val="307689215"/>
-                    </a:ext>
-                  </a:extLst>
-                </a:gridCol>
-              </a:tblGrid>
-              <a:tr h="370840">
-                <a:tc>
-                  <a:txBody>
-                    <a:bodyPr/>
-                    <a:lstStyle/>
-                    <a:p>
-                      <a:endParaRPr lang="en-GB" sz="1000">
-                        <a:latin typeface="Arial" panose="020B0604020202020204" pitchFamily="34" charset="0"/>
-                        <a:cs typeface="Arial" panose="020B0604020202020204" pitchFamily="34" charset="0"/>
-                      </a:endParaRPr>
-                    </a:p>
-                  </a:txBody>
-                  <a:tcPr marL="90000"/>
-                </a:tc>
-                <a:tc>
-                  <a:txBody>
-                    <a:bodyPr/>
-                    <a:lstStyle/>
-                    <a:p>
-                      <a:endParaRPr lang="en-GB" sz="1000" dirty="0">
-                        <a:latin typeface="Arial" panose="020B0604020202020204" pitchFamily="34" charset="0"/>
-                        <a:cs typeface="Arial" panose="020B0604020202020204" pitchFamily="34" charset="0"/>
-                      </a:endParaRPr>
-                    </a:p>
-                  </a:txBody>
-                  <a:tcPr marL="90000"/>
-                </a:tc>
-                <a:tc>
-                  <a:txBody>
-                    <a:bodyPr/>
-                    <a:lstStyle/>
-                    <a:p>
-                      <a:endParaRPr lang="en-GB" sz="1000">
-                        <a:latin typeface="Arial" panose="020B0604020202020204" pitchFamily="34" charset="0"/>
-                        <a:cs typeface="Arial" panose="020B0604020202020204" pitchFamily="34" charset="0"/>
-                      </a:endParaRPr>
-                    </a:p>
-                  </a:txBody>
-                  <a:tcPr marL="90000"/>
-                </a:tc>
-                <a:tc>
-                  <a:txBody>
-                    <a:bodyPr/>
-                    <a:lstStyle/>
-                    <a:p>
-                      <a:endParaRPr lang="en-GB" sz="1000">
-                        <a:latin typeface="Arial" panose="020B0604020202020204" pitchFamily="34" charset="0"/>
-                        <a:cs typeface="Arial" panose="020B0604020202020204" pitchFamily="34" charset="0"/>
-                      </a:endParaRPr>
-                    </a:p>
-                  </a:txBody>
-                  <a:tcPr marL="90000"/>
-                </a:tc>
-                <a:extLst>
-                  <a:ext uri="{0D108BD9-81ED-4DB2-BD59-A6C34878D82A}">
-                    <a16:rowId xmlns:a16="http://schemas.microsoft.com/office/drawing/2014/main" val="4268299498"/>
-                  </a:ext>
-                </a:extLst>
-              </a:tr>
-              <a:tr h="370840">
-                <a:tc>
-                  <a:txBody>
-                    <a:bodyPr/>
-                    <a:lstStyle/>
-                    <a:p>
-                      <a:endParaRPr lang="en-GB" sz="1000">
-                        <a:latin typeface="Arial" panose="020B0604020202020204" pitchFamily="34" charset="0"/>
-                        <a:cs typeface="Arial" panose="020B0604020202020204" pitchFamily="34" charset="0"/>
-                      </a:endParaRPr>
-                    </a:p>
-                  </a:txBody>
-                  <a:tcPr marL="90000"/>
-                </a:tc>
-                <a:tc>
-                  <a:txBody>
-                    <a:bodyPr/>
-                    <a:lstStyle/>
-                    <a:p>
-                      <a:endParaRPr lang="en-GB" sz="1000">
-                        <a:latin typeface="Arial" panose="020B0604020202020204" pitchFamily="34" charset="0"/>
-                        <a:cs typeface="Arial" panose="020B0604020202020204" pitchFamily="34" charset="0"/>
-                      </a:endParaRPr>
-                    </a:p>
-                  </a:txBody>
-                  <a:tcPr marL="90000"/>
-                </a:tc>
-                <a:tc>
-                  <a:txBody>
-                    <a:bodyPr/>
-                    <a:lstStyle/>
-                    <a:p>
-                      <a:endParaRPr lang="en-GB" sz="1000">
-                        <a:latin typeface="Arial" panose="020B0604020202020204" pitchFamily="34" charset="0"/>
-                        <a:cs typeface="Arial" panose="020B0604020202020204" pitchFamily="34" charset="0"/>
-                      </a:endParaRPr>
-                    </a:p>
-                  </a:txBody>
-                  <a:tcPr marL="90000"/>
-                </a:tc>
-                <a:tc>
-                  <a:txBody>
-                    <a:bodyPr/>
-                    <a:lstStyle/>
-                    <a:p>
-                      <a:endParaRPr lang="en-GB" sz="1000">
-                        <a:latin typeface="Arial" panose="020B0604020202020204" pitchFamily="34" charset="0"/>
-                        <a:cs typeface="Arial" panose="020B0604020202020204" pitchFamily="34" charset="0"/>
-                      </a:endParaRPr>
-                    </a:p>
-                  </a:txBody>
-                  <a:tcPr marL="90000"/>
-                </a:tc>
-                <a:extLst>
-                  <a:ext uri="{0D108BD9-81ED-4DB2-BD59-A6C34878D82A}">
-                    <a16:rowId xmlns:a16="http://schemas.microsoft.com/office/drawing/2014/main" val="6282081"/>
-                  </a:ext>
-                </a:extLst>
-              </a:tr>
-              <a:tr h="370840">
-                <a:tc>
-                  <a:txBody>
-                    <a:bodyPr/>
-                    <a:lstStyle/>
-                    <a:p>
-                      <a:endParaRPr lang="en-GB" sz="1000">
-                        <a:latin typeface="Arial" panose="020B0604020202020204" pitchFamily="34" charset="0"/>
-                        <a:cs typeface="Arial" panose="020B0604020202020204" pitchFamily="34" charset="0"/>
-                      </a:endParaRPr>
-                    </a:p>
-                  </a:txBody>
-                  <a:tcPr marL="90000"/>
-                </a:tc>
-                <a:tc>
-                  <a:txBody>
-                    <a:bodyPr/>
-                    <a:lstStyle/>
-                    <a:p>
-                      <a:endParaRPr lang="en-GB" sz="1000">
-                        <a:latin typeface="Arial" panose="020B0604020202020204" pitchFamily="34" charset="0"/>
-                        <a:cs typeface="Arial" panose="020B0604020202020204" pitchFamily="34" charset="0"/>
-                      </a:endParaRPr>
-                    </a:p>
-                  </a:txBody>
-                  <a:tcPr marL="90000"/>
-                </a:tc>
-                <a:tc>
-                  <a:txBody>
-                    <a:bodyPr/>
-                    <a:lstStyle/>
-                    <a:p>
-                      <a:endParaRPr lang="en-GB" sz="1000">
-                        <a:latin typeface="Arial" panose="020B0604020202020204" pitchFamily="34" charset="0"/>
-                        <a:cs typeface="Arial" panose="020B0604020202020204" pitchFamily="34" charset="0"/>
-                      </a:endParaRPr>
-                    </a:p>
-                  </a:txBody>
-                  <a:tcPr marL="90000"/>
-                </a:tc>
-                <a:tc>
-                  <a:txBody>
-                    <a:bodyPr/>
-                    <a:lstStyle/>
-                    <a:p>
-                      <a:endParaRPr lang="en-GB" sz="1000">
-                        <a:latin typeface="Arial" panose="020B0604020202020204" pitchFamily="34" charset="0"/>
-                        <a:cs typeface="Arial" panose="020B0604020202020204" pitchFamily="34" charset="0"/>
-                      </a:endParaRPr>
-                    </a:p>
-                  </a:txBody>
-                  <a:tcPr marL="90000"/>
-                </a:tc>
-                <a:extLst>
-                  <a:ext uri="{0D108BD9-81ED-4DB2-BD59-A6C34878D82A}">
-                    <a16:rowId xmlns:a16="http://schemas.microsoft.com/office/drawing/2014/main" val="851253970"/>
-                  </a:ext>
-                </a:extLst>
-              </a:tr>
-              <a:tr h="370840">
-                <a:tc>
-                  <a:txBody>
-                    <a:bodyPr/>
-                    <a:lstStyle/>
-                    <a:p>
-                      <a:endParaRPr lang="en-GB" sz="1000">
-                        <a:latin typeface="Arial" panose="020B0604020202020204" pitchFamily="34" charset="0"/>
-                        <a:cs typeface="Arial" panose="020B0604020202020204" pitchFamily="34" charset="0"/>
-                      </a:endParaRPr>
-                    </a:p>
-                  </a:txBody>
-                  <a:tcPr marL="90000"/>
-                </a:tc>
-                <a:tc>
-                  <a:txBody>
-                    <a:bodyPr/>
-                    <a:lstStyle/>
-                    <a:p>
-                      <a:endParaRPr lang="en-GB" sz="1000">
-                        <a:latin typeface="Arial" panose="020B0604020202020204" pitchFamily="34" charset="0"/>
-                        <a:cs typeface="Arial" panose="020B0604020202020204" pitchFamily="34" charset="0"/>
-                      </a:endParaRPr>
-                    </a:p>
-                  </a:txBody>
-                  <a:tcPr marL="90000"/>
-                </a:tc>
-                <a:tc>
-                  <a:txBody>
-                    <a:bodyPr/>
-                    <a:lstStyle/>
-                    <a:p>
-                      <a:endParaRPr lang="en-GB" sz="1000">
-                        <a:latin typeface="Arial" panose="020B0604020202020204" pitchFamily="34" charset="0"/>
-                        <a:cs typeface="Arial" panose="020B0604020202020204" pitchFamily="34" charset="0"/>
-                      </a:endParaRPr>
-                    </a:p>
-                  </a:txBody>
-                  <a:tcPr marL="90000"/>
-                </a:tc>
-                <a:tc>
-                  <a:txBody>
-                    <a:bodyPr/>
-                    <a:lstStyle/>
-                    <a:p>
-                      <a:endParaRPr lang="en-GB" sz="1000">
-                        <a:latin typeface="Arial" panose="020B0604020202020204" pitchFamily="34" charset="0"/>
-                        <a:cs typeface="Arial" panose="020B0604020202020204" pitchFamily="34" charset="0"/>
-                      </a:endParaRPr>
-                    </a:p>
-                  </a:txBody>
-                  <a:tcPr marL="90000"/>
-                </a:tc>
-                <a:extLst>
-                  <a:ext uri="{0D108BD9-81ED-4DB2-BD59-A6C34878D82A}">
-                    <a16:rowId xmlns:a16="http://schemas.microsoft.com/office/drawing/2014/main" val="520232791"/>
-                  </a:ext>
-                </a:extLst>
-              </a:tr>
-              <a:tr h="370840">
-                <a:tc>
-                  <a:txBody>
-                    <a:bodyPr/>
-                    <a:lstStyle/>
-                    <a:p>
-                      <a:endParaRPr lang="en-GB" sz="1000">
-                        <a:latin typeface="Arial" panose="020B0604020202020204" pitchFamily="34" charset="0"/>
-                        <a:cs typeface="Arial" panose="020B0604020202020204" pitchFamily="34" charset="0"/>
-                      </a:endParaRPr>
-                    </a:p>
-                  </a:txBody>
-                  <a:tcPr marL="90000"/>
-                </a:tc>
-                <a:tc>
-                  <a:txBody>
-                    <a:bodyPr/>
-                    <a:lstStyle/>
-                    <a:p>
-                      <a:endParaRPr lang="en-GB" sz="1000">
-                        <a:latin typeface="Arial" panose="020B0604020202020204" pitchFamily="34" charset="0"/>
-                        <a:cs typeface="Arial" panose="020B0604020202020204" pitchFamily="34" charset="0"/>
-                      </a:endParaRPr>
-                    </a:p>
-                  </a:txBody>
-                  <a:tcPr marL="90000"/>
-                </a:tc>
-                <a:tc>
-                  <a:txBody>
-                    <a:bodyPr/>
-                    <a:lstStyle/>
-                    <a:p>
-                      <a:endParaRPr lang="en-GB" sz="1000">
-                        <a:latin typeface="Arial" panose="020B0604020202020204" pitchFamily="34" charset="0"/>
-                        <a:cs typeface="Arial" panose="020B0604020202020204" pitchFamily="34" charset="0"/>
-                      </a:endParaRPr>
-                    </a:p>
-                  </a:txBody>
-                  <a:tcPr marL="90000"/>
-                </a:tc>
-                <a:tc>
-                  <a:txBody>
-                    <a:bodyPr/>
-                    <a:lstStyle/>
-                    <a:p>
-                      <a:endParaRPr lang="en-GB" sz="1000">
-                        <a:latin typeface="Arial" panose="020B0604020202020204" pitchFamily="34" charset="0"/>
-                        <a:cs typeface="Arial" panose="020B0604020202020204" pitchFamily="34" charset="0"/>
-                      </a:endParaRPr>
-                    </a:p>
-                  </a:txBody>
-                  <a:tcPr marL="90000"/>
-                </a:tc>
-                <a:extLst>
-                  <a:ext uri="{0D108BD9-81ED-4DB2-BD59-A6C34878D82A}">
-                    <a16:rowId xmlns:a16="http://schemas.microsoft.com/office/drawing/2014/main" val="4221754052"/>
-                  </a:ext>
-                </a:extLst>
-              </a:tr>
-              <a:tr h="370840">
-                <a:tc>
-                  <a:txBody>
-                    <a:bodyPr/>
-                    <a:lstStyle/>
-                    <a:p>
-                      <a:endParaRPr lang="en-GB" sz="1000">
-                        <a:latin typeface="Arial" panose="020B0604020202020204" pitchFamily="34" charset="0"/>
-                        <a:cs typeface="Arial" panose="020B0604020202020204" pitchFamily="34" charset="0"/>
-                      </a:endParaRPr>
-                    </a:p>
-                  </a:txBody>
-                  <a:tcPr marL="90000"/>
-                </a:tc>
-                <a:tc>
-                  <a:txBody>
-                    <a:bodyPr/>
-                    <a:lstStyle/>
-                    <a:p>
-                      <a:endParaRPr lang="en-GB" sz="1000">
-                        <a:latin typeface="Arial" panose="020B0604020202020204" pitchFamily="34" charset="0"/>
-                        <a:cs typeface="Arial" panose="020B0604020202020204" pitchFamily="34" charset="0"/>
-                      </a:endParaRPr>
-                    </a:p>
-                  </a:txBody>
-                  <a:tcPr marL="90000"/>
-                </a:tc>
-                <a:tc>
-                  <a:txBody>
-                    <a:bodyPr/>
-                    <a:lstStyle/>
-                    <a:p>
-                      <a:endParaRPr lang="en-GB" sz="1000">
-                        <a:latin typeface="Arial" panose="020B0604020202020204" pitchFamily="34" charset="0"/>
-                        <a:cs typeface="Arial" panose="020B0604020202020204" pitchFamily="34" charset="0"/>
-                      </a:endParaRPr>
-                    </a:p>
-                  </a:txBody>
-                  <a:tcPr marL="90000"/>
-                </a:tc>
-                <a:tc>
-                  <a:txBody>
-                    <a:bodyPr/>
-                    <a:lstStyle/>
-                    <a:p>
-                      <a:endParaRPr lang="en-GB" sz="1000">
-                        <a:latin typeface="Arial" panose="020B0604020202020204" pitchFamily="34" charset="0"/>
-                        <a:cs typeface="Arial" panose="020B0604020202020204" pitchFamily="34" charset="0"/>
-                      </a:endParaRPr>
-                    </a:p>
-                  </a:txBody>
-                  <a:tcPr marL="90000"/>
-                </a:tc>
-                <a:extLst>
-                  <a:ext uri="{0D108BD9-81ED-4DB2-BD59-A6C34878D82A}">
-                    <a16:rowId xmlns:a16="http://schemas.microsoft.com/office/drawing/2014/main" val="1267022612"/>
-                  </a:ext>
-                </a:extLst>
-              </a:tr>
-              <a:tr h="370840">
-                <a:tc>
-                  <a:txBody>
-                    <a:bodyPr/>
-                    <a:lstStyle/>
-                    <a:p>
-                      <a:endParaRPr lang="en-GB" sz="1000">
-                        <a:latin typeface="Arial" panose="020B0604020202020204" pitchFamily="34" charset="0"/>
-                        <a:cs typeface="Arial" panose="020B0604020202020204" pitchFamily="34" charset="0"/>
-                      </a:endParaRPr>
-                    </a:p>
-                  </a:txBody>
-                  <a:tcPr marL="90000"/>
-                </a:tc>
-                <a:tc>
-                  <a:txBody>
-                    <a:bodyPr/>
-                    <a:lstStyle/>
-                    <a:p>
-                      <a:endParaRPr lang="en-GB" sz="1000">
-                        <a:latin typeface="Arial" panose="020B0604020202020204" pitchFamily="34" charset="0"/>
-                        <a:cs typeface="Arial" panose="020B0604020202020204" pitchFamily="34" charset="0"/>
-                      </a:endParaRPr>
-                    </a:p>
-                  </a:txBody>
-                  <a:tcPr marL="90000"/>
-                </a:tc>
-                <a:tc>
-                  <a:txBody>
-                    <a:bodyPr/>
-                    <a:lstStyle/>
-                    <a:p>
-                      <a:endParaRPr lang="en-GB" sz="1000" dirty="0">
-                        <a:latin typeface="Arial" panose="020B0604020202020204" pitchFamily="34" charset="0"/>
-                        <a:cs typeface="Arial" panose="020B0604020202020204" pitchFamily="34" charset="0"/>
-                      </a:endParaRPr>
-                    </a:p>
-                  </a:txBody>
-                  <a:tcPr marL="90000"/>
-                </a:tc>
-                <a:tc>
-                  <a:txBody>
-                    <a:bodyPr/>
-                    <a:lstStyle/>
-                    <a:p>
-                      <a:endParaRPr lang="en-GB" sz="1000">
-                        <a:latin typeface="Arial" panose="020B0604020202020204" pitchFamily="34" charset="0"/>
-                        <a:cs typeface="Arial" panose="020B0604020202020204" pitchFamily="34" charset="0"/>
-                      </a:endParaRPr>
-                    </a:p>
-                  </a:txBody>
-                  <a:tcPr marL="90000"/>
-                </a:tc>
-                <a:extLst>
-                  <a:ext uri="{0D108BD9-81ED-4DB2-BD59-A6C34878D82A}">
-                    <a16:rowId xmlns:a16="http://schemas.microsoft.com/office/drawing/2014/main" val="3126743718"/>
-                  </a:ext>
-                </a:extLst>
-              </a:tr>
-              <a:tr h="370840">
-                <a:tc>
-                  <a:txBody>
-                    <a:bodyPr/>
-                    <a:lstStyle/>
-                    <a:p>
-                      <a:endParaRPr lang="en-GB" sz="1000">
-                        <a:latin typeface="Arial" panose="020B0604020202020204" pitchFamily="34" charset="0"/>
-                        <a:cs typeface="Arial" panose="020B0604020202020204" pitchFamily="34" charset="0"/>
-                      </a:endParaRPr>
-                    </a:p>
-                  </a:txBody>
-                  <a:tcPr marL="90000"/>
-                </a:tc>
-                <a:tc>
-                  <a:txBody>
-                    <a:bodyPr/>
-                    <a:lstStyle/>
-                    <a:p>
-                      <a:endParaRPr lang="en-GB" sz="1000">
-                        <a:latin typeface="Arial" panose="020B0604020202020204" pitchFamily="34" charset="0"/>
-                        <a:cs typeface="Arial" panose="020B0604020202020204" pitchFamily="34" charset="0"/>
-                      </a:endParaRPr>
-                    </a:p>
-                  </a:txBody>
-                  <a:tcPr marL="90000"/>
-                </a:tc>
-                <a:tc>
-                  <a:txBody>
-                    <a:bodyPr/>
-                    <a:lstStyle/>
-                    <a:p>
-                      <a:endParaRPr lang="en-GB" sz="1000">
-                        <a:latin typeface="Arial" panose="020B0604020202020204" pitchFamily="34" charset="0"/>
-                        <a:cs typeface="Arial" panose="020B0604020202020204" pitchFamily="34" charset="0"/>
-                      </a:endParaRPr>
-                    </a:p>
-                  </a:txBody>
-                  <a:tcPr marL="90000"/>
-                </a:tc>
-                <a:tc>
-                  <a:txBody>
-                    <a:bodyPr/>
-                    <a:lstStyle/>
-                    <a:p>
-                      <a:endParaRPr lang="en-GB" sz="1000" dirty="0">
-                        <a:latin typeface="Arial" panose="020B0604020202020204" pitchFamily="34" charset="0"/>
-                        <a:cs typeface="Arial" panose="020B0604020202020204" pitchFamily="34" charset="0"/>
-                      </a:endParaRPr>
-                    </a:p>
-                  </a:txBody>
-                  <a:tcPr marL="90000"/>
-                </a:tc>
-                <a:extLst>
-                  <a:ext uri="{0D108BD9-81ED-4DB2-BD59-A6C34878D82A}">
-                    <a16:rowId xmlns:a16="http://schemas.microsoft.com/office/drawing/2014/main" val="2433134651"/>
-                  </a:ext>
-                </a:extLst>
-              </a:tr>
-            </a:tbl>
-          </a:graphicData>
-        </a:graphic>
-      </p:graphicFrame>
+      <p:sp>
+        <p:nvSpPr>
+          <p:cNvPr id="4" name="Footer Placeholder 3"/>
+          <p:cNvSpPr>
+            <a:spLocks noGrp="1"/>
+          </p:cNvSpPr>
+          <p:nvPr>
+            <p:ph type="ftr" sz="quarter" idx="11"/>
+          </p:nvPr>
+        </p:nvSpPr>
+        <p:spPr/>
+        <p:txBody>
+          <a:bodyPr/>
+          <a:lstStyle/>
+          <a:p>
+            <a:endParaRPr lang="en-US"/>
+          </a:p>
+        </p:txBody>
+      </p:sp>
+      <p:sp>
+        <p:nvSpPr>
+          <p:cNvPr id="5" name="Slide Number Placeholder 4"/>
+          <p:cNvSpPr>
+            <a:spLocks noGrp="1"/>
+          </p:cNvSpPr>
+          <p:nvPr>
+            <p:ph type="sldNum" sz="quarter" idx="12"/>
+          </p:nvPr>
+        </p:nvSpPr>
+        <p:spPr/>
+        <p:txBody>
+          <a:bodyPr/>
+          <a:lstStyle/>
+          <a:p>
+            <a:fld id="{C5EF2332-01BF-834F-8236-50238282D533}" type="slidenum">
+              <a:rPr lang="en-US" smtClean="0"/>
+              <a:t>‹#›</a:t>
+            </a:fld>
+            <a:endParaRPr lang="en-US"/>
+          </a:p>
+        </p:txBody>
+      </p:sp>
     </p:spTree>
     <p:extLst>
       <p:ext uri="{BB962C8B-B14F-4D97-AF65-F5344CB8AC3E}">
@@ -2428,8 +2505,630 @@
 </p:sldLayout>
 </file>
 
+<file path=ppt/slideLayouts/slideLayout7.xml><?xml version="1.0" encoding="utf-8"?>
+<p:sldLayout xmlns:a="http://schemas.openxmlformats.org/drawingml/2006/main" xmlns:r="http://schemas.openxmlformats.org/officeDocument/2006/relationships" xmlns:p="http://schemas.openxmlformats.org/presentationml/2006/main" type="blank" preserve="1">
+  <p:cSld name="Blank">
+    <p:spTree>
+      <p:nvGrpSpPr>
+        <p:cNvPr id="1" name=""/>
+        <p:cNvGrpSpPr/>
+        <p:nvPr/>
+      </p:nvGrpSpPr>
+      <p:grpSpPr>
+        <a:xfrm>
+          <a:off x="0" y="0"/>
+          <a:ext cx="0" cy="0"/>
+          <a:chOff x="0" y="0"/>
+          <a:chExt cx="0" cy="0"/>
+        </a:xfrm>
+      </p:grpSpPr>
+      <p:sp>
+        <p:nvSpPr>
+          <p:cNvPr id="2" name="Date Placeholder 1"/>
+          <p:cNvSpPr>
+            <a:spLocks noGrp="1"/>
+          </p:cNvSpPr>
+          <p:nvPr>
+            <p:ph type="dt" sz="half" idx="10"/>
+          </p:nvPr>
+        </p:nvSpPr>
+        <p:spPr/>
+        <p:txBody>
+          <a:bodyPr/>
+          <a:lstStyle/>
+          <a:p>
+            <a:fld id="{241EB5C9-1307-BA42-ABA2-0BC069CD8E7F}" type="datetimeFigureOut">
+              <a:rPr lang="en-US" smtClean="0"/>
+              <a:t>1/2/22</a:t>
+            </a:fld>
+            <a:endParaRPr lang="en-US"/>
+          </a:p>
+        </p:txBody>
+      </p:sp>
+      <p:sp>
+        <p:nvSpPr>
+          <p:cNvPr id="3" name="Footer Placeholder 2"/>
+          <p:cNvSpPr>
+            <a:spLocks noGrp="1"/>
+          </p:cNvSpPr>
+          <p:nvPr>
+            <p:ph type="ftr" sz="quarter" idx="11"/>
+          </p:nvPr>
+        </p:nvSpPr>
+        <p:spPr/>
+        <p:txBody>
+          <a:bodyPr/>
+          <a:lstStyle/>
+          <a:p>
+            <a:endParaRPr lang="en-US"/>
+          </a:p>
+        </p:txBody>
+      </p:sp>
+      <p:sp>
+        <p:nvSpPr>
+          <p:cNvPr id="4" name="Slide Number Placeholder 3"/>
+          <p:cNvSpPr>
+            <a:spLocks noGrp="1"/>
+          </p:cNvSpPr>
+          <p:nvPr>
+            <p:ph type="sldNum" sz="quarter" idx="12"/>
+          </p:nvPr>
+        </p:nvSpPr>
+        <p:spPr/>
+        <p:txBody>
+          <a:bodyPr/>
+          <a:lstStyle/>
+          <a:p>
+            <a:fld id="{C5EF2332-01BF-834F-8236-50238282D533}" type="slidenum">
+              <a:rPr lang="en-US" smtClean="0"/>
+              <a:t>‹#›</a:t>
+            </a:fld>
+            <a:endParaRPr lang="en-US"/>
+          </a:p>
+        </p:txBody>
+      </p:sp>
+    </p:spTree>
+    <p:extLst>
+      <p:ext uri="{BB962C8B-B14F-4D97-AF65-F5344CB8AC3E}">
+        <p14:creationId xmlns:p14="http://schemas.microsoft.com/office/powerpoint/2010/main" val="2130901097"/>
+      </p:ext>
+    </p:extLst>
+  </p:cSld>
+  <p:clrMapOvr>
+    <a:masterClrMapping/>
+  </p:clrMapOvr>
+</p:sldLayout>
+</file>
+
+<file path=ppt/slideLayouts/slideLayout8.xml><?xml version="1.0" encoding="utf-8"?>
+<p:sldLayout xmlns:a="http://schemas.openxmlformats.org/drawingml/2006/main" xmlns:r="http://schemas.openxmlformats.org/officeDocument/2006/relationships" xmlns:p="http://schemas.openxmlformats.org/presentationml/2006/main" type="objTx" preserve="1">
+  <p:cSld name="Content with Caption">
+    <p:spTree>
+      <p:nvGrpSpPr>
+        <p:cNvPr id="1" name=""/>
+        <p:cNvGrpSpPr/>
+        <p:nvPr/>
+      </p:nvGrpSpPr>
+      <p:grpSpPr>
+        <a:xfrm>
+          <a:off x="0" y="0"/>
+          <a:ext cx="0" cy="0"/>
+          <a:chOff x="0" y="0"/>
+          <a:chExt cx="0" cy="0"/>
+        </a:xfrm>
+      </p:grpSpPr>
+      <p:sp>
+        <p:nvSpPr>
+          <p:cNvPr id="2" name="Title 1"/>
+          <p:cNvSpPr>
+            <a:spLocks noGrp="1"/>
+          </p:cNvSpPr>
+          <p:nvPr>
+            <p:ph type="title"/>
+          </p:nvPr>
+        </p:nvSpPr>
+        <p:spPr>
+          <a:xfrm>
+            <a:off x="457201" y="204787"/>
+            <a:ext cx="3008313" cy="871538"/>
+          </a:xfrm>
+        </p:spPr>
+        <p:txBody>
+          <a:bodyPr anchor="b"/>
+          <a:lstStyle>
+            <a:lvl1pPr algn="l">
+              <a:defRPr sz="1500" b="1"/>
+            </a:lvl1pPr>
+          </a:lstStyle>
+          <a:p>
+            <a:r>
+              <a:rPr lang="en-US"/>
+              <a:t>Click to edit Master title style</a:t>
+            </a:r>
+          </a:p>
+        </p:txBody>
+      </p:sp>
+      <p:sp>
+        <p:nvSpPr>
+          <p:cNvPr id="3" name="Content Placeholder 2"/>
+          <p:cNvSpPr>
+            <a:spLocks noGrp="1"/>
+          </p:cNvSpPr>
+          <p:nvPr>
+            <p:ph idx="1"/>
+          </p:nvPr>
+        </p:nvSpPr>
+        <p:spPr>
+          <a:xfrm>
+            <a:off x="3575050" y="204788"/>
+            <a:ext cx="5111750" cy="4389835"/>
+          </a:xfrm>
+        </p:spPr>
+        <p:txBody>
+          <a:bodyPr/>
+          <a:lstStyle>
+            <a:lvl1pPr>
+              <a:defRPr sz="2400"/>
+            </a:lvl1pPr>
+            <a:lvl2pPr>
+              <a:defRPr sz="2100"/>
+            </a:lvl2pPr>
+            <a:lvl3pPr>
+              <a:defRPr sz="1800"/>
+            </a:lvl3pPr>
+            <a:lvl4pPr>
+              <a:defRPr sz="1500"/>
+            </a:lvl4pPr>
+            <a:lvl5pPr>
+              <a:defRPr sz="1500"/>
+            </a:lvl5pPr>
+            <a:lvl6pPr>
+              <a:defRPr sz="1500"/>
+            </a:lvl6pPr>
+            <a:lvl7pPr>
+              <a:defRPr sz="1500"/>
+            </a:lvl7pPr>
+            <a:lvl8pPr>
+              <a:defRPr sz="1500"/>
+            </a:lvl8pPr>
+            <a:lvl9pPr>
+              <a:defRPr sz="1500"/>
+            </a:lvl9pPr>
+          </a:lstStyle>
+          <a:p>
+            <a:pPr lvl="0"/>
+            <a:r>
+              <a:rPr lang="en-US"/>
+              <a:t>Click to edit Master text styles</a:t>
+            </a:r>
+          </a:p>
+          <a:p>
+            <a:pPr lvl="1"/>
+            <a:r>
+              <a:rPr lang="en-US"/>
+              <a:t>Second level</a:t>
+            </a:r>
+          </a:p>
+          <a:p>
+            <a:pPr lvl="2"/>
+            <a:r>
+              <a:rPr lang="en-US"/>
+              <a:t>Third level</a:t>
+            </a:r>
+          </a:p>
+          <a:p>
+            <a:pPr lvl="3"/>
+            <a:r>
+              <a:rPr lang="en-US"/>
+              <a:t>Fourth level</a:t>
+            </a:r>
+          </a:p>
+          <a:p>
+            <a:pPr lvl="4"/>
+            <a:r>
+              <a:rPr lang="en-US"/>
+              <a:t>Fifth level</a:t>
+            </a:r>
+          </a:p>
+        </p:txBody>
+      </p:sp>
+      <p:sp>
+        <p:nvSpPr>
+          <p:cNvPr id="4" name="Text Placeholder 3"/>
+          <p:cNvSpPr>
+            <a:spLocks noGrp="1"/>
+          </p:cNvSpPr>
+          <p:nvPr>
+            <p:ph type="body" sz="half" idx="2"/>
+          </p:nvPr>
+        </p:nvSpPr>
+        <p:spPr>
+          <a:xfrm>
+            <a:off x="457201" y="1076326"/>
+            <a:ext cx="3008313" cy="3518297"/>
+          </a:xfrm>
+        </p:spPr>
+        <p:txBody>
+          <a:bodyPr/>
+          <a:lstStyle>
+            <a:lvl1pPr marL="0" indent="0">
+              <a:buNone/>
+              <a:defRPr sz="1050"/>
+            </a:lvl1pPr>
+            <a:lvl2pPr marL="342900" indent="0">
+              <a:buNone/>
+              <a:defRPr sz="900"/>
+            </a:lvl2pPr>
+            <a:lvl3pPr marL="685800" indent="0">
+              <a:buNone/>
+              <a:defRPr sz="750"/>
+            </a:lvl3pPr>
+            <a:lvl4pPr marL="1028700" indent="0">
+              <a:buNone/>
+              <a:defRPr sz="675"/>
+            </a:lvl4pPr>
+            <a:lvl5pPr marL="1371600" indent="0">
+              <a:buNone/>
+              <a:defRPr sz="675"/>
+            </a:lvl5pPr>
+            <a:lvl6pPr marL="1714500" indent="0">
+              <a:buNone/>
+              <a:defRPr sz="675"/>
+            </a:lvl6pPr>
+            <a:lvl7pPr marL="2057400" indent="0">
+              <a:buNone/>
+              <a:defRPr sz="675"/>
+            </a:lvl7pPr>
+            <a:lvl8pPr marL="2400300" indent="0">
+              <a:buNone/>
+              <a:defRPr sz="675"/>
+            </a:lvl8pPr>
+            <a:lvl9pPr marL="2743200" indent="0">
+              <a:buNone/>
+              <a:defRPr sz="675"/>
+            </a:lvl9pPr>
+          </a:lstStyle>
+          <a:p>
+            <a:pPr lvl="0"/>
+            <a:r>
+              <a:rPr lang="en-US"/>
+              <a:t>Click to edit Master text styles</a:t>
+            </a:r>
+          </a:p>
+        </p:txBody>
+      </p:sp>
+      <p:sp>
+        <p:nvSpPr>
+          <p:cNvPr id="5" name="Date Placeholder 4"/>
+          <p:cNvSpPr>
+            <a:spLocks noGrp="1"/>
+          </p:cNvSpPr>
+          <p:nvPr>
+            <p:ph type="dt" sz="half" idx="10"/>
+          </p:nvPr>
+        </p:nvSpPr>
+        <p:spPr/>
+        <p:txBody>
+          <a:bodyPr/>
+          <a:lstStyle/>
+          <a:p>
+            <a:fld id="{241EB5C9-1307-BA42-ABA2-0BC069CD8E7F}" type="datetimeFigureOut">
+              <a:rPr lang="en-US" smtClean="0"/>
+              <a:t>1/2/22</a:t>
+            </a:fld>
+            <a:endParaRPr lang="en-US"/>
+          </a:p>
+        </p:txBody>
+      </p:sp>
+      <p:sp>
+        <p:nvSpPr>
+          <p:cNvPr id="6" name="Footer Placeholder 5"/>
+          <p:cNvSpPr>
+            <a:spLocks noGrp="1"/>
+          </p:cNvSpPr>
+          <p:nvPr>
+            <p:ph type="ftr" sz="quarter" idx="11"/>
+          </p:nvPr>
+        </p:nvSpPr>
+        <p:spPr/>
+        <p:txBody>
+          <a:bodyPr/>
+          <a:lstStyle/>
+          <a:p>
+            <a:endParaRPr lang="en-US"/>
+          </a:p>
+        </p:txBody>
+      </p:sp>
+      <p:sp>
+        <p:nvSpPr>
+          <p:cNvPr id="7" name="Slide Number Placeholder 6"/>
+          <p:cNvSpPr>
+            <a:spLocks noGrp="1"/>
+          </p:cNvSpPr>
+          <p:nvPr>
+            <p:ph type="sldNum" sz="quarter" idx="12"/>
+          </p:nvPr>
+        </p:nvSpPr>
+        <p:spPr/>
+        <p:txBody>
+          <a:bodyPr/>
+          <a:lstStyle/>
+          <a:p>
+            <a:fld id="{C5EF2332-01BF-834F-8236-50238282D533}" type="slidenum">
+              <a:rPr lang="en-US" smtClean="0"/>
+              <a:t>‹#›</a:t>
+            </a:fld>
+            <a:endParaRPr lang="en-US"/>
+          </a:p>
+        </p:txBody>
+      </p:sp>
+    </p:spTree>
+    <p:extLst>
+      <p:ext uri="{BB962C8B-B14F-4D97-AF65-F5344CB8AC3E}">
+        <p14:creationId xmlns:p14="http://schemas.microsoft.com/office/powerpoint/2010/main" val="3540895647"/>
+      </p:ext>
+    </p:extLst>
+  </p:cSld>
+  <p:clrMapOvr>
+    <a:masterClrMapping/>
+  </p:clrMapOvr>
+</p:sldLayout>
+</file>
+
+<file path=ppt/slideLayouts/slideLayout9.xml><?xml version="1.0" encoding="utf-8"?>
+<p:sldLayout xmlns:a="http://schemas.openxmlformats.org/drawingml/2006/main" xmlns:r="http://schemas.openxmlformats.org/officeDocument/2006/relationships" xmlns:p="http://schemas.openxmlformats.org/presentationml/2006/main" type="picTx" preserve="1">
+  <p:cSld name="Picture with Caption">
+    <p:spTree>
+      <p:nvGrpSpPr>
+        <p:cNvPr id="1" name=""/>
+        <p:cNvGrpSpPr/>
+        <p:nvPr/>
+      </p:nvGrpSpPr>
+      <p:grpSpPr>
+        <a:xfrm>
+          <a:off x="0" y="0"/>
+          <a:ext cx="0" cy="0"/>
+          <a:chOff x="0" y="0"/>
+          <a:chExt cx="0" cy="0"/>
+        </a:xfrm>
+      </p:grpSpPr>
+      <p:sp>
+        <p:nvSpPr>
+          <p:cNvPr id="2" name="Title 1"/>
+          <p:cNvSpPr>
+            <a:spLocks noGrp="1"/>
+          </p:cNvSpPr>
+          <p:nvPr>
+            <p:ph type="title"/>
+          </p:nvPr>
+        </p:nvSpPr>
+        <p:spPr>
+          <a:xfrm>
+            <a:off x="1792288" y="3600450"/>
+            <a:ext cx="5486400" cy="425054"/>
+          </a:xfrm>
+        </p:spPr>
+        <p:txBody>
+          <a:bodyPr anchor="b"/>
+          <a:lstStyle>
+            <a:lvl1pPr algn="l">
+              <a:defRPr sz="1500" b="1"/>
+            </a:lvl1pPr>
+          </a:lstStyle>
+          <a:p>
+            <a:r>
+              <a:rPr lang="en-US"/>
+              <a:t>Click to edit Master title style</a:t>
+            </a:r>
+          </a:p>
+        </p:txBody>
+      </p:sp>
+      <p:sp>
+        <p:nvSpPr>
+          <p:cNvPr id="3" name="Picture Placeholder 2"/>
+          <p:cNvSpPr>
+            <a:spLocks noGrp="1"/>
+          </p:cNvSpPr>
+          <p:nvPr>
+            <p:ph type="pic" idx="1"/>
+          </p:nvPr>
+        </p:nvSpPr>
+        <p:spPr>
+          <a:xfrm>
+            <a:off x="1792288" y="459581"/>
+            <a:ext cx="5486400" cy="3086100"/>
+          </a:xfrm>
+        </p:spPr>
+        <p:txBody>
+          <a:bodyPr/>
+          <a:lstStyle>
+            <a:lvl1pPr marL="0" indent="0">
+              <a:buNone/>
+              <a:defRPr sz="2400"/>
+            </a:lvl1pPr>
+            <a:lvl2pPr marL="342900" indent="0">
+              <a:buNone/>
+              <a:defRPr sz="2100"/>
+            </a:lvl2pPr>
+            <a:lvl3pPr marL="685800" indent="0">
+              <a:buNone/>
+              <a:defRPr sz="1800"/>
+            </a:lvl3pPr>
+            <a:lvl4pPr marL="1028700" indent="0">
+              <a:buNone/>
+              <a:defRPr sz="1500"/>
+            </a:lvl4pPr>
+            <a:lvl5pPr marL="1371600" indent="0">
+              <a:buNone/>
+              <a:defRPr sz="1500"/>
+            </a:lvl5pPr>
+            <a:lvl6pPr marL="1714500" indent="0">
+              <a:buNone/>
+              <a:defRPr sz="1500"/>
+            </a:lvl6pPr>
+            <a:lvl7pPr marL="2057400" indent="0">
+              <a:buNone/>
+              <a:defRPr sz="1500"/>
+            </a:lvl7pPr>
+            <a:lvl8pPr marL="2400300" indent="0">
+              <a:buNone/>
+              <a:defRPr sz="1500"/>
+            </a:lvl8pPr>
+            <a:lvl9pPr marL="2743200" indent="0">
+              <a:buNone/>
+              <a:defRPr sz="1500"/>
+            </a:lvl9pPr>
+          </a:lstStyle>
+          <a:p>
+            <a:endParaRPr lang="en-US"/>
+          </a:p>
+        </p:txBody>
+      </p:sp>
+      <p:sp>
+        <p:nvSpPr>
+          <p:cNvPr id="4" name="Text Placeholder 3"/>
+          <p:cNvSpPr>
+            <a:spLocks noGrp="1"/>
+          </p:cNvSpPr>
+          <p:nvPr>
+            <p:ph type="body" sz="half" idx="2"/>
+          </p:nvPr>
+        </p:nvSpPr>
+        <p:spPr>
+          <a:xfrm>
+            <a:off x="1792288" y="4025503"/>
+            <a:ext cx="5486400" cy="603647"/>
+          </a:xfrm>
+        </p:spPr>
+        <p:txBody>
+          <a:bodyPr/>
+          <a:lstStyle>
+            <a:lvl1pPr marL="0" indent="0">
+              <a:buNone/>
+              <a:defRPr sz="1050"/>
+            </a:lvl1pPr>
+            <a:lvl2pPr marL="342900" indent="0">
+              <a:buNone/>
+              <a:defRPr sz="900"/>
+            </a:lvl2pPr>
+            <a:lvl3pPr marL="685800" indent="0">
+              <a:buNone/>
+              <a:defRPr sz="750"/>
+            </a:lvl3pPr>
+            <a:lvl4pPr marL="1028700" indent="0">
+              <a:buNone/>
+              <a:defRPr sz="675"/>
+            </a:lvl4pPr>
+            <a:lvl5pPr marL="1371600" indent="0">
+              <a:buNone/>
+              <a:defRPr sz="675"/>
+            </a:lvl5pPr>
+            <a:lvl6pPr marL="1714500" indent="0">
+              <a:buNone/>
+              <a:defRPr sz="675"/>
+            </a:lvl6pPr>
+            <a:lvl7pPr marL="2057400" indent="0">
+              <a:buNone/>
+              <a:defRPr sz="675"/>
+            </a:lvl7pPr>
+            <a:lvl8pPr marL="2400300" indent="0">
+              <a:buNone/>
+              <a:defRPr sz="675"/>
+            </a:lvl8pPr>
+            <a:lvl9pPr marL="2743200" indent="0">
+              <a:buNone/>
+              <a:defRPr sz="675"/>
+            </a:lvl9pPr>
+          </a:lstStyle>
+          <a:p>
+            <a:pPr lvl="0"/>
+            <a:r>
+              <a:rPr lang="en-US"/>
+              <a:t>Click to edit Master text styles</a:t>
+            </a:r>
+          </a:p>
+        </p:txBody>
+      </p:sp>
+      <p:sp>
+        <p:nvSpPr>
+          <p:cNvPr id="5" name="Date Placeholder 4"/>
+          <p:cNvSpPr>
+            <a:spLocks noGrp="1"/>
+          </p:cNvSpPr>
+          <p:nvPr>
+            <p:ph type="dt" sz="half" idx="10"/>
+          </p:nvPr>
+        </p:nvSpPr>
+        <p:spPr/>
+        <p:txBody>
+          <a:bodyPr/>
+          <a:lstStyle/>
+          <a:p>
+            <a:fld id="{241EB5C9-1307-BA42-ABA2-0BC069CD8E7F}" type="datetimeFigureOut">
+              <a:rPr lang="en-US" smtClean="0"/>
+              <a:t>1/2/22</a:t>
+            </a:fld>
+            <a:endParaRPr lang="en-US"/>
+          </a:p>
+        </p:txBody>
+      </p:sp>
+      <p:sp>
+        <p:nvSpPr>
+          <p:cNvPr id="6" name="Footer Placeholder 5"/>
+          <p:cNvSpPr>
+            <a:spLocks noGrp="1"/>
+          </p:cNvSpPr>
+          <p:nvPr>
+            <p:ph type="ftr" sz="quarter" idx="11"/>
+          </p:nvPr>
+        </p:nvSpPr>
+        <p:spPr/>
+        <p:txBody>
+          <a:bodyPr/>
+          <a:lstStyle/>
+          <a:p>
+            <a:endParaRPr lang="en-US"/>
+          </a:p>
+        </p:txBody>
+      </p:sp>
+      <p:sp>
+        <p:nvSpPr>
+          <p:cNvPr id="7" name="Slide Number Placeholder 6"/>
+          <p:cNvSpPr>
+            <a:spLocks noGrp="1"/>
+          </p:cNvSpPr>
+          <p:nvPr>
+            <p:ph type="sldNum" sz="quarter" idx="12"/>
+          </p:nvPr>
+        </p:nvSpPr>
+        <p:spPr/>
+        <p:txBody>
+          <a:bodyPr/>
+          <a:lstStyle/>
+          <a:p>
+            <a:fld id="{C5EF2332-01BF-834F-8236-50238282D533}" type="slidenum">
+              <a:rPr lang="en-US" smtClean="0"/>
+              <a:t>‹#›</a:t>
+            </a:fld>
+            <a:endParaRPr lang="en-US"/>
+          </a:p>
+        </p:txBody>
+      </p:sp>
+    </p:spTree>
+    <p:extLst>
+      <p:ext uri="{BB962C8B-B14F-4D97-AF65-F5344CB8AC3E}">
+        <p14:creationId xmlns:p14="http://schemas.microsoft.com/office/powerpoint/2010/main" val="3566899855"/>
+      </p:ext>
+    </p:extLst>
+  </p:cSld>
+  <p:clrMapOvr>
+    <a:masterClrMapping/>
+  </p:clrMapOvr>
+</p:sldLayout>
+</file>
+
 <file path=ppt/slideMasters/slideMaster1.xml><?xml version="1.0" encoding="utf-8"?>
-<p:sldMaster xmlns:a="http://schemas.openxmlformats.org/drawingml/2006/main" xmlns:r="http://schemas.openxmlformats.org/officeDocument/2006/relationships" xmlns:p="http://schemas.openxmlformats.org/presentationml/2006/main" preserve="1">
+<p:sldMaster xmlns:a="http://schemas.openxmlformats.org/drawingml/2006/main" xmlns:r="http://schemas.openxmlformats.org/officeDocument/2006/relationships" xmlns:p="http://schemas.openxmlformats.org/presentationml/2006/main">
   <p:cSld>
     <p:bg>
       <p:bgRef idx="1001">
@@ -2452,131 +3151,18 @@
       </p:grpSpPr>
       <p:sp>
         <p:nvSpPr>
-          <p:cNvPr id="21" name="Rechteck 20">
-            <a:extLst>
-              <a:ext uri="{FF2B5EF4-FFF2-40B4-BE49-F238E27FC236}">
-                <a16:creationId xmlns:a16="http://schemas.microsoft.com/office/drawing/2014/main" id="{BA7320F7-4197-BB4B-A88B-4EEEE9974A10}"/>
-              </a:ext>
-            </a:extLst>
-          </p:cNvPr>
-          <p:cNvSpPr/>
-          <p:nvPr userDrawn="1"/>
+          <p:cNvPr id="2" name="Title Placeholder 1"/>
+          <p:cNvSpPr>
+            <a:spLocks noGrp="1"/>
+          </p:cNvSpPr>
+          <p:nvPr>
+            <p:ph type="title"/>
+          </p:nvPr>
         </p:nvSpPr>
         <p:spPr>
           <a:xfrm>
-            <a:off x="-399" y="5295636"/>
-            <a:ext cx="9144000" cy="419364"/>
-          </a:xfrm>
-          <a:prstGeom prst="rect">
-            <a:avLst/>
-          </a:prstGeom>
-          <a:solidFill>
-            <a:srgbClr val="0066CC"/>
-          </a:solidFill>
-          <a:ln>
-            <a:noFill/>
-          </a:ln>
-          <a:effectLst/>
-        </p:spPr>
-        <p:style>
-          <a:lnRef idx="1">
-            <a:schemeClr val="accent1"/>
-          </a:lnRef>
-          <a:fillRef idx="3">
-            <a:schemeClr val="accent1"/>
-          </a:fillRef>
-          <a:effectRef idx="2">
-            <a:schemeClr val="accent1"/>
-          </a:effectRef>
-          <a:fontRef idx="minor">
-            <a:schemeClr val="lt1"/>
-          </a:fontRef>
-        </p:style>
-        <p:txBody>
-          <a:bodyPr anchor="ctr"/>
-          <a:lstStyle/>
-          <a:p>
-            <a:pPr algn="ctr" eaLnBrk="1" fontAlgn="auto" hangingPunct="1">
-              <a:spcBef>
-                <a:spcPts val="0"/>
-              </a:spcBef>
-              <a:spcAft>
-                <a:spcPts val="0"/>
-              </a:spcAft>
-              <a:defRPr/>
-            </a:pPr>
-            <a:endParaRPr lang="de-DE" dirty="0">
-              <a:solidFill>
-                <a:srgbClr val="FFFFFF"/>
-              </a:solidFill>
-              <a:ea typeface="ＭＳ Ｐゴシック" pitchFamily="-105" charset="-128"/>
-              <a:cs typeface="ＭＳ Ｐゴシック" pitchFamily="-105" charset="-128"/>
-            </a:endParaRPr>
-          </a:p>
-        </p:txBody>
-      </p:sp>
-      <p:cxnSp>
-        <p:nvCxnSpPr>
-          <p:cNvPr id="22" name="Gerade Verbindung 21">
-            <a:extLst>
-              <a:ext uri="{FF2B5EF4-FFF2-40B4-BE49-F238E27FC236}">
-                <a16:creationId xmlns:a16="http://schemas.microsoft.com/office/drawing/2014/main" id="{B87587E1-BB3D-1147-AD5C-BA171BEC7294}"/>
-              </a:ext>
-            </a:extLst>
-          </p:cNvPr>
-          <p:cNvCxnSpPr>
-            <a:cxnSpLocks/>
-          </p:cNvCxnSpPr>
-          <p:nvPr userDrawn="1"/>
-        </p:nvCxnSpPr>
-        <p:spPr bwMode="auto">
-          <a:xfrm>
-            <a:off x="208761" y="518900"/>
-            <a:ext cx="8726479" cy="0"/>
-          </a:xfrm>
-          <a:prstGeom prst="line">
-            <a:avLst/>
-          </a:prstGeom>
-          <a:ln w="6350" cap="flat" cmpd="sng" algn="ctr">
-            <a:solidFill>
-              <a:schemeClr val="tx1"/>
-            </a:solidFill>
-            <a:prstDash val="solid"/>
-            <a:round/>
-            <a:headEnd type="none" w="med" len="med"/>
-            <a:tailEnd type="none" w="med" len="med"/>
-          </a:ln>
-          <a:effectLst/>
-        </p:spPr>
-        <p:style>
-          <a:lnRef idx="2">
-            <a:schemeClr val="accent1"/>
-          </a:lnRef>
-          <a:fillRef idx="0">
-            <a:schemeClr val="accent1"/>
-          </a:fillRef>
-          <a:effectRef idx="1">
-            <a:schemeClr val="accent1"/>
-          </a:effectRef>
-          <a:fontRef idx="minor">
-            <a:schemeClr val="tx1"/>
-          </a:fontRef>
-        </p:style>
-      </p:cxnSp>
-      <p:sp>
-        <p:nvSpPr>
-          <p:cNvPr id="2" name="Title Placeholder 1"/>
-          <p:cNvSpPr>
-            <a:spLocks noGrp="1"/>
-          </p:cNvSpPr>
-          <p:nvPr userDrawn="1">
-            <p:ph type="title"/>
-          </p:nvPr>
-        </p:nvSpPr>
-        <p:spPr>
-          <a:xfrm>
-            <a:off x="215502" y="91296"/>
-            <a:ext cx="7610061" cy="362266"/>
+            <a:off x="457200" y="205979"/>
+            <a:ext cx="8229600" cy="857250"/>
           </a:xfrm>
           <a:prstGeom prst="rect">
             <a:avLst/>
@@ -2584,7 +3170,7 @@
         </p:spPr>
         <p:txBody>
           <a:bodyPr vert="horz" lIns="91440" tIns="45720" rIns="91440" bIns="45720" rtlCol="0" anchor="ctr">
-            <a:noAutofit/>
+            <a:normAutofit/>
           </a:bodyPr>
           <a:lstStyle/>
           <a:p>
@@ -2601,14 +3187,14 @@
           <p:cNvSpPr>
             <a:spLocks noGrp="1"/>
           </p:cNvSpPr>
-          <p:nvPr userDrawn="1">
+          <p:nvPr>
             <p:ph type="body" idx="1"/>
           </p:nvPr>
         </p:nvSpPr>
         <p:spPr>
           <a:xfrm>
-            <a:off x="215502" y="579876"/>
-            <a:ext cx="8712996" cy="4700703"/>
+            <a:off x="457200" y="1200151"/>
+            <a:ext cx="8229600" cy="3394472"/>
           </a:xfrm>
           <a:prstGeom prst="rect">
             <a:avLst/>
@@ -2622,35 +3208,35 @@
           <a:p>
             <a:pPr lvl="0"/>
             <a:r>
-              <a:rPr lang="en-US" dirty="0"/>
+              <a:rPr lang="en-US"/>
               <a:t>Click to edit Master text styles</a:t>
             </a:r>
           </a:p>
           <a:p>
             <a:pPr lvl="1"/>
             <a:r>
-              <a:rPr lang="en-US" dirty="0"/>
+              <a:rPr lang="en-US"/>
               <a:t>Second level</a:t>
             </a:r>
           </a:p>
           <a:p>
             <a:pPr lvl="2"/>
             <a:r>
-              <a:rPr lang="en-US" dirty="0"/>
+              <a:rPr lang="en-US"/>
               <a:t>Third level</a:t>
             </a:r>
           </a:p>
           <a:p>
             <a:pPr lvl="3"/>
             <a:r>
-              <a:rPr lang="en-US" dirty="0"/>
+              <a:rPr lang="en-US"/>
               <a:t>Fourth level</a:t>
             </a:r>
           </a:p>
           <a:p>
             <a:pPr lvl="4"/>
             <a:r>
-              <a:rPr lang="en-US" dirty="0"/>
+              <a:rPr lang="en-US"/>
               <a:t>Fifth level</a:t>
             </a:r>
           </a:p>
@@ -2662,14 +3248,14 @@
           <p:cNvSpPr>
             <a:spLocks noGrp="1"/>
           </p:cNvSpPr>
-          <p:nvPr userDrawn="1">
+          <p:nvPr>
             <p:ph type="dt" sz="half" idx="2"/>
           </p:nvPr>
         </p:nvSpPr>
         <p:spPr>
           <a:xfrm>
-            <a:off x="3923819" y="5341554"/>
-            <a:ext cx="1250066" cy="304271"/>
+            <a:off x="457200" y="4767263"/>
+            <a:ext cx="2133600" cy="273844"/>
           </a:xfrm>
           <a:prstGeom prst="rect">
             <a:avLst/>
@@ -2678,46 +3264,39 @@
         <p:txBody>
           <a:bodyPr vert="horz" lIns="91440" tIns="45720" rIns="91440" bIns="45720" rtlCol="0" anchor="ctr"/>
           <a:lstStyle>
-            <a:lvl1pPr algn="ctr">
-              <a:defRPr sz="1200">
+            <a:lvl1pPr algn="l">
+              <a:defRPr sz="900">
                 <a:solidFill>
-                  <a:schemeClr val="bg1"/>
+                  <a:schemeClr val="tx1">
+                    <a:tint val="75000"/>
+                  </a:schemeClr>
                 </a:solidFill>
-                <a:latin typeface="Arial" panose="020B0604020202020204" pitchFamily="34" charset="0"/>
-                <a:cs typeface="Arial" panose="020B0604020202020204" pitchFamily="34" charset="0"/>
               </a:defRPr>
             </a:lvl1pPr>
           </a:lstStyle>
           <a:p>
-            <a:fld id="{1E7BDF19-69AE-D441-B72A-14F9C0B6F6C0}" type="datetime1">
-              <a:rPr lang="de-DE" smtClean="0"/>
-              <a:pPr/>
-              <a:t>02.06.21</a:t>
+            <a:fld id="{241EB5C9-1307-BA42-ABA2-0BC069CD8E7F}" type="datetimeFigureOut">
+              <a:rPr lang="en-US" smtClean="0"/>
+              <a:t>1/2/22</a:t>
             </a:fld>
-            <a:endParaRPr lang="en-US" dirty="0"/>
-          </a:p>
-        </p:txBody>
-      </p:sp>
-      <p:sp>
-        <p:nvSpPr>
-          <p:cNvPr id="7" name="Foliennummernplatzhalter 6">
-            <a:extLst>
-              <a:ext uri="{FF2B5EF4-FFF2-40B4-BE49-F238E27FC236}">
-                <a16:creationId xmlns:a16="http://schemas.microsoft.com/office/drawing/2014/main" id="{F996B784-B529-7A47-A772-C269F506D426}"/>
-              </a:ext>
-            </a:extLst>
-          </p:cNvPr>
-          <p:cNvSpPr>
-            <a:spLocks noGrp="1"/>
-          </p:cNvSpPr>
-          <p:nvPr>
-            <p:ph type="sldNum" sz="quarter" idx="4"/>
+            <a:endParaRPr lang="en-US"/>
+          </a:p>
+        </p:txBody>
+      </p:sp>
+      <p:sp>
+        <p:nvSpPr>
+          <p:cNvPr id="5" name="Footer Placeholder 4"/>
+          <p:cNvSpPr>
+            <a:spLocks noGrp="1"/>
+          </p:cNvSpPr>
+          <p:nvPr>
+            <p:ph type="ftr" sz="quarter" idx="3"/>
           </p:nvPr>
         </p:nvSpPr>
         <p:spPr>
           <a:xfrm>
-            <a:off x="215502" y="5353712"/>
-            <a:ext cx="503635" cy="303212"/>
+            <a:off x="3124200" y="4767263"/>
+            <a:ext cx="2895600" cy="273844"/>
           </a:xfrm>
           <a:prstGeom prst="rect">
             <a:avLst/>
@@ -2727,85 +3306,61 @@
           <a:bodyPr vert="horz" lIns="91440" tIns="45720" rIns="91440" bIns="45720" rtlCol="0" anchor="ctr"/>
           <a:lstStyle>
             <a:lvl1pPr algn="ctr">
-              <a:defRPr sz="1200">
+              <a:defRPr sz="900">
                 <a:solidFill>
-                  <a:schemeClr val="bg1"/>
+                  <a:schemeClr val="tx1">
+                    <a:tint val="75000"/>
+                  </a:schemeClr>
                 </a:solidFill>
-                <a:latin typeface="Arial" panose="020B0604020202020204" pitchFamily="34" charset="0"/>
-                <a:cs typeface="Arial" panose="020B0604020202020204" pitchFamily="34" charset="0"/>
               </a:defRPr>
             </a:lvl1pPr>
           </a:lstStyle>
           <a:p>
-            <a:fld id="{F9EA80F1-969D-7843-BBE2-853A1F17A34A}" type="slidenum">
-              <a:rPr lang="en-GB" smtClean="0"/>
-              <a:pPr/>
-              <a:t>‹Nr.›</a:t>
-            </a:fld>
-            <a:endParaRPr lang="en-GB" dirty="0"/>
-          </a:p>
-        </p:txBody>
-      </p:sp>
-      <p:pic>
-        <p:nvPicPr>
-          <p:cNvPr id="8" name="Grafik 7" descr="Ein Bild, das Text, ClipArt enthält.&#10;&#10;Automatisch generierte Beschreibung">
-            <a:extLst>
-              <a:ext uri="{FF2B5EF4-FFF2-40B4-BE49-F238E27FC236}">
-                <a16:creationId xmlns:a16="http://schemas.microsoft.com/office/drawing/2014/main" id="{1D7B79BC-A195-E94F-AA6F-F1229882FD2D}"/>
-              </a:ext>
-            </a:extLst>
-          </p:cNvPr>
-          <p:cNvPicPr>
-            <a:picLocks noChangeAspect="1"/>
-          </p:cNvPicPr>
-          <p:nvPr userDrawn="1"/>
-        </p:nvPicPr>
-        <p:blipFill>
-          <a:blip r:embed="rId8"/>
-          <a:stretch>
-            <a:fillRect/>
-          </a:stretch>
-        </p:blipFill>
+            <a:endParaRPr lang="en-US"/>
+          </a:p>
+        </p:txBody>
+      </p:sp>
+      <p:sp>
+        <p:nvSpPr>
+          <p:cNvPr id="6" name="Slide Number Placeholder 5"/>
+          <p:cNvSpPr>
+            <a:spLocks noGrp="1"/>
+          </p:cNvSpPr>
+          <p:nvPr>
+            <p:ph type="sldNum" sz="quarter" idx="4"/>
+          </p:nvPr>
+        </p:nvSpPr>
         <p:spPr>
           <a:xfrm>
-            <a:off x="7825563" y="91296"/>
-            <a:ext cx="1102935" cy="366988"/>
+            <a:off x="6553200" y="4767263"/>
+            <a:ext cx="2133600" cy="273844"/>
           </a:xfrm>
           <a:prstGeom prst="rect">
             <a:avLst/>
           </a:prstGeom>
         </p:spPr>
-      </p:pic>
-      <p:pic>
-        <p:nvPicPr>
-          <p:cNvPr id="11" name="Grafik 10" descr="Ein Bild, das Text enthält.&#10;&#10;Automatisch generierte Beschreibung">
-            <a:extLst>
-              <a:ext uri="{FF2B5EF4-FFF2-40B4-BE49-F238E27FC236}">
-                <a16:creationId xmlns:a16="http://schemas.microsoft.com/office/drawing/2014/main" id="{D58B9428-5BA9-314B-9FC0-2C6888D53F9F}"/>
-              </a:ext>
-            </a:extLst>
-          </p:cNvPr>
-          <p:cNvPicPr>
-            <a:picLocks noChangeAspect="1"/>
-          </p:cNvPicPr>
-          <p:nvPr userDrawn="1"/>
-        </p:nvPicPr>
-        <p:blipFill>
-          <a:blip r:embed="rId9"/>
-          <a:stretch>
-            <a:fillRect/>
-          </a:stretch>
-        </p:blipFill>
-        <p:spPr>
-          <a:xfrm>
-            <a:off x="8093862" y="5332237"/>
-            <a:ext cx="834636" cy="346162"/>
-          </a:xfrm>
-          <a:prstGeom prst="rect">
-            <a:avLst/>
-          </a:prstGeom>
-        </p:spPr>
-      </p:pic>
+        <p:txBody>
+          <a:bodyPr vert="horz" lIns="91440" tIns="45720" rIns="91440" bIns="45720" rtlCol="0" anchor="ctr"/>
+          <a:lstStyle>
+            <a:lvl1pPr algn="r">
+              <a:defRPr sz="900">
+                <a:solidFill>
+                  <a:schemeClr val="tx1">
+                    <a:tint val="75000"/>
+                  </a:schemeClr>
+                </a:solidFill>
+              </a:defRPr>
+            </a:lvl1pPr>
+          </a:lstStyle>
+          <a:p>
+            <a:fld id="{C5EF2332-01BF-834F-8236-50238282D533}" type="slidenum">
+              <a:rPr lang="en-US" smtClean="0"/>
+              <a:t>‹#›</a:t>
+            </a:fld>
+            <a:endParaRPr lang="en-US"/>
+          </a:p>
+        </p:txBody>
+      </p:sp>
     </p:spTree>
     <p:extLst>
       <p:ext uri="{BB962C8B-B14F-4D97-AF65-F5344CB8AC3E}">
@@ -2815,114 +3370,118 @@
   </p:cSld>
   <p:clrMap bg1="lt1" tx1="dk1" bg2="lt2" tx2="dk2" accent1="accent1" accent2="accent2" accent3="accent3" accent4="accent4" accent5="accent5" accent6="accent6" hlink="hlink" folHlink="folHlink"/>
   <p:sldLayoutIdLst>
-    <p:sldLayoutId id="2147483655" r:id="rId1"/>
+    <p:sldLayoutId id="2147483649" r:id="rId1"/>
     <p:sldLayoutId id="2147483650" r:id="rId2"/>
     <p:sldLayoutId id="2147483651" r:id="rId3"/>
     <p:sldLayoutId id="2147483652" r:id="rId4"/>
     <p:sldLayoutId id="2147483653" r:id="rId5"/>
     <p:sldLayoutId id="2147483654" r:id="rId6"/>
+    <p:sldLayoutId id="2147483655" r:id="rId7"/>
+    <p:sldLayoutId id="2147483656" r:id="rId8"/>
+    <p:sldLayoutId id="2147483657" r:id="rId9"/>
+    <p:sldLayoutId id="2147483658" r:id="rId10"/>
+    <p:sldLayoutId id="2147483659" r:id="rId11"/>
   </p:sldLayoutIdLst>
-  <p:hf hdr="0" ftr="0"/>
   <p:txStyles>
     <p:titleStyle>
-      <a:lvl1pPr algn="l" defTabSz="380985" rtl="0" eaLnBrk="1" latinLnBrk="0" hangingPunct="1">
+      <a:lvl1pPr algn="ctr" defTabSz="342900" rtl="0" eaLnBrk="1" latinLnBrk="0" hangingPunct="1">
         <a:spcBef>
           <a:spcPct val="0"/>
         </a:spcBef>
         <a:buNone/>
-        <a:defRPr sz="2000" kern="1200">
+        <a:defRPr sz="3300" kern="1200">
           <a:solidFill>
             <a:schemeClr val="tx1"/>
           </a:solidFill>
-          <a:latin typeface="Arial" panose="020B0604020202020204" pitchFamily="34" charset="0"/>
+          <a:latin typeface="+mj-lt"/>
           <a:ea typeface="+mj-ea"/>
-          <a:cs typeface="Arial" panose="020B0604020202020204" pitchFamily="34" charset="0"/>
+          <a:cs typeface="+mj-cs"/>
         </a:defRPr>
       </a:lvl1pPr>
     </p:titleStyle>
     <p:bodyStyle>
-      <a:lvl1pPr marL="285739" indent="-285739" algn="l" defTabSz="380985" rtl="0" eaLnBrk="1" latinLnBrk="0" hangingPunct="1">
+      <a:lvl1pPr marL="342900" indent="-342900" algn="l" defTabSz="342900" rtl="0" eaLnBrk="1" latinLnBrk="0" hangingPunct="1">
         <a:spcBef>
           <a:spcPct val="20000"/>
         </a:spcBef>
         <a:buFont typeface="Arial"/>
         <a:buChar char="•"/>
-        <a:defRPr sz="2000" kern="1200">
+        <a:defRPr sz="2400" kern="1200">
           <a:solidFill>
             <a:schemeClr val="tx1"/>
           </a:solidFill>
-          <a:latin typeface="Arial" panose="020B0604020202020204" pitchFamily="34" charset="0"/>
+          <a:latin typeface="+mn-lt"/>
           <a:ea typeface="+mn-ea"/>
-          <a:cs typeface="Arial" panose="020B0604020202020204" pitchFamily="34" charset="0"/>
+          <a:cs typeface="+mn-cs"/>
         </a:defRPr>
       </a:lvl1pPr>
-      <a:lvl2pPr marL="619100" indent="-238115" algn="l" defTabSz="380985" rtl="0" eaLnBrk="1" latinLnBrk="0" hangingPunct="1">
+      <a:lvl2pPr marL="685800" indent="-342900" algn="l" defTabSz="342900" rtl="0" eaLnBrk="1" latinLnBrk="0" hangingPunct="1">
         <a:spcBef>
           <a:spcPct val="20000"/>
         </a:spcBef>
         <a:buFont typeface="Arial"/>
         <a:buChar char="–"/>
-        <a:defRPr sz="1800" kern="1200">
+        <a:defRPr sz="2100" kern="1200">
           <a:solidFill>
             <a:schemeClr val="tx1"/>
           </a:solidFill>
-          <a:latin typeface="Arial" panose="020B0604020202020204" pitchFamily="34" charset="0"/>
+          <a:latin typeface="+mn-lt"/>
           <a:ea typeface="+mn-ea"/>
-          <a:cs typeface="Arial" panose="020B0604020202020204" pitchFamily="34" charset="0"/>
+          <a:cs typeface="+mn-cs"/>
         </a:defRPr>
       </a:lvl2pPr>
-      <a:lvl3pPr marL="952462" indent="-190492" algn="l" defTabSz="380985" rtl="0" eaLnBrk="1" latinLnBrk="0" hangingPunct="1">
+      <a:lvl3pPr marL="1028700" indent="-342900" algn="l" defTabSz="342900" rtl="0" eaLnBrk="1" latinLnBrk="0" hangingPunct="1">
         <a:spcBef>
           <a:spcPct val="20000"/>
         </a:spcBef>
         <a:buFont typeface="Arial"/>
         <a:buChar char="•"/>
-        <a:defRPr sz="1600" kern="1200">
+        <a:defRPr sz="1800" kern="1200">
           <a:solidFill>
             <a:schemeClr val="tx1"/>
           </a:solidFill>
-          <a:latin typeface="Arial" panose="020B0604020202020204" pitchFamily="34" charset="0"/>
+          <a:latin typeface="+mn-lt"/>
           <a:ea typeface="+mn-ea"/>
-          <a:cs typeface="Arial" panose="020B0604020202020204" pitchFamily="34" charset="0"/>
+          <a:cs typeface="+mn-cs"/>
         </a:defRPr>
       </a:lvl3pPr>
-      <a:lvl4pPr marL="1333447" indent="-190492" algn="l" defTabSz="380985" rtl="0" eaLnBrk="1" latinLnBrk="0" hangingPunct="1">
+      <a:lvl4pPr marL="1371600" indent="-342900" algn="l" defTabSz="342900" rtl="0" eaLnBrk="1" latinLnBrk="0" hangingPunct="1">
         <a:spcBef>
           <a:spcPct val="20000"/>
         </a:spcBef>
         <a:buFont typeface="Arial"/>
         <a:buChar char="–"/>
-        <a:defRPr sz="1400" kern="1200">
+        <a:defRPr sz="1500" kern="1200">
           <a:solidFill>
             <a:schemeClr val="tx1"/>
           </a:solidFill>
-          <a:latin typeface="Arial" panose="020B0604020202020204" pitchFamily="34" charset="0"/>
+          <a:latin typeface="+mn-lt"/>
           <a:ea typeface="+mn-ea"/>
-          <a:cs typeface="Arial" panose="020B0604020202020204" pitchFamily="34" charset="0"/>
+          <a:cs typeface="+mn-cs"/>
         </a:defRPr>
       </a:lvl4pPr>
-      <a:lvl5pPr marL="1714431" indent="-190492" algn="l" defTabSz="380985" rtl="0" eaLnBrk="1" latinLnBrk="0" hangingPunct="1">
+      <a:lvl5pPr marL="1714500" indent="-342900" algn="l" defTabSz="342900" rtl="0" eaLnBrk="1" latinLnBrk="0" hangingPunct="1">
         <a:spcBef>
           <a:spcPct val="20000"/>
         </a:spcBef>
         <a:buFont typeface="Arial"/>
         <a:buChar char="»"/>
-        <a:defRPr sz="1400" kern="1200">
+        <a:defRPr sz="1500" kern="1200">
           <a:solidFill>
             <a:schemeClr val="tx1"/>
           </a:solidFill>
-          <a:latin typeface="Arial" panose="020B0604020202020204" pitchFamily="34" charset="0"/>
+          <a:latin typeface="+mn-lt"/>
           <a:ea typeface="+mn-ea"/>
-          <a:cs typeface="Arial" panose="020B0604020202020204" pitchFamily="34" charset="0"/>
+          <a:cs typeface="+mn-cs"/>
         </a:defRPr>
       </a:lvl5pPr>
-      <a:lvl6pPr marL="2095416" indent="-190492" algn="l" defTabSz="380985" rtl="0" eaLnBrk="1" latinLnBrk="0" hangingPunct="1">
+      <a:lvl6pPr marL="2057400" indent="-342900" algn="l" defTabSz="342900" rtl="0" eaLnBrk="1" latinLnBrk="0" hangingPunct="1">
         <a:spcBef>
           <a:spcPct val="20000"/>
         </a:spcBef>
         <a:buFont typeface="Arial"/>
         <a:buChar char="•"/>
-        <a:defRPr sz="1667" kern="1200">
+        <a:defRPr sz="1500" kern="1200">
           <a:solidFill>
             <a:schemeClr val="tx1"/>
           </a:solidFill>
@@ -2931,13 +3490,13 @@
           <a:cs typeface="+mn-cs"/>
         </a:defRPr>
       </a:lvl6pPr>
-      <a:lvl7pPr marL="2476401" indent="-190492" algn="l" defTabSz="380985" rtl="0" eaLnBrk="1" latinLnBrk="0" hangingPunct="1">
+      <a:lvl7pPr marL="2400300" indent="-342900" algn="l" defTabSz="342900" rtl="0" eaLnBrk="1" latinLnBrk="0" hangingPunct="1">
         <a:spcBef>
           <a:spcPct val="20000"/>
         </a:spcBef>
         <a:buFont typeface="Arial"/>
         <a:buChar char="•"/>
-        <a:defRPr sz="1667" kern="1200">
+        <a:defRPr sz="1500" kern="1200">
           <a:solidFill>
             <a:schemeClr val="tx1"/>
           </a:solidFill>
@@ -2946,13 +3505,13 @@
           <a:cs typeface="+mn-cs"/>
         </a:defRPr>
       </a:lvl7pPr>
-      <a:lvl8pPr marL="2857386" indent="-190492" algn="l" defTabSz="380985" rtl="0" eaLnBrk="1" latinLnBrk="0" hangingPunct="1">
+      <a:lvl8pPr marL="2743200" indent="-342900" algn="l" defTabSz="342900" rtl="0" eaLnBrk="1" latinLnBrk="0" hangingPunct="1">
         <a:spcBef>
           <a:spcPct val="20000"/>
         </a:spcBef>
         <a:buFont typeface="Arial"/>
         <a:buChar char="•"/>
-        <a:defRPr sz="1667" kern="1200">
+        <a:defRPr sz="1500" kern="1200">
           <a:solidFill>
             <a:schemeClr val="tx1"/>
           </a:solidFill>
@@ -2961,13 +3520,13 @@
           <a:cs typeface="+mn-cs"/>
         </a:defRPr>
       </a:lvl8pPr>
-      <a:lvl9pPr marL="3238370" indent="-190492" algn="l" defTabSz="380985" rtl="0" eaLnBrk="1" latinLnBrk="0" hangingPunct="1">
+      <a:lvl9pPr marL="3086100" indent="-342900" algn="l" defTabSz="342900" rtl="0" eaLnBrk="1" latinLnBrk="0" hangingPunct="1">
         <a:spcBef>
           <a:spcPct val="20000"/>
         </a:spcBef>
         <a:buFont typeface="Arial"/>
         <a:buChar char="•"/>
-        <a:defRPr sz="1667" kern="1200">
+        <a:defRPr sz="1500" kern="1200">
           <a:solidFill>
             <a:schemeClr val="tx1"/>
           </a:solidFill>
@@ -2981,8 +3540,8 @@
       <a:defPPr>
         <a:defRPr lang="en-US"/>
       </a:defPPr>
-      <a:lvl1pPr marL="0" algn="l" defTabSz="380985" rtl="0" eaLnBrk="1" latinLnBrk="0" hangingPunct="1">
-        <a:defRPr sz="1500" kern="1200">
+      <a:lvl1pPr marL="0" algn="l" defTabSz="342900" rtl="0" eaLnBrk="1" latinLnBrk="0" hangingPunct="1">
+        <a:defRPr sz="1350" kern="1200">
           <a:solidFill>
             <a:schemeClr val="tx1"/>
           </a:solidFill>
@@ -2991,8 +3550,8 @@
           <a:cs typeface="+mn-cs"/>
         </a:defRPr>
       </a:lvl1pPr>
-      <a:lvl2pPr marL="380985" algn="l" defTabSz="380985" rtl="0" eaLnBrk="1" latinLnBrk="0" hangingPunct="1">
-        <a:defRPr sz="1500" kern="1200">
+      <a:lvl2pPr marL="342900" algn="l" defTabSz="342900" rtl="0" eaLnBrk="1" latinLnBrk="0" hangingPunct="1">
+        <a:defRPr sz="1350" kern="1200">
           <a:solidFill>
             <a:schemeClr val="tx1"/>
           </a:solidFill>
@@ -3001,8 +3560,8 @@
           <a:cs typeface="+mn-cs"/>
         </a:defRPr>
       </a:lvl2pPr>
-      <a:lvl3pPr marL="761970" algn="l" defTabSz="380985" rtl="0" eaLnBrk="1" latinLnBrk="0" hangingPunct="1">
-        <a:defRPr sz="1500" kern="1200">
+      <a:lvl3pPr marL="685800" algn="l" defTabSz="342900" rtl="0" eaLnBrk="1" latinLnBrk="0" hangingPunct="1">
+        <a:defRPr sz="1350" kern="1200">
           <a:solidFill>
             <a:schemeClr val="tx1"/>
           </a:solidFill>
@@ -3011,8 +3570,8 @@
           <a:cs typeface="+mn-cs"/>
         </a:defRPr>
       </a:lvl3pPr>
-      <a:lvl4pPr marL="1142954" algn="l" defTabSz="380985" rtl="0" eaLnBrk="1" latinLnBrk="0" hangingPunct="1">
-        <a:defRPr sz="1500" kern="1200">
+      <a:lvl4pPr marL="1028700" algn="l" defTabSz="342900" rtl="0" eaLnBrk="1" latinLnBrk="0" hangingPunct="1">
+        <a:defRPr sz="1350" kern="1200">
           <a:solidFill>
             <a:schemeClr val="tx1"/>
           </a:solidFill>
@@ -3021,8 +3580,8 @@
           <a:cs typeface="+mn-cs"/>
         </a:defRPr>
       </a:lvl4pPr>
-      <a:lvl5pPr marL="1523939" algn="l" defTabSz="380985" rtl="0" eaLnBrk="1" latinLnBrk="0" hangingPunct="1">
-        <a:defRPr sz="1500" kern="1200">
+      <a:lvl5pPr marL="1371600" algn="l" defTabSz="342900" rtl="0" eaLnBrk="1" latinLnBrk="0" hangingPunct="1">
+        <a:defRPr sz="1350" kern="1200">
           <a:solidFill>
             <a:schemeClr val="tx1"/>
           </a:solidFill>
@@ -3031,8 +3590,8 @@
           <a:cs typeface="+mn-cs"/>
         </a:defRPr>
       </a:lvl5pPr>
-      <a:lvl6pPr marL="1904924" algn="l" defTabSz="380985" rtl="0" eaLnBrk="1" latinLnBrk="0" hangingPunct="1">
-        <a:defRPr sz="1500" kern="1200">
+      <a:lvl6pPr marL="1714500" algn="l" defTabSz="342900" rtl="0" eaLnBrk="1" latinLnBrk="0" hangingPunct="1">
+        <a:defRPr sz="1350" kern="1200">
           <a:solidFill>
             <a:schemeClr val="tx1"/>
           </a:solidFill>
@@ -3041,8 +3600,8 @@
           <a:cs typeface="+mn-cs"/>
         </a:defRPr>
       </a:lvl6pPr>
-      <a:lvl7pPr marL="2285909" algn="l" defTabSz="380985" rtl="0" eaLnBrk="1" latinLnBrk="0" hangingPunct="1">
-        <a:defRPr sz="1500" kern="1200">
+      <a:lvl7pPr marL="2057400" algn="l" defTabSz="342900" rtl="0" eaLnBrk="1" latinLnBrk="0" hangingPunct="1">
+        <a:defRPr sz="1350" kern="1200">
           <a:solidFill>
             <a:schemeClr val="tx1"/>
           </a:solidFill>
@@ -3051,8 +3610,8 @@
           <a:cs typeface="+mn-cs"/>
         </a:defRPr>
       </a:lvl7pPr>
-      <a:lvl8pPr marL="2666893" algn="l" defTabSz="380985" rtl="0" eaLnBrk="1" latinLnBrk="0" hangingPunct="1">
-        <a:defRPr sz="1500" kern="1200">
+      <a:lvl8pPr marL="2400300" algn="l" defTabSz="342900" rtl="0" eaLnBrk="1" latinLnBrk="0" hangingPunct="1">
+        <a:defRPr sz="1350" kern="1200">
           <a:solidFill>
             <a:schemeClr val="tx1"/>
           </a:solidFill>
@@ -3061,8 +3620,8 @@
           <a:cs typeface="+mn-cs"/>
         </a:defRPr>
       </a:lvl8pPr>
-      <a:lvl9pPr marL="3047878" algn="l" defTabSz="380985" rtl="0" eaLnBrk="1" latinLnBrk="0" hangingPunct="1">
-        <a:defRPr sz="1500" kern="1200">
+      <a:lvl9pPr marL="2743200" algn="l" defTabSz="342900" rtl="0" eaLnBrk="1" latinLnBrk="0" hangingPunct="1">
+        <a:defRPr sz="1350" kern="1200">
           <a:solidFill>
             <a:schemeClr val="tx1"/>
           </a:solidFill>
@@ -3095,21 +3654,7 @@
       </p:grpSpPr>
       <p:sp>
         <p:nvSpPr>
-          <p:cNvPr id="2" name=" 1"/>
-          <p:cNvSpPr/>
-          <p:nvPr/>
-        </p:nvSpPr>
-        <p:spPr/>
-      </p:sp>
-      <p:sp>
-        <p:nvSpPr>
-          <p:cNvPr id="4" name="Titel 3">
-            <a:extLst>
-              <a:ext uri="{FF2B5EF4-FFF2-40B4-BE49-F238E27FC236}">
-                <a16:creationId xmlns:a16="http://schemas.microsoft.com/office/drawing/2014/main" id="{FE804479-4627-0442-9A7F-8AB043CE594A}"/>
-              </a:ext>
-            </a:extLst>
-          </p:cNvPr>
+          <p:cNvPr id="2" name="Title 1"/>
           <p:cNvSpPr>
             <a:spLocks noGrp="1"/>
           </p:cNvSpPr>
@@ -3122,19 +3667,16 @@
           <a:bodyPr/>
           <a:lstStyle/>
           <a:p>
-            <a:endParaRPr lang="en-GB"/>
-          </a:p>
-        </p:txBody>
-      </p:sp>
-      <p:sp>
-        <p:nvSpPr>
-          <p:cNvPr id="5" name="Untertitel 4">
-            <a:extLst>
-              <a:ext uri="{FF2B5EF4-FFF2-40B4-BE49-F238E27FC236}">
-                <a16:creationId xmlns:a16="http://schemas.microsoft.com/office/drawing/2014/main" id="{DD54AEDE-D547-714C-99FD-8521BF38E8ED}"/>
-              </a:ext>
-            </a:extLst>
-          </p:cNvPr>
+            <a:r>
+              <a:rPr lang="en-US" dirty="0"/>
+              <a:t>Presentation Title</a:t>
+            </a:r>
+          </a:p>
+        </p:txBody>
+      </p:sp>
+      <p:sp>
+        <p:nvSpPr>
+          <p:cNvPr id="3" name="Subtitle 2"/>
           <p:cNvSpPr>
             <a:spLocks noGrp="1"/>
           </p:cNvSpPr>
@@ -3147,70 +3689,271 @@
           <a:bodyPr/>
           <a:lstStyle/>
           <a:p>
-            <a:endParaRPr lang="en-GB"/>
-          </a:p>
-        </p:txBody>
-      </p:sp>
-      <p:sp>
-        <p:nvSpPr>
-          <p:cNvPr id="6" name="Datumsplatzhalter 5">
-            <a:extLst>
-              <a:ext uri="{FF2B5EF4-FFF2-40B4-BE49-F238E27FC236}">
-                <a16:creationId xmlns:a16="http://schemas.microsoft.com/office/drawing/2014/main" id="{929318B2-A9E9-BE48-A177-AC5B0EE21F62}"/>
-              </a:ext>
-            </a:extLst>
-          </p:cNvPr>
-          <p:cNvSpPr>
-            <a:spLocks noGrp="1"/>
-          </p:cNvSpPr>
-          <p:nvPr>
-            <p:ph type="dt" sz="half" idx="10"/>
-          </p:nvPr>
-        </p:nvSpPr>
-        <p:spPr/>
-        <p:txBody>
-          <a:bodyPr/>
-          <a:lstStyle/>
-          <a:p>
-            <a:fld id="{B6310C1D-D9E8-1742-8052-B258C4C6E9C3}" type="datetime1">
-              <a:rPr lang="de-DE" smtClean="0"/>
-              <a:t>02.06.21</a:t>
-            </a:fld>
+            <a:r>
+              <a:rPr lang="en-US" dirty="0"/>
+              <a:t>Presentation Subtitle</a:t>
+            </a:r>
+          </a:p>
+        </p:txBody>
+      </p:sp>
+    </p:spTree>
+    <p:extLst>
+      <p:ext uri="{BB962C8B-B14F-4D97-AF65-F5344CB8AC3E}">
+        <p14:creationId xmlns:p14="http://schemas.microsoft.com/office/powerpoint/2010/main" val="392669009"/>
+      </p:ext>
+    </p:extLst>
+  </p:cSld>
+  <p:clrMapOvr>
+    <a:masterClrMapping/>
+  </p:clrMapOvr>
+</p:sld>
+</file>
+
+<file path=ppt/slides/slide2.xml><?xml version="1.0" encoding="utf-8"?>
+<p:sld xmlns:a="http://schemas.openxmlformats.org/drawingml/2006/main" xmlns:r="http://schemas.openxmlformats.org/officeDocument/2006/relationships" xmlns:p="http://schemas.openxmlformats.org/presentationml/2006/main">
+  <p:cSld>
+    <p:spTree>
+      <p:nvGrpSpPr>
+        <p:cNvPr id="1" name=""/>
+        <p:cNvGrpSpPr/>
+        <p:nvPr/>
+      </p:nvGrpSpPr>
+      <p:grpSpPr>
+        <a:xfrm>
+          <a:off x="0" y="0"/>
+          <a:ext cx="0" cy="0"/>
+          <a:chOff x="0" y="0"/>
+          <a:chExt cx="0" cy="0"/>
+        </a:xfrm>
+      </p:grpSpPr>
+      <p:sp>
+        <p:nvSpPr>
+          <p:cNvPr id="2" name="Title 1"/>
+          <p:cNvSpPr>
+            <a:spLocks noGrp="1"/>
+          </p:cNvSpPr>
+          <p:nvPr>
+            <p:ph type="title"/>
+          </p:nvPr>
+        </p:nvSpPr>
+        <p:spPr/>
+        <p:txBody>
+          <a:bodyPr/>
+          <a:lstStyle/>
+          <a:p>
+            <a:r>
+              <a:rPr lang="en-US" dirty="0"/>
+              <a:t>Slide Title</a:t>
+            </a:r>
+          </a:p>
+        </p:txBody>
+      </p:sp>
+      <p:sp>
+        <p:nvSpPr>
+          <p:cNvPr id="3" name="Content Placeholder 2"/>
+          <p:cNvSpPr>
+            <a:spLocks noGrp="1"/>
+          </p:cNvSpPr>
+          <p:nvPr>
+            <p:ph idx="1"/>
+          </p:nvPr>
+        </p:nvSpPr>
+        <p:spPr/>
+        <p:txBody>
+          <a:bodyPr/>
+          <a:lstStyle/>
+          <a:p>
+            <a:pPr marL="0" indent="0">
+              <a:buNone/>
+            </a:pPr>
+            <a:r>
+              <a:rPr lang="en-US" dirty="0"/>
+              <a:t>Hello</a:t>
+            </a:r>
+            <a:r>
+              <a:rPr lang="en-US"/>
+              <a:t>, world.</a:t>
+            </a:r>
+          </a:p>
+        </p:txBody>
+      </p:sp>
+    </p:spTree>
+    <p:extLst>
+      <p:ext uri="{BB962C8B-B14F-4D97-AF65-F5344CB8AC3E}">
+        <p14:creationId xmlns:p14="http://schemas.microsoft.com/office/powerpoint/2010/main" val="572707455"/>
+      </p:ext>
+    </p:extLst>
+  </p:cSld>
+  <p:clrMapOvr>
+    <a:masterClrMapping/>
+  </p:clrMapOvr>
+</p:sld>
+</file>
+
+<file path=ppt/slides/slide3.xml><?xml version="1.0" encoding="utf-8"?>
+<p:sld xmlns:a="http://schemas.openxmlformats.org/drawingml/2006/main" xmlns:r="http://schemas.openxmlformats.org/officeDocument/2006/relationships" xmlns:p="http://schemas.openxmlformats.org/presentationml/2006/main">
+  <p:cSld>
+    <p:spTree>
+      <p:nvGrpSpPr>
+        <p:cNvPr id="1" name=""/>
+        <p:cNvGrpSpPr/>
+        <p:nvPr/>
+      </p:nvGrpSpPr>
+      <p:grpSpPr>
+        <a:xfrm>
+          <a:off x="0" y="0"/>
+          <a:ext cx="0" cy="0"/>
+          <a:chOff x="0" y="0"/>
+          <a:chExt cx="0" cy="0"/>
+        </a:xfrm>
+      </p:grpSpPr>
+      <p:sp>
+        <p:nvSpPr>
+          <p:cNvPr id="2" name="Title 1"/>
+          <p:cNvSpPr>
+            <a:spLocks noGrp="1"/>
+          </p:cNvSpPr>
+          <p:nvPr>
+            <p:ph type="title"/>
+          </p:nvPr>
+        </p:nvSpPr>
+        <p:spPr/>
+        <p:txBody>
+          <a:bodyPr/>
+          <a:lstStyle/>
+          <a:p>
+            <a:r>
+              <a:rPr lang="en-US" dirty="0"/>
+              <a:t>Section header</a:t>
+            </a:r>
+          </a:p>
+        </p:txBody>
+      </p:sp>
+      <p:sp>
+        <p:nvSpPr>
+          <p:cNvPr id="3" name="Text Placeholder 2"/>
+          <p:cNvSpPr>
+            <a:spLocks noGrp="1"/>
+          </p:cNvSpPr>
+          <p:nvPr>
+            <p:ph type="body" idx="1"/>
+          </p:nvPr>
+        </p:nvSpPr>
+        <p:spPr/>
+      </p:sp>
+    </p:spTree>
+    <p:extLst>
+      <p:ext uri="{BB962C8B-B14F-4D97-AF65-F5344CB8AC3E}">
+        <p14:creationId xmlns:p14="http://schemas.microsoft.com/office/powerpoint/2010/main" val="3996781534"/>
+      </p:ext>
+    </p:extLst>
+  </p:cSld>
+  <p:clrMapOvr>
+    <a:masterClrMapping/>
+  </p:clrMapOvr>
+</p:sld>
+</file>
+
+<file path=ppt/slides/slide4.xml><?xml version="1.0" encoding="utf-8"?>
+<p:sld xmlns:a="http://schemas.openxmlformats.org/drawingml/2006/main" xmlns:r="http://schemas.openxmlformats.org/officeDocument/2006/relationships" xmlns:p="http://schemas.openxmlformats.org/presentationml/2006/main">
+  <p:cSld>
+    <p:spTree>
+      <p:nvGrpSpPr>
+        <p:cNvPr id="1" name=""/>
+        <p:cNvGrpSpPr/>
+        <p:nvPr/>
+      </p:nvGrpSpPr>
+      <p:grpSpPr>
+        <a:xfrm>
+          <a:off x="0" y="0"/>
+          <a:ext cx="0" cy="0"/>
+          <a:chOff x="0" y="0"/>
+          <a:chExt cx="0" cy="0"/>
+        </a:xfrm>
+      </p:grpSpPr>
+      <p:sp>
+        <p:nvSpPr>
+          <p:cNvPr id="4" name="Title 3"/>
+          <p:cNvSpPr>
+            <a:spLocks noGrp="1"/>
+          </p:cNvSpPr>
+          <p:nvPr>
+            <p:ph type="title"/>
+          </p:nvPr>
+        </p:nvSpPr>
+        <p:spPr/>
+        <p:txBody>
+          <a:bodyPr/>
+          <a:lstStyle/>
+          <a:p>
+            <a:r>
+              <a:rPr lang="en-US" dirty="0"/>
+              <a:t>Slide Title for Two-Content</a:t>
+            </a:r>
+          </a:p>
+        </p:txBody>
+      </p:sp>
+      <p:sp>
+        <p:nvSpPr>
+          <p:cNvPr id="5" name="Content Placeholder 4"/>
+          <p:cNvSpPr>
+            <a:spLocks noGrp="1"/>
+          </p:cNvSpPr>
+          <p:nvPr>
+            <p:ph sz="half" idx="1"/>
+          </p:nvPr>
+        </p:nvSpPr>
+        <p:spPr/>
+        <p:txBody>
+          <a:bodyPr/>
+          <a:lstStyle/>
+          <a:p>
+            <a:r>
+              <a:rPr lang="en-US" dirty="0"/>
+              <a:t>Some content on </a:t>
+            </a:r>
+            <a:r>
+              <a:rPr lang="en-US"/>
+              <a:t>the left.</a:t>
+            </a:r>
             <a:endParaRPr lang="en-US" dirty="0"/>
           </a:p>
-        </p:txBody>
-      </p:sp>
-      <p:sp>
-        <p:nvSpPr>
-          <p:cNvPr id="7" name="Foliennummernplatzhalter 6">
-            <a:extLst>
-              <a:ext uri="{FF2B5EF4-FFF2-40B4-BE49-F238E27FC236}">
-                <a16:creationId xmlns:a16="http://schemas.microsoft.com/office/drawing/2014/main" id="{69E49F9C-F9C0-0D4A-9F3A-0B3B7423F4B5}"/>
-              </a:ext>
-            </a:extLst>
-          </p:cNvPr>
-          <p:cNvSpPr>
-            <a:spLocks noGrp="1"/>
-          </p:cNvSpPr>
-          <p:nvPr>
-            <p:ph type="sldNum" sz="quarter" idx="12"/>
-          </p:nvPr>
-        </p:nvSpPr>
-        <p:spPr/>
-        <p:txBody>
-          <a:bodyPr/>
-          <a:lstStyle/>
-          <a:p>
-            <a:fld id="{F9EA80F1-969D-7843-BBE2-853A1F17A34A}" type="slidenum">
-              <a:rPr lang="en-GB" smtClean="0"/>
-              <a:pPr/>
-              <a:t>1</a:t>
-            </a:fld>
-            <a:endParaRPr lang="en-GB" dirty="0"/>
+          <a:p>
+            <a:pPr marL="0" indent="0">
+              <a:buNone/>
+            </a:pPr>
+            <a:endParaRPr lang="en-US" dirty="0"/>
+          </a:p>
+        </p:txBody>
+      </p:sp>
+      <p:sp>
+        <p:nvSpPr>
+          <p:cNvPr id="6" name="Content Placeholder 5"/>
+          <p:cNvSpPr>
+            <a:spLocks noGrp="1"/>
+          </p:cNvSpPr>
+          <p:nvPr>
+            <p:ph sz="half" idx="2"/>
+          </p:nvPr>
+        </p:nvSpPr>
+        <p:spPr/>
+        <p:txBody>
+          <a:bodyPr/>
+          <a:lstStyle/>
+          <a:p>
+            <a:r>
+              <a:rPr lang="en-US" dirty="0"/>
+              <a:t>Some content on the right.</a:t>
+            </a:r>
           </a:p>
         </p:txBody>
       </p:sp>
     </p:spTree>
+    <p:extLst>
+      <p:ext uri="{BB962C8B-B14F-4D97-AF65-F5344CB8AC3E}">
+        <p14:creationId xmlns:p14="http://schemas.microsoft.com/office/powerpoint/2010/main" val="1324621109"/>
+      </p:ext>
+    </p:extLst>
   </p:cSld>
   <p:clrMapOvr>
     <a:masterClrMapping/>
@@ -3539,7 +4282,7 @@
 </file>
 
 <file path=ppt/theme/theme2.xml><?xml version="1.0" encoding="utf-8"?>
-<a:theme xmlns:a="http://schemas.openxmlformats.org/drawingml/2006/main" name="Office">
+<a:theme xmlns:a="http://schemas.openxmlformats.org/drawingml/2006/main" name="Office Theme">
   <a:themeElements>
     <a:clrScheme name="Office">
       <a:dk1>
@@ -3555,7 +4298,7 @@
         <a:srgbClr val="E7E6E6"/>
       </a:lt2>
       <a:accent1>
-        <a:srgbClr val="4472C4"/>
+        <a:srgbClr val="5B9BD5"/>
       </a:accent1>
       <a:accent2>
         <a:srgbClr val="ED7D31"/>
@@ -3567,7 +4310,7 @@
         <a:srgbClr val="FFC000"/>
       </a:accent4>
       <a:accent5>
-        <a:srgbClr val="5B9BD5"/>
+        <a:srgbClr val="4472C4"/>
       </a:accent5>
       <a:accent6>
         <a:srgbClr val="70AD47"/>
@@ -3584,9 +4327,9 @@
         <a:latin typeface="Calibri Light" panose="020F0302020204030204"/>
         <a:ea typeface=""/>
         <a:cs typeface=""/>
-        <a:font script="Jpan" typeface="游ゴシック Light"/>
+        <a:font script="Jpan" typeface="ＭＳ Ｐゴシック"/>
         <a:font script="Hang" typeface="맑은 고딕"/>
-        <a:font script="Hans" typeface="等线 Light"/>
+        <a:font script="Hans" typeface="宋体"/>
         <a:font script="Hant" typeface="新細明體"/>
         <a:font script="Arab" typeface="Times New Roman"/>
         <a:font script="Hebr" typeface="Times New Roman"/>
@@ -3614,31 +4357,14 @@
         <a:font script="Viet" typeface="Times New Roman"/>
         <a:font script="Uigh" typeface="Microsoft Uighur"/>
         <a:font script="Geor" typeface="Sylfaen"/>
-        <a:font script="Armn" typeface="Arial"/>
-        <a:font script="Bugi" typeface="Leelawadee UI"/>
-        <a:font script="Bopo" typeface="Microsoft JhengHei"/>
-        <a:font script="Java" typeface="Javanese Text"/>
-        <a:font script="Lisu" typeface="Segoe UI"/>
-        <a:font script="Mymr" typeface="Myanmar Text"/>
-        <a:font script="Nkoo" typeface="Ebrima"/>
-        <a:font script="Olck" typeface="Nirmala UI"/>
-        <a:font script="Osma" typeface="Ebrima"/>
-        <a:font script="Phag" typeface="Phagspa"/>
-        <a:font script="Syrn" typeface="Estrangelo Edessa"/>
-        <a:font script="Syrj" typeface="Estrangelo Edessa"/>
-        <a:font script="Syre" typeface="Estrangelo Edessa"/>
-        <a:font script="Sora" typeface="Nirmala UI"/>
-        <a:font script="Tale" typeface="Microsoft Tai Le"/>
-        <a:font script="Talu" typeface="Microsoft New Tai Lue"/>
-        <a:font script="Tfng" typeface="Ebrima"/>
       </a:majorFont>
       <a:minorFont>
         <a:latin typeface="Calibri" panose="020F0502020204030204"/>
         <a:ea typeface=""/>
         <a:cs typeface=""/>
-        <a:font script="Jpan" typeface="游ゴシック"/>
+        <a:font script="Jpan" typeface="ＭＳ Ｐゴシック"/>
         <a:font script="Hang" typeface="맑은 고딕"/>
-        <a:font script="Hans" typeface="等线"/>
+        <a:font script="Hans" typeface="宋体"/>
         <a:font script="Hant" typeface="新細明體"/>
         <a:font script="Arab" typeface="Arial"/>
         <a:font script="Hebr" typeface="Arial"/>
@@ -3666,23 +4392,6 @@
         <a:font script="Viet" typeface="Arial"/>
         <a:font script="Uigh" typeface="Microsoft Uighur"/>
         <a:font script="Geor" typeface="Sylfaen"/>
-        <a:font script="Armn" typeface="Arial"/>
-        <a:font script="Bugi" typeface="Leelawadee UI"/>
-        <a:font script="Bopo" typeface="Microsoft JhengHei"/>
-        <a:font script="Java" typeface="Javanese Text"/>
-        <a:font script="Lisu" typeface="Segoe UI"/>
-        <a:font script="Mymr" typeface="Myanmar Text"/>
-        <a:font script="Nkoo" typeface="Ebrima"/>
-        <a:font script="Olck" typeface="Nirmala UI"/>
-        <a:font script="Osma" typeface="Ebrima"/>
-        <a:font script="Phag" typeface="Phagspa"/>
-        <a:font script="Syrn" typeface="Estrangelo Edessa"/>
-        <a:font script="Syrj" typeface="Estrangelo Edessa"/>
-        <a:font script="Syre" typeface="Estrangelo Edessa"/>
-        <a:font script="Sora" typeface="Nirmala UI"/>
-        <a:font script="Tale" typeface="Microsoft Tai Le"/>
-        <a:font script="Talu" typeface="Microsoft New Tai Lue"/>
-        <a:font script="Tfng" typeface="Ebrima"/>
       </a:minorFont>
     </a:fontScheme>
     <a:fmtScheme name="Office">

</xml_diff>

<commit_message>
small changes to presentation template
</commit_message>
<xml_diff>
--- a/markdown/template.pptx
+++ b/markdown/template.pptx
@@ -211,7 +211,7 @@
           <a:p>
             <a:fld id="{0F9C1CCF-B725-44A7-AA57-5E433BD85C9F}" type="datetimeFigureOut">
               <a:rPr lang="en-US" smtClean="0"/>
-              <a:t>1/2/22</a:t>
+              <a:t>3/15/25</a:t>
             </a:fld>
             <a:endParaRPr lang="en-US"/>
           </a:p>
@@ -369,7 +369,7 @@
           <a:p>
             <a:fld id="{18BDFEC3-8487-43E8-A154-7C12CBC1FFF2}" type="slidenum">
               <a:rPr lang="en-US" smtClean="0"/>
-              <a:t>‹#›</a:t>
+              <a:t>‹Nr.›</a:t>
             </a:fld>
             <a:endParaRPr lang="en-US"/>
           </a:p>
@@ -864,7 +864,7 @@
           <a:p>
             <a:fld id="{241EB5C9-1307-BA42-ABA2-0BC069CD8E7F}" type="datetimeFigureOut">
               <a:rPr lang="en-US" smtClean="0"/>
-              <a:t>1/2/22</a:t>
+              <a:t>3/15/25</a:t>
             </a:fld>
             <a:endParaRPr lang="en-US"/>
           </a:p>
@@ -906,7 +906,7 @@
           <a:p>
             <a:fld id="{C5EF2332-01BF-834F-8236-50238282D533}" type="slidenum">
               <a:rPr lang="en-US" smtClean="0"/>
-              <a:t>‹#›</a:t>
+              <a:t>‹Nr.›</a:t>
             </a:fld>
             <a:endParaRPr lang="en-US"/>
           </a:p>
@@ -1032,7 +1032,7 @@
           <a:p>
             <a:fld id="{241EB5C9-1307-BA42-ABA2-0BC069CD8E7F}" type="datetimeFigureOut">
               <a:rPr lang="en-US" smtClean="0"/>
-              <a:t>1/2/22</a:t>
+              <a:t>3/15/25</a:t>
             </a:fld>
             <a:endParaRPr lang="en-US"/>
           </a:p>
@@ -1074,7 +1074,7 @@
           <a:p>
             <a:fld id="{C5EF2332-01BF-834F-8236-50238282D533}" type="slidenum">
               <a:rPr lang="en-US" smtClean="0"/>
-              <a:t>‹#›</a:t>
+              <a:t>‹Nr.›</a:t>
             </a:fld>
             <a:endParaRPr lang="en-US"/>
           </a:p>
@@ -1210,7 +1210,7 @@
           <a:p>
             <a:fld id="{241EB5C9-1307-BA42-ABA2-0BC069CD8E7F}" type="datetimeFigureOut">
               <a:rPr lang="en-US" smtClean="0"/>
-              <a:t>1/2/22</a:t>
+              <a:t>3/15/25</a:t>
             </a:fld>
             <a:endParaRPr lang="en-US"/>
           </a:p>
@@ -1252,7 +1252,7 @@
           <a:p>
             <a:fld id="{C5EF2332-01BF-834F-8236-50238282D533}" type="slidenum">
               <a:rPr lang="en-US" smtClean="0"/>
-              <a:t>‹#›</a:t>
+              <a:t>‹Nr.›</a:t>
             </a:fld>
             <a:endParaRPr lang="en-US"/>
           </a:p>
@@ -1378,7 +1378,7 @@
           <a:p>
             <a:fld id="{241EB5C9-1307-BA42-ABA2-0BC069CD8E7F}" type="datetimeFigureOut">
               <a:rPr lang="en-US" smtClean="0"/>
-              <a:t>1/2/22</a:t>
+              <a:t>3/15/25</a:t>
             </a:fld>
             <a:endParaRPr lang="en-US"/>
           </a:p>
@@ -1420,7 +1420,7 @@
           <a:p>
             <a:fld id="{C5EF2332-01BF-834F-8236-50238282D533}" type="slidenum">
               <a:rPr lang="en-US" smtClean="0"/>
-              <a:t>‹#›</a:t>
+              <a:t>‹Nr.›</a:t>
             </a:fld>
             <a:endParaRPr lang="en-US"/>
           </a:p>
@@ -1623,7 +1623,7 @@
           <a:p>
             <a:fld id="{241EB5C9-1307-BA42-ABA2-0BC069CD8E7F}" type="datetimeFigureOut">
               <a:rPr lang="en-US" smtClean="0"/>
-              <a:t>1/2/22</a:t>
+              <a:t>3/15/25</a:t>
             </a:fld>
             <a:endParaRPr lang="en-US"/>
           </a:p>
@@ -1665,7 +1665,7 @@
           <a:p>
             <a:fld id="{C5EF2332-01BF-834F-8236-50238282D533}" type="slidenum">
               <a:rPr lang="en-US" smtClean="0"/>
-              <a:t>‹#›</a:t>
+              <a:t>‹Nr.›</a:t>
             </a:fld>
             <a:endParaRPr lang="en-US"/>
           </a:p>
@@ -1908,7 +1908,7 @@
           <a:p>
             <a:fld id="{241EB5C9-1307-BA42-ABA2-0BC069CD8E7F}" type="datetimeFigureOut">
               <a:rPr lang="en-US" smtClean="0"/>
-              <a:t>1/2/22</a:t>
+              <a:t>3/15/25</a:t>
             </a:fld>
             <a:endParaRPr lang="en-US"/>
           </a:p>
@@ -1950,7 +1950,7 @@
           <a:p>
             <a:fld id="{C5EF2332-01BF-834F-8236-50238282D533}" type="slidenum">
               <a:rPr lang="en-US" smtClean="0"/>
-              <a:t>‹#›</a:t>
+              <a:t>‹Nr.›</a:t>
             </a:fld>
             <a:endParaRPr lang="en-US"/>
           </a:p>
@@ -2327,7 +2327,7 @@
           <a:p>
             <a:fld id="{241EB5C9-1307-BA42-ABA2-0BC069CD8E7F}" type="datetimeFigureOut">
               <a:rPr lang="en-US" smtClean="0"/>
-              <a:t>1/2/22</a:t>
+              <a:t>3/15/25</a:t>
             </a:fld>
             <a:endParaRPr lang="en-US"/>
           </a:p>
@@ -2369,7 +2369,7 @@
           <a:p>
             <a:fld id="{C5EF2332-01BF-834F-8236-50238282D533}" type="slidenum">
               <a:rPr lang="en-US" smtClean="0"/>
-              <a:t>‹#›</a:t>
+              <a:t>‹Nr.›</a:t>
             </a:fld>
             <a:endParaRPr lang="en-US"/>
           </a:p>
@@ -2444,7 +2444,7 @@
           <a:p>
             <a:fld id="{241EB5C9-1307-BA42-ABA2-0BC069CD8E7F}" type="datetimeFigureOut">
               <a:rPr lang="en-US" smtClean="0"/>
-              <a:t>1/2/22</a:t>
+              <a:t>3/15/25</a:t>
             </a:fld>
             <a:endParaRPr lang="en-US"/>
           </a:p>
@@ -2486,7 +2486,7 @@
           <a:p>
             <a:fld id="{C5EF2332-01BF-834F-8236-50238282D533}" type="slidenum">
               <a:rPr lang="en-US" smtClean="0"/>
-              <a:t>‹#›</a:t>
+              <a:t>‹Nr.›</a:t>
             </a:fld>
             <a:endParaRPr lang="en-US"/>
           </a:p>
@@ -2539,7 +2539,7 @@
           <a:p>
             <a:fld id="{241EB5C9-1307-BA42-ABA2-0BC069CD8E7F}" type="datetimeFigureOut">
               <a:rPr lang="en-US" smtClean="0"/>
-              <a:t>1/2/22</a:t>
+              <a:t>3/15/25</a:t>
             </a:fld>
             <a:endParaRPr lang="en-US"/>
           </a:p>
@@ -2581,7 +2581,7 @@
           <a:p>
             <a:fld id="{C5EF2332-01BF-834F-8236-50238282D533}" type="slidenum">
               <a:rPr lang="en-US" smtClean="0"/>
-              <a:t>‹#›</a:t>
+              <a:t>‹Nr.›</a:t>
             </a:fld>
             <a:endParaRPr lang="en-US"/>
           </a:p>
@@ -2814,7 +2814,7 @@
           <a:p>
             <a:fld id="{241EB5C9-1307-BA42-ABA2-0BC069CD8E7F}" type="datetimeFigureOut">
               <a:rPr lang="en-US" smtClean="0"/>
-              <a:t>1/2/22</a:t>
+              <a:t>3/15/25</a:t>
             </a:fld>
             <a:endParaRPr lang="en-US"/>
           </a:p>
@@ -2856,7 +2856,7 @@
           <a:p>
             <a:fld id="{C5EF2332-01BF-834F-8236-50238282D533}" type="slidenum">
               <a:rPr lang="en-US" smtClean="0"/>
-              <a:t>‹#›</a:t>
+              <a:t>‹Nr.›</a:t>
             </a:fld>
             <a:endParaRPr lang="en-US"/>
           </a:p>
@@ -3066,7 +3066,7 @@
           <a:p>
             <a:fld id="{241EB5C9-1307-BA42-ABA2-0BC069CD8E7F}" type="datetimeFigureOut">
               <a:rPr lang="en-US" smtClean="0"/>
-              <a:t>1/2/22</a:t>
+              <a:t>3/15/25</a:t>
             </a:fld>
             <a:endParaRPr lang="en-US"/>
           </a:p>
@@ -3108,7 +3108,7 @@
           <a:p>
             <a:fld id="{C5EF2332-01BF-834F-8236-50238282D533}" type="slidenum">
               <a:rPr lang="en-US" smtClean="0"/>
-              <a:t>‹#›</a:t>
+              <a:t>‹Nr.›</a:t>
             </a:fld>
             <a:endParaRPr lang="en-US"/>
           </a:p>
@@ -3271,13 +3271,15 @@
                     <a:tint val="75000"/>
                   </a:schemeClr>
                 </a:solidFill>
+                <a:latin typeface="Gill Sans MT" panose="020B0502020104020203" pitchFamily="34" charset="77"/>
               </a:defRPr>
             </a:lvl1pPr>
           </a:lstStyle>
           <a:p>
             <a:fld id="{241EB5C9-1307-BA42-ABA2-0BC069CD8E7F}" type="datetimeFigureOut">
               <a:rPr lang="en-US" smtClean="0"/>
-              <a:t>1/2/22</a:t>
+              <a:pPr/>
+              <a:t>3/15/25</a:t>
             </a:fld>
             <a:endParaRPr lang="en-US"/>
           </a:p>
@@ -3312,6 +3314,7 @@
                     <a:tint val="75000"/>
                   </a:schemeClr>
                 </a:solidFill>
+                <a:latin typeface="Gill Sans MT" panose="020B0502020104020203" pitchFamily="34" charset="77"/>
               </a:defRPr>
             </a:lvl1pPr>
           </a:lstStyle>
@@ -3349,13 +3352,15 @@
                     <a:tint val="75000"/>
                   </a:schemeClr>
                 </a:solidFill>
+                <a:latin typeface="Gill Sans MT" panose="020B0502020104020203" pitchFamily="34" charset="77"/>
               </a:defRPr>
             </a:lvl1pPr>
           </a:lstStyle>
           <a:p>
             <a:fld id="{C5EF2332-01BF-834F-8236-50238282D533}" type="slidenum">
               <a:rPr lang="en-US" smtClean="0"/>
-              <a:t>‹#›</a:t>
+              <a:pPr/>
+              <a:t>‹Nr.›</a:t>
             </a:fld>
             <a:endParaRPr lang="en-US"/>
           </a:p>
@@ -3393,7 +3398,7 @@
           <a:solidFill>
             <a:schemeClr val="tx1"/>
           </a:solidFill>
-          <a:latin typeface="+mj-lt"/>
+          <a:latin typeface="Gill Sans MT" panose="020B0502020104020203" pitchFamily="34" charset="77"/>
           <a:ea typeface="+mj-ea"/>
           <a:cs typeface="+mj-cs"/>
         </a:defRPr>
@@ -3410,7 +3415,7 @@
           <a:solidFill>
             <a:schemeClr val="tx1"/>
           </a:solidFill>
-          <a:latin typeface="+mn-lt"/>
+          <a:latin typeface="Gill Sans MT" panose="020B0502020104020203" pitchFamily="34" charset="77"/>
           <a:ea typeface="+mn-ea"/>
           <a:cs typeface="+mn-cs"/>
         </a:defRPr>
@@ -3425,7 +3430,7 @@
           <a:solidFill>
             <a:schemeClr val="tx1"/>
           </a:solidFill>
-          <a:latin typeface="+mn-lt"/>
+          <a:latin typeface="Gill Sans MT" panose="020B0502020104020203" pitchFamily="34" charset="77"/>
           <a:ea typeface="+mn-ea"/>
           <a:cs typeface="+mn-cs"/>
         </a:defRPr>
@@ -3440,7 +3445,7 @@
           <a:solidFill>
             <a:schemeClr val="tx1"/>
           </a:solidFill>
-          <a:latin typeface="+mn-lt"/>
+          <a:latin typeface="Gill Sans MT" panose="020B0502020104020203" pitchFamily="34" charset="77"/>
           <a:ea typeface="+mn-ea"/>
           <a:cs typeface="+mn-cs"/>
         </a:defRPr>
@@ -3455,7 +3460,7 @@
           <a:solidFill>
             <a:schemeClr val="tx1"/>
           </a:solidFill>
-          <a:latin typeface="+mn-lt"/>
+          <a:latin typeface="Gill Sans MT" panose="020B0502020104020203" pitchFamily="34" charset="77"/>
           <a:ea typeface="+mn-ea"/>
           <a:cs typeface="+mn-cs"/>
         </a:defRPr>
@@ -3470,7 +3475,7 @@
           <a:solidFill>
             <a:schemeClr val="tx1"/>
           </a:solidFill>
-          <a:latin typeface="+mn-lt"/>
+          <a:latin typeface="Gill Sans MT" panose="020B0502020104020203" pitchFamily="34" charset="77"/>
           <a:ea typeface="+mn-ea"/>
           <a:cs typeface="+mn-cs"/>
         </a:defRPr>
@@ -3664,11 +3669,16 @@
         </p:nvSpPr>
         <p:spPr/>
         <p:txBody>
-          <a:bodyPr/>
-          <a:lstStyle/>
-          <a:p>
-            <a:r>
-              <a:rPr lang="en-US" dirty="0"/>
+          <a:bodyPr>
+            <a:normAutofit/>
+          </a:bodyPr>
+          <a:lstStyle/>
+          <a:p>
+            <a:r>
+              <a:rPr lang="en-US" sz="4000" dirty="0">
+                <a:latin typeface="Gill Sans MT" panose="020B0502020104020203" pitchFamily="34" charset="77"/>
+                <a:cs typeface="Gill Sans Nova Light" panose="020F0302020204030204" pitchFamily="34" charset="0"/>
+              </a:rPr>
               <a:t>Presentation Title</a:t>
             </a:r>
           </a:p>
@@ -3690,7 +3700,10 @@
           <a:lstStyle/>
           <a:p>
             <a:r>
-              <a:rPr lang="en-US" dirty="0"/>
+              <a:rPr lang="en-US" dirty="0">
+                <a:latin typeface="Gill Sans MT" panose="020B0502020104020203" pitchFamily="34" charset="77"/>
+                <a:cs typeface="Gill Sans Nova Light" panose="020F0302020204030204" pitchFamily="34" charset="0"/>
+              </a:rPr>
               <a:t>Presentation Subtitle</a:t>
             </a:r>
           </a:p>
@@ -3742,7 +3755,9 @@
           <a:lstStyle/>
           <a:p>
             <a:r>
-              <a:rPr lang="en-US" dirty="0"/>
+              <a:rPr lang="en-US" dirty="0">
+                <a:latin typeface="Gill Sans MT" panose="020B0502020104020203" pitchFamily="34" charset="77"/>
+              </a:rPr>
               <a:t>Slide Title</a:t>
             </a:r>
           </a:p>
@@ -3767,11 +3782,15 @@
               <a:buNone/>
             </a:pPr>
             <a:r>
-              <a:rPr lang="en-US" dirty="0"/>
+              <a:rPr lang="en-US" dirty="0">
+                <a:latin typeface="Gill Sans MT" panose="020B0502020104020203" pitchFamily="34" charset="77"/>
+              </a:rPr>
               <a:t>Hello</a:t>
             </a:r>
             <a:r>
-              <a:rPr lang="en-US"/>
+              <a:rPr lang="en-US">
+                <a:latin typeface="Gill Sans MT" panose="020B0502020104020203" pitchFamily="34" charset="77"/>
+              </a:rPr>
               <a:t>, world.</a:t>
             </a:r>
           </a:p>
@@ -3819,11 +3838,15 @@
         </p:nvSpPr>
         <p:spPr/>
         <p:txBody>
-          <a:bodyPr/>
-          <a:lstStyle/>
-          <a:p>
-            <a:r>
-              <a:rPr lang="en-US" dirty="0"/>
+          <a:bodyPr>
+            <a:normAutofit/>
+          </a:bodyPr>
+          <a:lstStyle/>
+          <a:p>
+            <a:r>
+              <a:rPr lang="en-US" sz="2800" b="0" dirty="0">
+                <a:latin typeface="Gill Sans MT" panose="020B0502020104020203" pitchFamily="34" charset="77"/>
+              </a:rPr>
               <a:t>Section header</a:t>
             </a:r>
           </a:p>
@@ -3840,6 +3863,15 @@
           </p:nvPr>
         </p:nvSpPr>
         <p:spPr/>
+        <p:txBody>
+          <a:bodyPr/>
+          <a:lstStyle/>
+          <a:p>
+            <a:endParaRPr lang="de-DE">
+              <a:latin typeface="Gill Sans MT" panose="020B0502020104020203" pitchFamily="34" charset="77"/>
+            </a:endParaRPr>
+          </a:p>
+        </p:txBody>
       </p:sp>
     </p:spTree>
     <p:extLst>
@@ -3887,7 +3919,9 @@
           <a:lstStyle/>
           <a:p>
             <a:r>
-              <a:rPr lang="en-US" dirty="0"/>
+              <a:rPr lang="en-US" dirty="0">
+                <a:latin typeface="Gill Sans MT" panose="020B0502020104020203" pitchFamily="34" charset="77"/>
+              </a:rPr>
               <a:t>Slide Title for Two-Content</a:t>
             </a:r>
           </a:p>
@@ -3909,20 +3943,28 @@
           <a:lstStyle/>
           <a:p>
             <a:r>
-              <a:rPr lang="en-US" dirty="0"/>
+              <a:rPr lang="en-US" dirty="0">
+                <a:latin typeface="Gill Sans MT" panose="020B0502020104020203" pitchFamily="34" charset="77"/>
+              </a:rPr>
               <a:t>Some content on </a:t>
             </a:r>
             <a:r>
-              <a:rPr lang="en-US"/>
+              <a:rPr lang="en-US">
+                <a:latin typeface="Gill Sans MT" panose="020B0502020104020203" pitchFamily="34" charset="77"/>
+              </a:rPr>
               <a:t>the left.</a:t>
             </a:r>
-            <a:endParaRPr lang="en-US" dirty="0"/>
+            <a:endParaRPr lang="en-US" dirty="0">
+              <a:latin typeface="Gill Sans MT" panose="020B0502020104020203" pitchFamily="34" charset="77"/>
+            </a:endParaRPr>
           </a:p>
           <a:p>
             <a:pPr marL="0" indent="0">
               <a:buNone/>
             </a:pPr>
-            <a:endParaRPr lang="en-US" dirty="0"/>
+            <a:endParaRPr lang="en-US" dirty="0">
+              <a:latin typeface="Gill Sans MT" panose="020B0502020104020203" pitchFamily="34" charset="77"/>
+            </a:endParaRPr>
           </a:p>
         </p:txBody>
       </p:sp>
@@ -3942,7 +3984,9 @@
           <a:lstStyle/>
           <a:p>
             <a:r>
-              <a:rPr lang="en-US" dirty="0"/>
+              <a:rPr lang="en-US" dirty="0">
+                <a:latin typeface="Gill Sans MT" panose="020B0502020104020203" pitchFamily="34" charset="77"/>
+              </a:rPr>
               <a:t>Some content on the right.</a:t>
             </a:r>
           </a:p>

</xml_diff>